<commit_message>
some presentation changes and anomaly detection threshold change
</commit_message>
<xml_diff>
--- a/project/project-presentation-group51.pptx
+++ b/project/project-presentation-group51.pptx
@@ -25,9 +25,9 @@
     <p:sldId id="264" r:id="rId16"/>
     <p:sldId id="269" r:id="rId17"/>
     <p:sldId id="283" r:id="rId18"/>
-    <p:sldId id="271" r:id="rId19"/>
-    <p:sldId id="265" r:id="rId20"/>
-    <p:sldId id="270" r:id="rId21"/>
+    <p:sldId id="284" r:id="rId19"/>
+    <p:sldId id="285" r:id="rId20"/>
+    <p:sldId id="286" r:id="rId21"/>
     <p:sldId id="281" r:id="rId22"/>
     <p:sldId id="274" r:id="rId23"/>
   </p:sldIdLst>
@@ -218,7 +218,7 @@
           <a:p>
             <a:fld id="{11746ADE-9A98-6D48-9CB8-CA35B8B5C87D}" type="datetimeFigureOut">
               <a:rPr lang="en-CH" smtClean="0"/>
-              <a:t>14.10.2025</a:t>
+              <a:t>15.10.2025</a:t>
             </a:fld>
             <a:endParaRPr lang="en-CH"/>
           </a:p>
@@ -930,7 +930,15 @@
           <a:p>
             <a:r>
               <a:rPr lang="en-GB" b="1" dirty="0"/>
-              <a:t>3. Distance-based Approach</a:t>
+              <a:t>3. Distance-based Approach (k-NN -&gt; k nearest </a:t>
+            </a:r>
+            <a:r>
+              <a:rPr lang="en-GB" b="1" dirty="0" err="1"/>
+              <a:t>neighbots</a:t>
+            </a:r>
+            <a:r>
+              <a:rPr lang="en-GB" b="1" dirty="0"/>
+              <a:t>)</a:t>
             </a:r>
             <a:endParaRPr lang="en-GB" dirty="0"/>
           </a:p>
@@ -951,7 +959,7 @@
           <a:p>
             <a:r>
               <a:rPr lang="en-GB" b="1" dirty="0"/>
-              <a:t>4. Density-based Approach (LOF)</a:t>
+              <a:t>4. Density-based Approach (LOF -&gt; Local Outlier Factor))</a:t>
             </a:r>
             <a:endParaRPr lang="en-GB" dirty="0"/>
           </a:p>
@@ -1058,6 +1066,90 @@
 </file>
 
 <file path=ppt/notesSlides/notesSlide6.xml><?xml version="1.0" encoding="utf-8"?>
+<p:notes xmlns:a="http://schemas.openxmlformats.org/drawingml/2006/main" xmlns:r="http://schemas.openxmlformats.org/officeDocument/2006/relationships" xmlns:p="http://schemas.openxmlformats.org/presentationml/2006/main">
+  <p:cSld>
+    <p:spTree>
+      <p:nvGrpSpPr>
+        <p:cNvPr id="1" name=""/>
+        <p:cNvGrpSpPr/>
+        <p:nvPr/>
+      </p:nvGrpSpPr>
+      <p:grpSpPr>
+        <a:xfrm>
+          <a:off x="0" y="0"/>
+          <a:ext cx="0" cy="0"/>
+          <a:chOff x="0" y="0"/>
+          <a:chExt cx="0" cy="0"/>
+        </a:xfrm>
+      </p:grpSpPr>
+      <p:sp>
+        <p:nvSpPr>
+          <p:cNvPr id="2" name="Slide Image Placeholder 1"/>
+          <p:cNvSpPr>
+            <a:spLocks noGrp="1" noRot="1" noChangeAspect="1"/>
+          </p:cNvSpPr>
+          <p:nvPr>
+            <p:ph type="sldImg"/>
+          </p:nvPr>
+        </p:nvSpPr>
+        <p:spPr/>
+      </p:sp>
+      <p:sp>
+        <p:nvSpPr>
+          <p:cNvPr id="3" name="Notes Placeholder 2"/>
+          <p:cNvSpPr>
+            <a:spLocks noGrp="1"/>
+          </p:cNvSpPr>
+          <p:nvPr>
+            <p:ph type="body" idx="1"/>
+          </p:nvPr>
+        </p:nvSpPr>
+        <p:spPr/>
+        <p:txBody>
+          <a:bodyPr/>
+          <a:lstStyle/>
+          <a:p>
+            <a:endParaRPr lang="en-CH" dirty="0"/>
+          </a:p>
+        </p:txBody>
+      </p:sp>
+      <p:sp>
+        <p:nvSpPr>
+          <p:cNvPr id="4" name="Slide Number Placeholder 3"/>
+          <p:cNvSpPr>
+            <a:spLocks noGrp="1"/>
+          </p:cNvSpPr>
+          <p:nvPr>
+            <p:ph type="sldNum" sz="quarter" idx="5"/>
+          </p:nvPr>
+        </p:nvSpPr>
+        <p:spPr/>
+        <p:txBody>
+          <a:bodyPr/>
+          <a:lstStyle/>
+          <a:p>
+            <a:fld id="{9D5711ED-9794-EB46-8888-A9216C3D6C48}" type="slidenum">
+              <a:rPr lang="en-CH" smtClean="0"/>
+              <a:t>17</a:t>
+            </a:fld>
+            <a:endParaRPr lang="en-CH"/>
+          </a:p>
+        </p:txBody>
+      </p:sp>
+    </p:spTree>
+    <p:extLst>
+      <p:ext uri="{BB962C8B-B14F-4D97-AF65-F5344CB8AC3E}">
+        <p14:creationId xmlns:p14="http://schemas.microsoft.com/office/powerpoint/2010/main" val="2982053909"/>
+      </p:ext>
+    </p:extLst>
+  </p:cSld>
+  <p:clrMapOvr>
+    <a:masterClrMapping/>
+  </p:clrMapOvr>
+</p:notes>
+</file>
+
+<file path=ppt/notesSlides/notesSlide7.xml><?xml version="1.0" encoding="utf-8"?>
 <p:notes xmlns:a="http://schemas.openxmlformats.org/drawingml/2006/main" xmlns:r="http://schemas.openxmlformats.org/officeDocument/2006/relationships" xmlns:p="http://schemas.openxmlformats.org/presentationml/2006/main">
   <p:cSld>
     <p:spTree>
@@ -1317,7 +1409,7 @@
           <a:p>
             <a:fld id="{593DC79D-9DC4-EA44-868B-9D2B8A1A4EF4}" type="datetime1">
               <a:rPr lang="de-CH" smtClean="0"/>
-              <a:t>14.10.25</a:t>
+              <a:t>15.10.25</a:t>
             </a:fld>
             <a:endParaRPr lang="en-CH"/>
           </a:p>
@@ -1517,7 +1609,7 @@
           <a:p>
             <a:fld id="{76309F84-66D4-6044-A367-E76DBF540EDA}" type="datetime1">
               <a:rPr lang="de-CH" smtClean="0"/>
-              <a:t>14.10.25</a:t>
+              <a:t>15.10.25</a:t>
             </a:fld>
             <a:endParaRPr lang="en-CH"/>
           </a:p>
@@ -1727,7 +1819,7 @@
           <a:p>
             <a:fld id="{BB899F6D-3952-FE42-8310-BE2B79F01003}" type="datetime1">
               <a:rPr lang="de-CH" smtClean="0"/>
-              <a:t>14.10.25</a:t>
+              <a:t>15.10.25</a:t>
             </a:fld>
             <a:endParaRPr lang="en-CH"/>
           </a:p>
@@ -1927,7 +2019,7 @@
           <a:p>
             <a:fld id="{74C2C631-7ACD-E34F-B884-82D800C709F1}" type="datetime1">
               <a:rPr lang="de-CH" smtClean="0"/>
-              <a:t>14.10.25</a:t>
+              <a:t>15.10.25</a:t>
             </a:fld>
             <a:endParaRPr lang="en-CH"/>
           </a:p>
@@ -2203,7 +2295,7 @@
           <a:p>
             <a:fld id="{9D0F2590-1C31-9544-9A53-73E5AF6CE5C9}" type="datetime1">
               <a:rPr lang="de-CH" smtClean="0"/>
-              <a:t>14.10.25</a:t>
+              <a:t>15.10.25</a:t>
             </a:fld>
             <a:endParaRPr lang="en-CH"/>
           </a:p>
@@ -2471,7 +2563,7 @@
           <a:p>
             <a:fld id="{1BBA78D2-5FED-DE49-859E-A08B867B8C75}" type="datetime1">
               <a:rPr lang="de-CH" smtClean="0"/>
-              <a:t>14.10.25</a:t>
+              <a:t>15.10.25</a:t>
             </a:fld>
             <a:endParaRPr lang="en-CH"/>
           </a:p>
@@ -2886,7 +2978,7 @@
           <a:p>
             <a:fld id="{20AF4FC7-1DD2-E248-9BEE-AB4A912615BB}" type="datetime1">
               <a:rPr lang="de-CH" smtClean="0"/>
-              <a:t>14.10.25</a:t>
+              <a:t>15.10.25</a:t>
             </a:fld>
             <a:endParaRPr lang="en-CH"/>
           </a:p>
@@ -3028,7 +3120,7 @@
           <a:p>
             <a:fld id="{FD65B099-A499-1848-8C6F-0DFA096FF6DA}" type="datetime1">
               <a:rPr lang="de-CH" smtClean="0"/>
-              <a:t>14.10.25</a:t>
+              <a:t>15.10.25</a:t>
             </a:fld>
             <a:endParaRPr lang="en-CH"/>
           </a:p>
@@ -3141,7 +3233,7 @@
           <a:p>
             <a:fld id="{E2D4B7AD-5FA8-894A-9429-E84D90BCF43B}" type="datetime1">
               <a:rPr lang="de-CH" smtClean="0"/>
-              <a:t>14.10.25</a:t>
+              <a:t>15.10.25</a:t>
             </a:fld>
             <a:endParaRPr lang="en-CH"/>
           </a:p>
@@ -3454,7 +3546,7 @@
           <a:p>
             <a:fld id="{7816D493-D91E-4344-BF50-06DF56110F0A}" type="datetime1">
               <a:rPr lang="de-CH" smtClean="0"/>
-              <a:t>14.10.25</a:t>
+              <a:t>15.10.25</a:t>
             </a:fld>
             <a:endParaRPr lang="en-CH"/>
           </a:p>
@@ -3743,7 +3835,7 @@
           <a:p>
             <a:fld id="{3C1B4F2C-2CF1-9F42-9BCB-8C4DE9902C03}" type="datetime1">
               <a:rPr lang="de-CH" smtClean="0"/>
-              <a:t>14.10.25</a:t>
+              <a:t>15.10.25</a:t>
             </a:fld>
             <a:endParaRPr lang="en-CH"/>
           </a:p>
@@ -3986,7 +4078,7 @@
           <a:p>
             <a:fld id="{2B05A54E-0FE8-734B-BCAA-129A11DE1712}" type="datetime1">
               <a:rPr lang="de-CH" smtClean="0"/>
-              <a:t>14.10.25</a:t>
+              <a:t>15.10.25</a:t>
             </a:fld>
             <a:endParaRPr lang="en-CH"/>
           </a:p>
@@ -4466,15 +4558,15 @@
           <a:lstStyle/>
           <a:p>
             <a:r>
-              <a:rPr lang="en-GB" sz="2800" dirty="0"/>
+              <a:rPr lang="en-GB" sz="2600" b="1" dirty="0"/>
               <a:t>Analysis of Social Circles and Anomalous Users in the </a:t>
             </a:r>
             <a:r>
-              <a:rPr lang="en-GB" sz="2800" dirty="0" err="1"/>
+              <a:rPr lang="en-GB" sz="2600" b="1" dirty="0" err="1"/>
               <a:t>Friendfeed</a:t>
             </a:r>
             <a:r>
-              <a:rPr lang="en-GB" sz="2800" dirty="0"/>
+              <a:rPr lang="en-GB" sz="2600" b="1" dirty="0"/>
               <a:t> Network</a:t>
             </a:r>
           </a:p>
@@ -8391,7 +8483,7 @@
           <a:p>
             <a:r>
               <a:rPr lang="en-CH" dirty="0"/>
-              <a:t>Normalization for Anomaly Detection</a:t>
+              <a:t>Preprocessing for Anomaly Detection</a:t>
             </a:r>
           </a:p>
         </p:txBody>
@@ -8418,6 +8510,69 @@
             <a:normAutofit/>
           </a:bodyPr>
           <a:lstStyle/>
+          <a:p>
+            <a:pPr fontAlgn="t"/>
+            <a:r>
+              <a:rPr lang="en-CH" dirty="0"/>
+              <a:t>Create a new dataframe </a:t>
+            </a:r>
+            <a:br>
+              <a:rPr lang="en-CH" dirty="0"/>
+            </a:br>
+            <a:r>
+              <a:rPr lang="en-CH" dirty="0"/>
+              <a:t>-&gt; rows = users</a:t>
+            </a:r>
+            <a:br>
+              <a:rPr lang="en-CH" dirty="0"/>
+            </a:br>
+            <a:r>
+              <a:rPr lang="en-CH" dirty="0"/>
+              <a:t>-&gt; columns = 7 features</a:t>
+            </a:r>
+          </a:p>
+          <a:p>
+            <a:pPr fontAlgn="t"/>
+            <a:r>
+              <a:rPr lang="en-CH" dirty="0"/>
+              <a:t>Normalization </a:t>
+            </a:r>
+            <a:br>
+              <a:rPr lang="en-CH" dirty="0"/>
+            </a:br>
+            <a:r>
+              <a:rPr lang="en-CH" dirty="0"/>
+              <a:t>-&gt; mean of every feauture = 0</a:t>
+            </a:r>
+            <a:br>
+              <a:rPr lang="en-CH" dirty="0"/>
+            </a:br>
+            <a:r>
+              <a:rPr lang="en-CH" dirty="0"/>
+              <a:t>-&gt; std of every feature = 1</a:t>
+            </a:r>
+          </a:p>
+          <a:p>
+            <a:pPr fontAlgn="t"/>
+            <a:r>
+              <a:rPr lang="en-CH" dirty="0"/>
+              <a:t>Setting an appropriate contamination rate </a:t>
+            </a:r>
+            <a:br>
+              <a:rPr lang="en-CH" dirty="0"/>
+            </a:br>
+            <a:r>
+              <a:rPr lang="en-CH" dirty="0"/>
+              <a:t>-&gt; in our case: 0.05%</a:t>
+            </a:r>
+            <a:br>
+              <a:rPr lang="en-CH" dirty="0"/>
+            </a:br>
+            <a:r>
+              <a:rPr lang="en-CH" dirty="0"/>
+              <a:t>-&gt; 0.0005 * 504’590 users ~ 250 outlier users</a:t>
+            </a:r>
+          </a:p>
           <a:p>
             <a:pPr fontAlgn="t"/>
             <a:endParaRPr lang="en-CH" dirty="0"/>
@@ -8474,7 +8629,7 @@
         <p:cNvPr id="1" name="">
           <a:extLst>
             <a:ext uri="{FF2B5EF4-FFF2-40B4-BE49-F238E27FC236}">
-              <a16:creationId xmlns:a16="http://schemas.microsoft.com/office/drawing/2014/main" id="{06B14EB3-2D16-6120-4FB3-F66FA8D0D7EC}"/>
+              <a16:creationId xmlns:a16="http://schemas.microsoft.com/office/drawing/2014/main" id="{066F6A25-880B-0279-39D0-16330DFC0E52}"/>
             </a:ext>
           </a:extLst>
         </p:cNvPr>
@@ -8494,7 +8649,7 @@
           <p:cNvPr id="2" name="Title 1">
             <a:extLst>
               <a:ext uri="{FF2B5EF4-FFF2-40B4-BE49-F238E27FC236}">
-                <a16:creationId xmlns:a16="http://schemas.microsoft.com/office/drawing/2014/main" id="{64C19E71-EF51-7BB6-BE1E-94E276604811}"/>
+                <a16:creationId xmlns:a16="http://schemas.microsoft.com/office/drawing/2014/main" id="{C20A030E-5682-5145-6C50-CB7252539AF5}"/>
               </a:ext>
             </a:extLst>
           </p:cNvPr>
@@ -8517,12 +8672,23 @@
               <a:t>Outlier User ”</a:t>
             </a:r>
             <a:r>
-              <a:rPr lang="en-GB" sz="4000" dirty="0" err="1"/>
-              <a:t>jluvisions</a:t>
+              <a:rPr lang="en-GB" dirty="0"/>
+              <a:t> </a:t>
+            </a:r>
+            <a:r>
+              <a:rPr lang="en-GB" dirty="0" err="1"/>
+              <a:t>itblogger</a:t>
             </a:r>
             <a:r>
               <a:rPr lang="en-GB" sz="4000" dirty="0"/>
-              <a:t>”- Post Creation and Comment Spammer Bot</a:t>
+              <a:t>” </a:t>
+            </a:r>
+            <a:br>
+              <a:rPr lang="en-GB" sz="4000" dirty="0"/>
+            </a:br>
+            <a:r>
+              <a:rPr lang="en-GB" sz="4000" dirty="0"/>
+              <a:t>Influencer: is in the top 1 % in all categories</a:t>
             </a:r>
             <a:endParaRPr lang="en-CH" sz="4000" dirty="0"/>
           </a:p>
@@ -8533,7 +8699,7 @@
           <p:cNvPr id="3" name="Table 2">
             <a:extLst>
               <a:ext uri="{FF2B5EF4-FFF2-40B4-BE49-F238E27FC236}">
-                <a16:creationId xmlns:a16="http://schemas.microsoft.com/office/drawing/2014/main" id="{A270247C-CF5A-0A98-8925-7A0F714228AD}"/>
+                <a16:creationId xmlns:a16="http://schemas.microsoft.com/office/drawing/2014/main" id="{59DB877D-55F8-AEA2-11E4-F16BCAC86742}"/>
               </a:ext>
             </a:extLst>
           </p:cNvPr>
@@ -8543,1037 +8709,7 @@
           <p:nvPr>
             <p:extLst>
               <p:ext uri="{D42A27DB-BD31-4B8C-83A1-F6EECF244321}">
-                <p14:modId xmlns:p14="http://schemas.microsoft.com/office/powerpoint/2010/main" val="2359324755"/>
-              </p:ext>
-            </p:extLst>
-          </p:nvPr>
-        </p:nvGraphicFramePr>
-        <p:xfrm>
-          <a:off x="812800" y="1690687"/>
-          <a:ext cx="10272294" cy="4132840"/>
-        </p:xfrm>
-        <a:graphic>
-          <a:graphicData uri="http://schemas.openxmlformats.org/drawingml/2006/table">
-            <a:tbl>
-              <a:tblPr firstRow="1" bandRow="1">
-                <a:tableStyleId>{5C22544A-7EE6-4342-B048-85BDC9FD1C3A}</a:tableStyleId>
-              </a:tblPr>
-              <a:tblGrid>
-                <a:gridCol w="4834021">
-                  <a:extLst>
-                    <a:ext uri="{9D8B030D-6E8A-4147-A177-3AD203B41FA5}">
-                      <a16:colId xmlns:a16="http://schemas.microsoft.com/office/drawing/2014/main" val="967672467"/>
-                    </a:ext>
-                  </a:extLst>
-                </a:gridCol>
-                <a:gridCol w="1876926">
-                  <a:extLst>
-                    <a:ext uri="{9D8B030D-6E8A-4147-A177-3AD203B41FA5}">
-                      <a16:colId xmlns:a16="http://schemas.microsoft.com/office/drawing/2014/main" val="4119636025"/>
-                    </a:ext>
-                  </a:extLst>
-                </a:gridCol>
-                <a:gridCol w="1668379">
-                  <a:extLst>
-                    <a:ext uri="{9D8B030D-6E8A-4147-A177-3AD203B41FA5}">
-                      <a16:colId xmlns:a16="http://schemas.microsoft.com/office/drawing/2014/main" val="1495807327"/>
-                    </a:ext>
-                  </a:extLst>
-                </a:gridCol>
-                <a:gridCol w="1892968">
-                  <a:extLst>
-                    <a:ext uri="{9D8B030D-6E8A-4147-A177-3AD203B41FA5}">
-                      <a16:colId xmlns:a16="http://schemas.microsoft.com/office/drawing/2014/main" val="1862839425"/>
-                    </a:ext>
-                  </a:extLst>
-                </a:gridCol>
-              </a:tblGrid>
-              <a:tr h="472897">
-                <a:tc>
-                  <a:txBody>
-                    <a:bodyPr/>
-                    <a:lstStyle/>
-                    <a:p>
-                      <a:pPr algn="l" fontAlgn="b">
-                        <a:buNone/>
-                      </a:pPr>
-                      <a:r>
-                        <a:rPr lang="en-GB" sz="2200" b="1" i="0" u="none" strike="noStrike" dirty="0">
-                          <a:solidFill>
-                            <a:schemeClr val="bg1"/>
-                          </a:solidFill>
-                          <a:effectLst/>
-                          <a:latin typeface="Aptos Narrow" panose="020B0004020202020204" pitchFamily="34" charset="0"/>
-                        </a:rPr>
-                        <a:t>Type</a:t>
-                      </a:r>
-                    </a:p>
-                  </a:txBody>
-                  <a:tcPr anchor="ctr"/>
-                </a:tc>
-                <a:tc>
-                  <a:txBody>
-                    <a:bodyPr/>
-                    <a:lstStyle/>
-                    <a:p>
-                      <a:pPr algn="l" fontAlgn="b">
-                        <a:buNone/>
-                      </a:pPr>
-                      <a:r>
-                        <a:rPr lang="en-GB" sz="2200" b="1" i="0" u="none" strike="noStrike" dirty="0">
-                          <a:solidFill>
-                            <a:schemeClr val="bg1"/>
-                          </a:solidFill>
-                          <a:effectLst/>
-                          <a:latin typeface="Aptos Narrow" panose="020B0004020202020204" pitchFamily="34" charset="0"/>
-                        </a:rPr>
-                        <a:t>Value</a:t>
-                      </a:r>
-                    </a:p>
-                  </a:txBody>
-                  <a:tcPr anchor="ctr"/>
-                </a:tc>
-                <a:tc>
-                  <a:txBody>
-                    <a:bodyPr/>
-                    <a:lstStyle/>
-                    <a:p>
-                      <a:pPr algn="l" fontAlgn="b">
-                        <a:buNone/>
-                      </a:pPr>
-                      <a:r>
-                        <a:rPr lang="en-GB" sz="2200" b="1" i="0" u="none" strike="noStrike" dirty="0">
-                          <a:solidFill>
-                            <a:schemeClr val="bg1"/>
-                          </a:solidFill>
-                          <a:effectLst/>
-                          <a:latin typeface="Aptos Narrow" panose="020B0004020202020204" pitchFamily="34" charset="0"/>
-                        </a:rPr>
-                        <a:t>Rank</a:t>
-                      </a:r>
-                    </a:p>
-                  </a:txBody>
-                  <a:tcPr anchor="ctr"/>
-                </a:tc>
-                <a:tc>
-                  <a:txBody>
-                    <a:bodyPr/>
-                    <a:lstStyle/>
-                    <a:p>
-                      <a:pPr algn="l" fontAlgn="b">
-                        <a:buNone/>
-                      </a:pPr>
-                      <a:r>
-                        <a:rPr lang="en-GB" sz="2200" b="1" i="0" u="none" strike="noStrike" dirty="0">
-                          <a:solidFill>
-                            <a:schemeClr val="bg1"/>
-                          </a:solidFill>
-                          <a:effectLst/>
-                          <a:latin typeface="Aptos Narrow" panose="020B0004020202020204" pitchFamily="34" charset="0"/>
-                        </a:rPr>
-                        <a:t>Top in %</a:t>
-                      </a:r>
-                    </a:p>
-                  </a:txBody>
-                  <a:tcPr anchor="ctr"/>
-                </a:tc>
-                <a:extLst>
-                  <a:ext uri="{0D108BD9-81ED-4DB2-BD59-A6C34878D82A}">
-                    <a16:rowId xmlns:a16="http://schemas.microsoft.com/office/drawing/2014/main" val="2445361585"/>
-                  </a:ext>
-                </a:extLst>
-              </a:tr>
-              <a:tr h="472897">
-                <a:tc>
-                  <a:txBody>
-                    <a:bodyPr/>
-                    <a:lstStyle/>
-                    <a:p>
-                      <a:pPr algn="l" fontAlgn="b">
-                        <a:buNone/>
-                      </a:pPr>
-                      <a:r>
-                        <a:rPr lang="en-GB" sz="2200" b="0" i="0" u="none" strike="noStrike">
-                          <a:solidFill>
-                            <a:srgbClr val="000000"/>
-                          </a:solidFill>
-                          <a:effectLst/>
-                          <a:latin typeface="Aptos Narrow" panose="020B0004020202020204" pitchFamily="34" charset="0"/>
-                        </a:rPr>
-                        <a:t>Follower Count</a:t>
-                      </a:r>
-                    </a:p>
-                  </a:txBody>
-                  <a:tcPr marL="9525" marR="9525" marT="9525" marB="0" anchor="b"/>
-                </a:tc>
-                <a:tc>
-                  <a:txBody>
-                    <a:bodyPr/>
-                    <a:lstStyle/>
-                    <a:p>
-                      <a:pPr algn="l" fontAlgn="b">
-                        <a:buNone/>
-                      </a:pPr>
-                      <a:r>
-                        <a:rPr lang="en-CH" sz="2200" b="0" i="0" u="none" strike="noStrike">
-                          <a:solidFill>
-                            <a:srgbClr val="000000"/>
-                          </a:solidFill>
-                          <a:effectLst/>
-                          <a:latin typeface="Aptos Narrow" panose="020B0004020202020204" pitchFamily="34" charset="0"/>
-                        </a:rPr>
-                        <a:t>110</a:t>
-                      </a:r>
-                    </a:p>
-                  </a:txBody>
-                  <a:tcPr marL="9525" marR="9525" marT="9525" marB="0" anchor="b"/>
-                </a:tc>
-                <a:tc>
-                  <a:txBody>
-                    <a:bodyPr/>
-                    <a:lstStyle/>
-                    <a:p>
-                      <a:pPr algn="l" fontAlgn="b">
-                        <a:buNone/>
-                      </a:pPr>
-                      <a:r>
-                        <a:rPr lang="en-CH" sz="2200" b="0" i="0" u="none" strike="noStrike">
-                          <a:solidFill>
-                            <a:srgbClr val="000000"/>
-                          </a:solidFill>
-                          <a:effectLst/>
-                          <a:latin typeface="Aptos Narrow" panose="020B0004020202020204" pitchFamily="34" charset="0"/>
-                        </a:rPr>
-                        <a:t>36065</a:t>
-                      </a:r>
-                    </a:p>
-                  </a:txBody>
-                  <a:tcPr marL="9525" marR="9525" marT="9525" marB="0" anchor="b"/>
-                </a:tc>
-                <a:tc>
-                  <a:txBody>
-                    <a:bodyPr/>
-                    <a:lstStyle/>
-                    <a:p>
-                      <a:pPr algn="l" fontAlgn="b">
-                        <a:buNone/>
-                      </a:pPr>
-                      <a:r>
-                        <a:rPr lang="en-CH" sz="2200" b="0" i="0" u="none" strike="noStrike">
-                          <a:solidFill>
-                            <a:srgbClr val="000000"/>
-                          </a:solidFill>
-                          <a:effectLst/>
-                          <a:latin typeface="Aptos Narrow" panose="020B0004020202020204" pitchFamily="34" charset="0"/>
-                        </a:rPr>
-                        <a:t>7.42</a:t>
-                      </a:r>
-                    </a:p>
-                  </a:txBody>
-                  <a:tcPr marL="9525" marR="9525" marT="9525" marB="0" anchor="b"/>
-                </a:tc>
-                <a:extLst>
-                  <a:ext uri="{0D108BD9-81ED-4DB2-BD59-A6C34878D82A}">
-                    <a16:rowId xmlns:a16="http://schemas.microsoft.com/office/drawing/2014/main" val="762743734"/>
-                  </a:ext>
-                </a:extLst>
-              </a:tr>
-              <a:tr h="472897">
-                <a:tc>
-                  <a:txBody>
-                    <a:bodyPr/>
-                    <a:lstStyle/>
-                    <a:p>
-                      <a:pPr algn="l" fontAlgn="b">
-                        <a:buNone/>
-                      </a:pPr>
-                      <a:r>
-                        <a:rPr lang="en-GB" sz="2200" b="0" i="0" u="none" strike="noStrike">
-                          <a:solidFill>
-                            <a:srgbClr val="000000"/>
-                          </a:solidFill>
-                          <a:effectLst/>
-                          <a:latin typeface="Aptos Narrow" panose="020B0004020202020204" pitchFamily="34" charset="0"/>
-                        </a:rPr>
-                        <a:t>Following Count</a:t>
-                      </a:r>
-                    </a:p>
-                  </a:txBody>
-                  <a:tcPr marL="9525" marR="9525" marT="9525" marB="0" anchor="b"/>
-                </a:tc>
-                <a:tc>
-                  <a:txBody>
-                    <a:bodyPr/>
-                    <a:lstStyle/>
-                    <a:p>
-                      <a:pPr algn="l" fontAlgn="b">
-                        <a:buNone/>
-                      </a:pPr>
-                      <a:r>
-                        <a:rPr lang="en-CH" sz="2200" b="0" i="0" u="none" strike="noStrike">
-                          <a:solidFill>
-                            <a:srgbClr val="000000"/>
-                          </a:solidFill>
-                          <a:effectLst/>
-                          <a:latin typeface="Aptos Narrow" panose="020B0004020202020204" pitchFamily="34" charset="0"/>
-                        </a:rPr>
-                        <a:t>0</a:t>
-                      </a:r>
-                    </a:p>
-                  </a:txBody>
-                  <a:tcPr marL="9525" marR="9525" marT="9525" marB="0" anchor="b"/>
-                </a:tc>
-                <a:tc>
-                  <a:txBody>
-                    <a:bodyPr/>
-                    <a:lstStyle/>
-                    <a:p>
-                      <a:pPr algn="l" fontAlgn="b">
-                        <a:buNone/>
-                      </a:pPr>
-                      <a:r>
-                        <a:rPr lang="en-CH" sz="2200" b="0" i="0" u="none" strike="noStrike">
-                          <a:solidFill>
-                            <a:srgbClr val="000000"/>
-                          </a:solidFill>
-                          <a:effectLst/>
-                          <a:latin typeface="Aptos Narrow" panose="020B0004020202020204" pitchFamily="34" charset="0"/>
-                        </a:rPr>
-                        <a:t>443553</a:t>
-                      </a:r>
-                    </a:p>
-                  </a:txBody>
-                  <a:tcPr marL="9525" marR="9525" marT="9525" marB="0" anchor="b"/>
-                </a:tc>
-                <a:tc>
-                  <a:txBody>
-                    <a:bodyPr/>
-                    <a:lstStyle/>
-                    <a:p>
-                      <a:pPr algn="l" fontAlgn="b">
-                        <a:buNone/>
-                      </a:pPr>
-                      <a:r>
-                        <a:rPr lang="en-CH" sz="2200" b="0" i="0" u="none" strike="noStrike">
-                          <a:solidFill>
-                            <a:srgbClr val="000000"/>
-                          </a:solidFill>
-                          <a:effectLst/>
-                          <a:latin typeface="Aptos Narrow" panose="020B0004020202020204" pitchFamily="34" charset="0"/>
-                        </a:rPr>
-                        <a:t>95.45</a:t>
-                      </a:r>
-                    </a:p>
-                  </a:txBody>
-                  <a:tcPr marL="9525" marR="9525" marT="9525" marB="0" anchor="b"/>
-                </a:tc>
-                <a:extLst>
-                  <a:ext uri="{0D108BD9-81ED-4DB2-BD59-A6C34878D82A}">
-                    <a16:rowId xmlns:a16="http://schemas.microsoft.com/office/drawing/2014/main" val="81564572"/>
-                  </a:ext>
-                </a:extLst>
-              </a:tr>
-              <a:tr h="472897">
-                <a:tc>
-                  <a:txBody>
-                    <a:bodyPr/>
-                    <a:lstStyle/>
-                    <a:p>
-                      <a:pPr algn="l" fontAlgn="b">
-                        <a:buNone/>
-                      </a:pPr>
-                      <a:r>
-                        <a:rPr lang="en-GB" sz="2200" b="1" i="0" u="none" strike="noStrike" dirty="0">
-                          <a:solidFill>
-                            <a:srgbClr val="000000"/>
-                          </a:solidFill>
-                          <a:effectLst/>
-                          <a:latin typeface="Aptos Narrow" panose="020B0004020202020204" pitchFamily="34" charset="0"/>
-                        </a:rPr>
-                        <a:t>Posts Created</a:t>
-                      </a:r>
-                    </a:p>
-                  </a:txBody>
-                  <a:tcPr marL="9525" marR="9525" marT="9525" marB="0" anchor="b"/>
-                </a:tc>
-                <a:tc>
-                  <a:txBody>
-                    <a:bodyPr/>
-                    <a:lstStyle/>
-                    <a:p>
-                      <a:pPr algn="l" fontAlgn="b">
-                        <a:buNone/>
-                      </a:pPr>
-                      <a:r>
-                        <a:rPr lang="en-CH" sz="2200" b="1" i="0" u="none" strike="noStrike">
-                          <a:solidFill>
-                            <a:srgbClr val="000000"/>
-                          </a:solidFill>
-                          <a:effectLst/>
-                          <a:latin typeface="Aptos Narrow" panose="020B0004020202020204" pitchFamily="34" charset="0"/>
-                        </a:rPr>
-                        <a:t>8,297.0</a:t>
-                      </a:r>
-                    </a:p>
-                  </a:txBody>
-                  <a:tcPr marL="9525" marR="9525" marT="9525" marB="0" anchor="b"/>
-                </a:tc>
-                <a:tc>
-                  <a:txBody>
-                    <a:bodyPr/>
-                    <a:lstStyle/>
-                    <a:p>
-                      <a:pPr algn="l" fontAlgn="b">
-                        <a:buNone/>
-                      </a:pPr>
-                      <a:r>
-                        <a:rPr lang="en-CH" sz="2200" b="1" i="0" u="none" strike="noStrike" dirty="0">
-                          <a:solidFill>
-                            <a:srgbClr val="000000"/>
-                          </a:solidFill>
-                          <a:effectLst/>
-                          <a:latin typeface="Aptos Narrow" panose="020B0004020202020204" pitchFamily="34" charset="0"/>
-                        </a:rPr>
-                        <a:t>38</a:t>
-                      </a:r>
-                    </a:p>
-                  </a:txBody>
-                  <a:tcPr marL="9525" marR="9525" marT="9525" marB="0" anchor="b"/>
-                </a:tc>
-                <a:tc>
-                  <a:txBody>
-                    <a:bodyPr/>
-                    <a:lstStyle/>
-                    <a:p>
-                      <a:pPr algn="l" fontAlgn="b">
-                        <a:buNone/>
-                      </a:pPr>
-                      <a:r>
-                        <a:rPr lang="en-CH" sz="2200" b="1" i="0" u="none" strike="noStrike" dirty="0">
-                          <a:solidFill>
-                            <a:srgbClr val="000000"/>
-                          </a:solidFill>
-                          <a:effectLst/>
-                          <a:latin typeface="Aptos Narrow" panose="020B0004020202020204" pitchFamily="34" charset="0"/>
-                        </a:rPr>
-                        <a:t>0.01</a:t>
-                      </a:r>
-                    </a:p>
-                  </a:txBody>
-                  <a:tcPr marL="9525" marR="9525" marT="9525" marB="0" anchor="b"/>
-                </a:tc>
-                <a:extLst>
-                  <a:ext uri="{0D108BD9-81ED-4DB2-BD59-A6C34878D82A}">
-                    <a16:rowId xmlns:a16="http://schemas.microsoft.com/office/drawing/2014/main" val="437662955"/>
-                  </a:ext>
-                </a:extLst>
-              </a:tr>
-              <a:tr h="711775">
-                <a:tc>
-                  <a:txBody>
-                    <a:bodyPr/>
-                    <a:lstStyle/>
-                    <a:p>
-                      <a:pPr algn="l" fontAlgn="b">
-                        <a:buNone/>
-                      </a:pPr>
-                      <a:r>
-                        <a:rPr lang="en-GB" sz="2200" b="0" i="0" u="none" strike="noStrike">
-                          <a:solidFill>
-                            <a:srgbClr val="000000"/>
-                          </a:solidFill>
-                          <a:effectLst/>
-                          <a:latin typeface="Aptos Narrow" panose="020B0004020202020204" pitchFamily="34" charset="0"/>
-                        </a:rPr>
-                        <a:t>Likes Received per Post (on average)</a:t>
-                      </a:r>
-                    </a:p>
-                  </a:txBody>
-                  <a:tcPr marL="9525" marR="9525" marT="9525" marB="0" anchor="b"/>
-                </a:tc>
-                <a:tc>
-                  <a:txBody>
-                    <a:bodyPr/>
-                    <a:lstStyle/>
-                    <a:p>
-                      <a:pPr algn="l" fontAlgn="b">
-                        <a:buNone/>
-                      </a:pPr>
-                      <a:r>
-                        <a:rPr lang="en-CH" sz="2200" b="0" i="0" u="none" strike="noStrike">
-                          <a:solidFill>
-                            <a:srgbClr val="000000"/>
-                          </a:solidFill>
-                          <a:effectLst/>
-                          <a:latin typeface="Aptos Narrow" panose="020B0004020202020204" pitchFamily="34" charset="0"/>
-                        </a:rPr>
-                        <a:t>0</a:t>
-                      </a:r>
-                    </a:p>
-                  </a:txBody>
-                  <a:tcPr marL="9525" marR="9525" marT="9525" marB="0" anchor="b"/>
-                </a:tc>
-                <a:tc>
-                  <a:txBody>
-                    <a:bodyPr/>
-                    <a:lstStyle/>
-                    <a:p>
-                      <a:pPr algn="l" fontAlgn="b">
-                        <a:buNone/>
-                      </a:pPr>
-                      <a:r>
-                        <a:rPr lang="en-CH" sz="2200" b="0" i="0" u="none" strike="noStrike">
-                          <a:solidFill>
-                            <a:srgbClr val="000000"/>
-                          </a:solidFill>
-                          <a:effectLst/>
-                          <a:latin typeface="Aptos Narrow" panose="020B0004020202020204" pitchFamily="34" charset="0"/>
-                        </a:rPr>
-                        <a:t>15716</a:t>
-                      </a:r>
-                    </a:p>
-                  </a:txBody>
-                  <a:tcPr marL="9525" marR="9525" marT="9525" marB="0" anchor="b"/>
-                </a:tc>
-                <a:tc>
-                  <a:txBody>
-                    <a:bodyPr/>
-                    <a:lstStyle/>
-                    <a:p>
-                      <a:pPr algn="l" fontAlgn="b">
-                        <a:buNone/>
-                      </a:pPr>
-                      <a:r>
-                        <a:rPr lang="en-CH" sz="2200" b="0" i="0" u="none" strike="noStrike">
-                          <a:solidFill>
-                            <a:srgbClr val="000000"/>
-                          </a:solidFill>
-                          <a:effectLst/>
-                          <a:latin typeface="Aptos Narrow" panose="020B0004020202020204" pitchFamily="34" charset="0"/>
-                        </a:rPr>
-                        <a:t>3.22</a:t>
-                      </a:r>
-                    </a:p>
-                  </a:txBody>
-                  <a:tcPr marL="9525" marR="9525" marT="9525" marB="0" anchor="b"/>
-                </a:tc>
-                <a:extLst>
-                  <a:ext uri="{0D108BD9-81ED-4DB2-BD59-A6C34878D82A}">
-                    <a16:rowId xmlns:a16="http://schemas.microsoft.com/office/drawing/2014/main" val="1161320379"/>
-                  </a:ext>
-                </a:extLst>
-              </a:tr>
-              <a:tr h="472897">
-                <a:tc>
-                  <a:txBody>
-                    <a:bodyPr/>
-                    <a:lstStyle/>
-                    <a:p>
-                      <a:pPr algn="l" fontAlgn="b">
-                        <a:buNone/>
-                      </a:pPr>
-                      <a:r>
-                        <a:rPr lang="en-GB" sz="2200" b="0" i="0" u="none" strike="noStrike">
-                          <a:solidFill>
-                            <a:srgbClr val="000000"/>
-                          </a:solidFill>
-                          <a:effectLst/>
-                          <a:latin typeface="Aptos Narrow" panose="020B0004020202020204" pitchFamily="34" charset="0"/>
-                        </a:rPr>
-                        <a:t>Likes Given</a:t>
-                      </a:r>
-                    </a:p>
-                  </a:txBody>
-                  <a:tcPr marL="9525" marR="9525" marT="9525" marB="0" anchor="b"/>
-                </a:tc>
-                <a:tc>
-                  <a:txBody>
-                    <a:bodyPr/>
-                    <a:lstStyle/>
-                    <a:p>
-                      <a:pPr algn="l" fontAlgn="b">
-                        <a:buNone/>
-                      </a:pPr>
-                      <a:r>
-                        <a:rPr lang="en-CH" sz="2200" b="0" i="0" u="none" strike="noStrike">
-                          <a:solidFill>
-                            <a:srgbClr val="000000"/>
-                          </a:solidFill>
-                          <a:effectLst/>
-                          <a:latin typeface="Aptos Narrow" panose="020B0004020202020204" pitchFamily="34" charset="0"/>
-                        </a:rPr>
-                        <a:t>0</a:t>
-                      </a:r>
-                    </a:p>
-                  </a:txBody>
-                  <a:tcPr marL="9525" marR="9525" marT="9525" marB="0" anchor="b"/>
-                </a:tc>
-                <a:tc>
-                  <a:txBody>
-                    <a:bodyPr/>
-                    <a:lstStyle/>
-                    <a:p>
-                      <a:pPr algn="l" fontAlgn="b">
-                        <a:buNone/>
-                      </a:pPr>
-                      <a:r>
-                        <a:rPr lang="en-CH" sz="2200" b="0" i="0" u="none" strike="noStrike">
-                          <a:solidFill>
-                            <a:srgbClr val="000000"/>
-                          </a:solidFill>
-                          <a:effectLst/>
-                          <a:latin typeface="Aptos Narrow" panose="020B0004020202020204" pitchFamily="34" charset="0"/>
-                        </a:rPr>
-                        <a:t>15739</a:t>
-                      </a:r>
-                    </a:p>
-                  </a:txBody>
-                  <a:tcPr marL="9525" marR="9525" marT="9525" marB="0" anchor="b"/>
-                </a:tc>
-                <a:tc>
-                  <a:txBody>
-                    <a:bodyPr/>
-                    <a:lstStyle/>
-                    <a:p>
-                      <a:pPr algn="l" fontAlgn="b">
-                        <a:buNone/>
-                      </a:pPr>
-                      <a:r>
-                        <a:rPr lang="en-CH" sz="2200" b="0" i="0" u="none" strike="noStrike">
-                          <a:solidFill>
-                            <a:srgbClr val="000000"/>
-                          </a:solidFill>
-                          <a:effectLst/>
-                          <a:latin typeface="Aptos Narrow" panose="020B0004020202020204" pitchFamily="34" charset="0"/>
-                        </a:rPr>
-                        <a:t>51.61</a:t>
-                      </a:r>
-                    </a:p>
-                  </a:txBody>
-                  <a:tcPr marL="9525" marR="9525" marT="9525" marB="0" anchor="b"/>
-                </a:tc>
-                <a:extLst>
-                  <a:ext uri="{0D108BD9-81ED-4DB2-BD59-A6C34878D82A}">
-                    <a16:rowId xmlns:a16="http://schemas.microsoft.com/office/drawing/2014/main" val="1554292978"/>
-                  </a:ext>
-                </a:extLst>
-              </a:tr>
-              <a:tr h="711775">
-                <a:tc>
-                  <a:txBody>
-                    <a:bodyPr/>
-                    <a:lstStyle/>
-                    <a:p>
-                      <a:pPr algn="l" fontAlgn="b">
-                        <a:buNone/>
-                      </a:pPr>
-                      <a:r>
-                        <a:rPr lang="en-GB" sz="2200" b="0" i="0" u="none" strike="noStrike" dirty="0">
-                          <a:solidFill>
-                            <a:srgbClr val="000000"/>
-                          </a:solidFill>
-                          <a:effectLst/>
-                          <a:latin typeface="Aptos Narrow" panose="020B0004020202020204" pitchFamily="34" charset="0"/>
-                        </a:rPr>
-                        <a:t>Comments Received per Post (on average)</a:t>
-                      </a:r>
-                    </a:p>
-                  </a:txBody>
-                  <a:tcPr marL="9525" marR="9525" marT="9525" marB="0" anchor="b"/>
-                </a:tc>
-                <a:tc>
-                  <a:txBody>
-                    <a:bodyPr/>
-                    <a:lstStyle/>
-                    <a:p>
-                      <a:pPr algn="l" fontAlgn="b">
-                        <a:buNone/>
-                      </a:pPr>
-                      <a:r>
-                        <a:rPr lang="en-CH" sz="2200" b="0" i="0" u="none" strike="noStrike">
-                          <a:solidFill>
-                            <a:srgbClr val="000000"/>
-                          </a:solidFill>
-                          <a:effectLst/>
-                          <a:latin typeface="Aptos Narrow" panose="020B0004020202020204" pitchFamily="34" charset="0"/>
-                        </a:rPr>
-                        <a:t>0.99</a:t>
-                      </a:r>
-                    </a:p>
-                  </a:txBody>
-                  <a:tcPr marL="9525" marR="9525" marT="9525" marB="0" anchor="b"/>
-                </a:tc>
-                <a:tc>
-                  <a:txBody>
-                    <a:bodyPr/>
-                    <a:lstStyle/>
-                    <a:p>
-                      <a:pPr algn="l" fontAlgn="b">
-                        <a:buNone/>
-                      </a:pPr>
-                      <a:r>
-                        <a:rPr lang="en-CH" sz="2200" b="0" i="0" u="none" strike="noStrike" dirty="0">
-                          <a:solidFill>
-                            <a:srgbClr val="000000"/>
-                          </a:solidFill>
-                          <a:effectLst/>
-                          <a:latin typeface="Aptos Narrow" panose="020B0004020202020204" pitchFamily="34" charset="0"/>
-                        </a:rPr>
-                        <a:t>8591</a:t>
-                      </a:r>
-                    </a:p>
-                  </a:txBody>
-                  <a:tcPr marL="9525" marR="9525" marT="9525" marB="0" anchor="b"/>
-                </a:tc>
-                <a:tc>
-                  <a:txBody>
-                    <a:bodyPr/>
-                    <a:lstStyle/>
-                    <a:p>
-                      <a:pPr algn="l" fontAlgn="b">
-                        <a:buNone/>
-                      </a:pPr>
-                      <a:r>
-                        <a:rPr lang="en-CH" sz="2200" b="0" i="0" u="none" strike="noStrike" dirty="0">
-                          <a:solidFill>
-                            <a:srgbClr val="000000"/>
-                          </a:solidFill>
-                          <a:effectLst/>
-                          <a:latin typeface="Aptos Narrow" panose="020B0004020202020204" pitchFamily="34" charset="0"/>
-                        </a:rPr>
-                        <a:t>1.76</a:t>
-                      </a:r>
-                    </a:p>
-                  </a:txBody>
-                  <a:tcPr marL="9525" marR="9525" marT="9525" marB="0" anchor="b"/>
-                </a:tc>
-                <a:extLst>
-                  <a:ext uri="{0D108BD9-81ED-4DB2-BD59-A6C34878D82A}">
-                    <a16:rowId xmlns:a16="http://schemas.microsoft.com/office/drawing/2014/main" val="2399198692"/>
-                  </a:ext>
-                </a:extLst>
-              </a:tr>
-              <a:tr h="0">
-                <a:tc>
-                  <a:txBody>
-                    <a:bodyPr/>
-                    <a:lstStyle/>
-                    <a:p>
-                      <a:pPr algn="l" fontAlgn="b">
-                        <a:buNone/>
-                      </a:pPr>
-                      <a:r>
-                        <a:rPr lang="en-GB" sz="2200" b="1" i="0" u="none" strike="noStrike">
-                          <a:solidFill>
-                            <a:srgbClr val="000000"/>
-                          </a:solidFill>
-                          <a:effectLst/>
-                          <a:latin typeface="Aptos Narrow" panose="020B0004020202020204" pitchFamily="34" charset="0"/>
-                        </a:rPr>
-                        <a:t>Comments Given</a:t>
-                      </a:r>
-                    </a:p>
-                  </a:txBody>
-                  <a:tcPr marL="9525" marR="9525" marT="9525" marB="0" anchor="b"/>
-                </a:tc>
-                <a:tc>
-                  <a:txBody>
-                    <a:bodyPr/>
-                    <a:lstStyle/>
-                    <a:p>
-                      <a:pPr algn="l" fontAlgn="b">
-                        <a:buNone/>
-                      </a:pPr>
-                      <a:r>
-                        <a:rPr lang="en-CH" sz="2200" b="1" i="0" u="none" strike="noStrike">
-                          <a:solidFill>
-                            <a:srgbClr val="000000"/>
-                          </a:solidFill>
-                          <a:effectLst/>
-                          <a:latin typeface="Aptos Narrow" panose="020B0004020202020204" pitchFamily="34" charset="0"/>
-                        </a:rPr>
-                        <a:t>8,205.0</a:t>
-                      </a:r>
-                    </a:p>
-                  </a:txBody>
-                  <a:tcPr marL="9525" marR="9525" marT="9525" marB="0" anchor="b"/>
-                </a:tc>
-                <a:tc>
-                  <a:txBody>
-                    <a:bodyPr/>
-                    <a:lstStyle/>
-                    <a:p>
-                      <a:pPr algn="l" fontAlgn="b">
-                        <a:buNone/>
-                      </a:pPr>
-                      <a:r>
-                        <a:rPr lang="en-CH" sz="2200" b="1" i="0" u="none" strike="noStrike" dirty="0">
-                          <a:solidFill>
-                            <a:srgbClr val="000000"/>
-                          </a:solidFill>
-                          <a:effectLst/>
-                          <a:latin typeface="Aptos Narrow" panose="020B0004020202020204" pitchFamily="34" charset="0"/>
-                        </a:rPr>
-                        <a:t>5</a:t>
-                      </a:r>
-                    </a:p>
-                  </a:txBody>
-                  <a:tcPr marL="9525" marR="9525" marT="9525" marB="0" anchor="b"/>
-                </a:tc>
-                <a:tc>
-                  <a:txBody>
-                    <a:bodyPr/>
-                    <a:lstStyle/>
-                    <a:p>
-                      <a:pPr algn="l" fontAlgn="b">
-                        <a:buNone/>
-                      </a:pPr>
-                      <a:r>
-                        <a:rPr lang="en-CH" sz="2200" b="1" i="0" u="none" strike="noStrike" dirty="0">
-                          <a:solidFill>
-                            <a:srgbClr val="000000"/>
-                          </a:solidFill>
-                          <a:effectLst/>
-                          <a:latin typeface="Aptos Narrow" panose="020B0004020202020204" pitchFamily="34" charset="0"/>
-                        </a:rPr>
-                        <a:t>0</a:t>
-                      </a:r>
-                    </a:p>
-                  </a:txBody>
-                  <a:tcPr marL="9525" marR="9525" marT="9525" marB="0" anchor="b"/>
-                </a:tc>
-                <a:extLst>
-                  <a:ext uri="{0D108BD9-81ED-4DB2-BD59-A6C34878D82A}">
-                    <a16:rowId xmlns:a16="http://schemas.microsoft.com/office/drawing/2014/main" val="38688272"/>
-                  </a:ext>
-                </a:extLst>
-              </a:tr>
-            </a:tbl>
-          </a:graphicData>
-        </a:graphic>
-      </p:graphicFrame>
-      <p:sp>
-        <p:nvSpPr>
-          <p:cNvPr id="4" name="Slide Number Placeholder 3">
-            <a:extLst>
-              <a:ext uri="{FF2B5EF4-FFF2-40B4-BE49-F238E27FC236}">
-                <a16:creationId xmlns:a16="http://schemas.microsoft.com/office/drawing/2014/main" id="{24F6DF1E-F39B-81EC-242A-C423F5DCB016}"/>
-              </a:ext>
-            </a:extLst>
-          </p:cNvPr>
-          <p:cNvSpPr>
-            <a:spLocks noGrp="1"/>
-          </p:cNvSpPr>
-          <p:nvPr>
-            <p:ph type="sldNum" sz="quarter" idx="12"/>
-          </p:nvPr>
-        </p:nvSpPr>
-        <p:spPr/>
-        <p:txBody>
-          <a:bodyPr/>
-          <a:lstStyle/>
-          <a:p>
-            <a:fld id="{ABC65B0B-110A-D646-808D-174EFAE956EB}" type="slidenum">
-              <a:rPr lang="en-CH" smtClean="0"/>
-              <a:t>18</a:t>
-            </a:fld>
-            <a:endParaRPr lang="en-CH"/>
-          </a:p>
-        </p:txBody>
-      </p:sp>
-      <p:sp>
-        <p:nvSpPr>
-          <p:cNvPr id="6" name="TextBox 5">
-            <a:extLst>
-              <a:ext uri="{FF2B5EF4-FFF2-40B4-BE49-F238E27FC236}">
-                <a16:creationId xmlns:a16="http://schemas.microsoft.com/office/drawing/2014/main" id="{74CF634E-6DF0-9259-C895-653D2BC40691}"/>
-              </a:ext>
-            </a:extLst>
-          </p:cNvPr>
-          <p:cNvSpPr txBox="1"/>
-          <p:nvPr/>
-        </p:nvSpPr>
-        <p:spPr>
-          <a:xfrm>
-            <a:off x="838199" y="6123543"/>
-            <a:ext cx="11190884" cy="430887"/>
-          </a:xfrm>
-          <a:prstGeom prst="rect">
-            <a:avLst/>
-          </a:prstGeom>
-          <a:noFill/>
-        </p:spPr>
-        <p:txBody>
-          <a:bodyPr wrap="none" rtlCol="0">
-            <a:spAutoFit/>
-          </a:bodyPr>
-          <a:lstStyle/>
-          <a:p>
-            <a:r>
-              <a:rPr lang="en-CH" sz="2200" dirty="0"/>
-              <a:t>Algorithms that detected outlier: Multivariate Gaussian, kMeans, kNN, PCA Reconstruction</a:t>
-            </a:r>
-          </a:p>
-        </p:txBody>
-      </p:sp>
-    </p:spTree>
-    <p:extLst>
-      <p:ext uri="{BB962C8B-B14F-4D97-AF65-F5344CB8AC3E}">
-        <p14:creationId xmlns:p14="http://schemas.microsoft.com/office/powerpoint/2010/main" val="77309376"/>
-      </p:ext>
-    </p:extLst>
-  </p:cSld>
-  <p:clrMapOvr>
-    <a:masterClrMapping/>
-  </p:clrMapOvr>
-</p:sld>
-</file>
-
-<file path=ppt/slides/slide19.xml><?xml version="1.0" encoding="utf-8"?>
-<p:sld xmlns:a="http://schemas.openxmlformats.org/drawingml/2006/main" xmlns:r="http://schemas.openxmlformats.org/officeDocument/2006/relationships" xmlns:p="http://schemas.openxmlformats.org/presentationml/2006/main">
-  <p:cSld>
-    <p:spTree>
-      <p:nvGrpSpPr>
-        <p:cNvPr id="1" name=""/>
-        <p:cNvGrpSpPr/>
-        <p:nvPr/>
-      </p:nvGrpSpPr>
-      <p:grpSpPr>
-        <a:xfrm>
-          <a:off x="0" y="0"/>
-          <a:ext cx="0" cy="0"/>
-          <a:chOff x="0" y="0"/>
-          <a:chExt cx="0" cy="0"/>
-        </a:xfrm>
-      </p:grpSpPr>
-      <p:sp>
-        <p:nvSpPr>
-          <p:cNvPr id="2" name="Title 1">
-            <a:extLst>
-              <a:ext uri="{FF2B5EF4-FFF2-40B4-BE49-F238E27FC236}">
-                <a16:creationId xmlns:a16="http://schemas.microsoft.com/office/drawing/2014/main" id="{C2605974-D443-B586-7BE7-A694286ADB3A}"/>
-              </a:ext>
-            </a:extLst>
-          </p:cNvPr>
-          <p:cNvSpPr>
-            <a:spLocks noGrp="1"/>
-          </p:cNvSpPr>
-          <p:nvPr>
-            <p:ph type="title"/>
-          </p:nvPr>
-        </p:nvSpPr>
-        <p:spPr/>
-        <p:txBody>
-          <a:bodyPr>
-            <a:normAutofit/>
-          </a:bodyPr>
-          <a:lstStyle/>
-          <a:p>
-            <a:r>
-              <a:rPr lang="en-CH" sz="3600" dirty="0"/>
-              <a:t>Outlier User ”</a:t>
-            </a:r>
-            <a:r>
-              <a:rPr lang="en-GB" sz="3600" dirty="0"/>
-              <a:t> </a:t>
-            </a:r>
-            <a:r>
-              <a:rPr lang="en-GB" sz="3600" dirty="0" err="1"/>
-              <a:t>newsportugal</a:t>
-            </a:r>
-            <a:r>
-              <a:rPr lang="en-GB" sz="3600" dirty="0"/>
-              <a:t>” – Automated News Feed</a:t>
-            </a:r>
-            <a:endParaRPr lang="en-CH" sz="3600" dirty="0"/>
-          </a:p>
-        </p:txBody>
-      </p:sp>
-      <p:sp>
-        <p:nvSpPr>
-          <p:cNvPr id="4" name="Rectangle 1">
-            <a:extLst>
-              <a:ext uri="{FF2B5EF4-FFF2-40B4-BE49-F238E27FC236}">
-                <a16:creationId xmlns:a16="http://schemas.microsoft.com/office/drawing/2014/main" id="{922D707A-B55A-561A-7956-A6B1A56A5CA6}"/>
-              </a:ext>
-            </a:extLst>
-          </p:cNvPr>
-          <p:cNvSpPr>
-            <a:spLocks noChangeArrowheads="1"/>
-          </p:cNvSpPr>
-          <p:nvPr/>
-        </p:nvSpPr>
-        <p:spPr bwMode="auto">
-          <a:xfrm>
-            <a:off x="0" y="0"/>
-            <a:ext cx="12192000" cy="0"/>
-          </a:xfrm>
-          <a:prstGeom prst="rect">
-            <a:avLst/>
-          </a:prstGeom>
-          <a:noFill/>
-          <a:ln>
-            <a:noFill/>
-          </a:ln>
-          <a:effectLst/>
-          <a:extLst>
-            <a:ext uri="{909E8E84-426E-40DD-AFC4-6F175D3DCCD1}">
-              <a14:hiddenFill xmlns:a14="http://schemas.microsoft.com/office/drawing/2010/main">
-                <a:solidFill>
-                  <a:schemeClr val="accent1"/>
-                </a:solidFill>
-              </a14:hiddenFill>
-            </a:ext>
-            <a:ext uri="{91240B29-F687-4F45-9708-019B960494DF}">
-              <a14:hiddenLine xmlns:a14="http://schemas.microsoft.com/office/drawing/2010/main" w="9525">
-                <a:solidFill>
-                  <a:schemeClr val="tx1"/>
-                </a:solidFill>
-                <a:miter lim="800000"/>
-                <a:headEnd/>
-                <a:tailEnd/>
-              </a14:hiddenLine>
-            </a:ext>
-            <a:ext uri="{AF507438-7753-43E0-B8FC-AC1667EBCBE1}">
-              <a14:hiddenEffects xmlns:a14="http://schemas.microsoft.com/office/drawing/2010/main">
-                <a:effectLst>
-                  <a:outerShdw dist="35921" dir="2700000" algn="ctr" rotWithShape="0">
-                    <a:schemeClr val="bg2"/>
-                  </a:outerShdw>
-                </a:effectLst>
-              </a14:hiddenEffects>
-            </a:ext>
-          </a:extLst>
-        </p:spPr>
-        <p:txBody>
-          <a:bodyPr vert="horz" wrap="none" lIns="91440" tIns="45720" rIns="91440" bIns="45720" numCol="1" anchor="ctr" anchorCtr="0" compatLnSpc="1">
-            <a:prstTxWarp prst="textNoShape">
-              <a:avLst/>
-            </a:prstTxWarp>
-            <a:spAutoFit/>
-          </a:bodyPr>
-          <a:lstStyle/>
-          <a:p>
-            <a:endParaRPr lang="en-CH"/>
-          </a:p>
-        </p:txBody>
-      </p:sp>
-      <p:graphicFrame>
-        <p:nvGraphicFramePr>
-          <p:cNvPr id="7" name="Table 6">
-            <a:extLst>
-              <a:ext uri="{FF2B5EF4-FFF2-40B4-BE49-F238E27FC236}">
-                <a16:creationId xmlns:a16="http://schemas.microsoft.com/office/drawing/2014/main" id="{A9C4E8A1-F86D-38AF-1EEB-D69D7E4A7627}"/>
-              </a:ext>
-            </a:extLst>
-          </p:cNvPr>
-          <p:cNvGraphicFramePr>
-            <a:graphicFrameLocks noGrp="1"/>
-          </p:cNvGraphicFramePr>
-          <p:nvPr>
-            <p:extLst>
-              <p:ext uri="{D42A27DB-BD31-4B8C-83A1-F6EECF244321}">
-                <p14:modId xmlns:p14="http://schemas.microsoft.com/office/powerpoint/2010/main" val="2884386824"/>
+                <p14:modId xmlns:p14="http://schemas.microsoft.com/office/powerpoint/2010/main" val="886535129"/>
               </p:ext>
             </p:extLst>
           </p:nvPr>
@@ -9723,7 +8859,7 @@
                         <a:buNone/>
                       </a:pPr>
                       <a:r>
-                        <a:rPr lang="en-GB" sz="2200" b="0" i="0" u="none" strike="noStrike">
+                        <a:rPr lang="en-GB" sz="1800" b="0" i="0" u="none" strike="noStrike">
                           <a:solidFill>
                             <a:srgbClr val="000000"/>
                           </a:solidFill>
@@ -9745,14 +8881,14 @@
                         <a:buNone/>
                       </a:pPr>
                       <a:r>
-                        <a:rPr lang="en-CH" sz="2200" b="0" i="0" u="none" strike="noStrike">
-                          <a:solidFill>
-                            <a:srgbClr val="000000"/>
-                          </a:solidFill>
-                          <a:effectLst/>
-                          <a:latin typeface="Aptos Narrow" panose="020B0004020202020204" pitchFamily="34" charset="0"/>
-                        </a:rPr>
-                        <a:t>645</a:t>
+                        <a:rPr lang="en-CH" sz="1800" b="0" i="0" u="none" strike="noStrike">
+                          <a:solidFill>
+                            <a:srgbClr val="000000"/>
+                          </a:solidFill>
+                          <a:effectLst/>
+                          <a:latin typeface="Aptos Narrow" panose="020B0004020202020204" pitchFamily="34" charset="0"/>
+                        </a:rPr>
+                        <a:t>2,135.0</a:t>
                       </a:r>
                     </a:p>
                   </a:txBody>
@@ -9767,14 +8903,14 @@
                         <a:buNone/>
                       </a:pPr>
                       <a:r>
-                        <a:rPr lang="en-CH" sz="2200" b="0" i="0" u="none" strike="noStrike">
-                          <a:solidFill>
-                            <a:srgbClr val="000000"/>
-                          </a:solidFill>
-                          <a:effectLst/>
-                          <a:latin typeface="Aptos Narrow" panose="020B0004020202020204" pitchFamily="34" charset="0"/>
-                        </a:rPr>
-                        <a:t>4568</a:t>
+                        <a:rPr lang="en-CH" sz="1800" b="0" i="0" u="none" strike="noStrike">
+                          <a:solidFill>
+                            <a:srgbClr val="000000"/>
+                          </a:solidFill>
+                          <a:effectLst/>
+                          <a:latin typeface="Aptos Narrow" panose="020B0004020202020204" pitchFamily="34" charset="0"/>
+                        </a:rPr>
+                        <a:t>688</a:t>
                       </a:r>
                     </a:p>
                   </a:txBody>
@@ -9789,14 +8925,14 @@
                         <a:buNone/>
                       </a:pPr>
                       <a:r>
-                        <a:rPr lang="en-CH" sz="2200" b="0" i="0" u="none" strike="noStrike">
-                          <a:solidFill>
-                            <a:srgbClr val="000000"/>
-                          </a:solidFill>
-                          <a:effectLst/>
-                          <a:latin typeface="Aptos Narrow" panose="020B0004020202020204" pitchFamily="34" charset="0"/>
-                        </a:rPr>
-                        <a:t>0.94</a:t>
+                        <a:rPr lang="en-CH" sz="1800" b="1" i="0" u="none" strike="noStrike" dirty="0">
+                          <a:solidFill>
+                            <a:srgbClr val="000000"/>
+                          </a:solidFill>
+                          <a:effectLst/>
+                          <a:latin typeface="Aptos Narrow" panose="020B0004020202020204" pitchFamily="34" charset="0"/>
+                        </a:rPr>
+                        <a:t>0.14</a:t>
                       </a:r>
                     </a:p>
                   </a:txBody>
@@ -9818,7 +8954,7 @@
                         <a:buNone/>
                       </a:pPr>
                       <a:r>
-                        <a:rPr lang="en-GB" sz="2200" b="0" i="0" u="none" strike="noStrike">
+                        <a:rPr lang="en-GB" sz="1800" b="0" i="0" u="none" strike="noStrike">
                           <a:solidFill>
                             <a:srgbClr val="000000"/>
                           </a:solidFill>
@@ -9840,14 +8976,14 @@
                         <a:buNone/>
                       </a:pPr>
                       <a:r>
-                        <a:rPr lang="en-CH" sz="2200" b="0" i="0" u="none" strike="noStrike">
-                          <a:solidFill>
-                            <a:srgbClr val="000000"/>
-                          </a:solidFill>
-                          <a:effectLst/>
-                          <a:latin typeface="Aptos Narrow" panose="020B0004020202020204" pitchFamily="34" charset="0"/>
-                        </a:rPr>
-                        <a:t>55</a:t>
+                        <a:rPr lang="en-CH" sz="1800" b="0" i="0" u="none" strike="noStrike">
+                          <a:solidFill>
+                            <a:srgbClr val="000000"/>
+                          </a:solidFill>
+                          <a:effectLst/>
+                          <a:latin typeface="Aptos Narrow" panose="020B0004020202020204" pitchFamily="34" charset="0"/>
+                        </a:rPr>
+                        <a:t>1,282.0</a:t>
                       </a:r>
                     </a:p>
                   </a:txBody>
@@ -9862,14 +8998,14 @@
                         <a:buNone/>
                       </a:pPr>
                       <a:r>
-                        <a:rPr lang="en-CH" sz="2200" b="0" i="0" u="none" strike="noStrike">
-                          <a:solidFill>
-                            <a:srgbClr val="000000"/>
-                          </a:solidFill>
-                          <a:effectLst/>
-                          <a:latin typeface="Aptos Narrow" panose="020B0004020202020204" pitchFamily="34" charset="0"/>
-                        </a:rPr>
-                        <a:t>47086</a:t>
+                        <a:rPr lang="en-CH" sz="1800" b="0" i="0" u="none" strike="noStrike">
+                          <a:solidFill>
+                            <a:srgbClr val="000000"/>
+                          </a:solidFill>
+                          <a:effectLst/>
+                          <a:latin typeface="Aptos Narrow" panose="020B0004020202020204" pitchFamily="34" charset="0"/>
+                        </a:rPr>
+                        <a:t>1371</a:t>
                       </a:r>
                     </a:p>
                   </a:txBody>
@@ -9884,14 +9020,14 @@
                         <a:buNone/>
                       </a:pPr>
                       <a:r>
-                        <a:rPr lang="en-CH" sz="2200" b="0" i="0" u="none" strike="noStrike">
-                          <a:solidFill>
-                            <a:srgbClr val="000000"/>
-                          </a:solidFill>
-                          <a:effectLst/>
-                          <a:latin typeface="Aptos Narrow" panose="020B0004020202020204" pitchFamily="34" charset="0"/>
-                        </a:rPr>
-                        <a:t>9.71</a:t>
+                        <a:rPr lang="en-CH" sz="1800" b="1" i="0" u="none" strike="noStrike" dirty="0">
+                          <a:solidFill>
+                            <a:srgbClr val="000000"/>
+                          </a:solidFill>
+                          <a:effectLst/>
+                          <a:latin typeface="Aptos Narrow" panose="020B0004020202020204" pitchFamily="34" charset="0"/>
+                        </a:rPr>
+                        <a:t>0.28</a:t>
                       </a:r>
                     </a:p>
                   </a:txBody>
@@ -9913,7 +9049,7 @@
                         <a:buNone/>
                       </a:pPr>
                       <a:r>
-                        <a:rPr lang="en-GB" sz="2200" b="1" i="0" u="none" strike="noStrike">
+                        <a:rPr lang="en-GB" sz="1800" b="0" i="0" u="none" strike="noStrike">
                           <a:solidFill>
                             <a:srgbClr val="000000"/>
                           </a:solidFill>
@@ -9935,14 +9071,14 @@
                         <a:buNone/>
                       </a:pPr>
                       <a:r>
-                        <a:rPr lang="en-CH" sz="2200" b="1" i="0" u="none" strike="noStrike">
-                          <a:solidFill>
-                            <a:srgbClr val="000000"/>
-                          </a:solidFill>
-                          <a:effectLst/>
-                          <a:latin typeface="Aptos Narrow" panose="020B0004020202020204" pitchFamily="34" charset="0"/>
-                        </a:rPr>
-                        <a:t>16,258.0</a:t>
+                        <a:rPr lang="en-CH" sz="1800" b="0" i="0" u="none" strike="noStrike">
+                          <a:solidFill>
+                            <a:srgbClr val="000000"/>
+                          </a:solidFill>
+                          <a:effectLst/>
+                          <a:latin typeface="Aptos Narrow" panose="020B0004020202020204" pitchFamily="34" charset="0"/>
+                        </a:rPr>
+                        <a:t>329</a:t>
                       </a:r>
                     </a:p>
                   </a:txBody>
@@ -9957,14 +9093,14 @@
                         <a:buNone/>
                       </a:pPr>
                       <a:r>
-                        <a:rPr lang="en-CH" sz="2200" b="1" i="0" u="none" strike="noStrike">
-                          <a:solidFill>
-                            <a:srgbClr val="000000"/>
-                          </a:solidFill>
-                          <a:effectLst/>
-                          <a:latin typeface="Aptos Narrow" panose="020B0004020202020204" pitchFamily="34" charset="0"/>
-                        </a:rPr>
-                        <a:t>8</a:t>
+                        <a:rPr lang="en-CH" sz="1800" b="0" i="0" u="none" strike="noStrike">
+                          <a:solidFill>
+                            <a:srgbClr val="000000"/>
+                          </a:solidFill>
+                          <a:effectLst/>
+                          <a:latin typeface="Aptos Narrow" panose="020B0004020202020204" pitchFamily="34" charset="0"/>
+                        </a:rPr>
+                        <a:t>4851</a:t>
                       </a:r>
                     </a:p>
                   </a:txBody>
@@ -9979,14 +9115,14 @@
                         <a:buNone/>
                       </a:pPr>
                       <a:r>
-                        <a:rPr lang="en-CH" sz="2200" b="1" i="0" u="none" strike="noStrike" dirty="0">
-                          <a:solidFill>
-                            <a:srgbClr val="000000"/>
-                          </a:solidFill>
-                          <a:effectLst/>
-                          <a:latin typeface="Aptos Narrow" panose="020B0004020202020204" pitchFamily="34" charset="0"/>
-                        </a:rPr>
-                        <a:t>0</a:t>
+                        <a:rPr lang="en-CH" sz="1800" b="1" i="0" u="none" strike="noStrike">
+                          <a:solidFill>
+                            <a:srgbClr val="000000"/>
+                          </a:solidFill>
+                          <a:effectLst/>
+                          <a:latin typeface="Aptos Narrow" panose="020B0004020202020204" pitchFamily="34" charset="0"/>
+                        </a:rPr>
+                        <a:t>1</a:t>
                       </a:r>
                     </a:p>
                   </a:txBody>
@@ -10008,7 +9144,7 @@
                         <a:buNone/>
                       </a:pPr>
                       <a:r>
-                        <a:rPr lang="en-GB" sz="2200" b="0" i="0" u="none" strike="noStrike">
+                        <a:rPr lang="en-GB" sz="1800" b="0" i="0" u="none" strike="noStrike">
                           <a:solidFill>
                             <a:srgbClr val="000000"/>
                           </a:solidFill>
@@ -10030,14 +9166,14 @@
                         <a:buNone/>
                       </a:pPr>
                       <a:r>
-                        <a:rPr lang="en-CH" sz="2200" b="0" i="0" u="none" strike="noStrike">
-                          <a:solidFill>
-                            <a:srgbClr val="000000"/>
-                          </a:solidFill>
-                          <a:effectLst/>
-                          <a:latin typeface="Aptos Narrow" panose="020B0004020202020204" pitchFamily="34" charset="0"/>
-                        </a:rPr>
-                        <a:t>0</a:t>
+                        <a:rPr lang="en-CH" sz="1800" b="0" i="0" u="none" strike="noStrike">
+                          <a:solidFill>
+                            <a:srgbClr val="000000"/>
+                          </a:solidFill>
+                          <a:effectLst/>
+                          <a:latin typeface="Aptos Narrow" panose="020B0004020202020204" pitchFamily="34" charset="0"/>
+                        </a:rPr>
+                        <a:t>0.72</a:t>
                       </a:r>
                     </a:p>
                   </a:txBody>
@@ -10052,14 +9188,14 @@
                         <a:buNone/>
                       </a:pPr>
                       <a:r>
-                        <a:rPr lang="en-CH" sz="2200" b="0" i="0" u="none" strike="noStrike">
-                          <a:solidFill>
-                            <a:srgbClr val="000000"/>
-                          </a:solidFill>
-                          <a:effectLst/>
-                          <a:latin typeface="Aptos Narrow" panose="020B0004020202020204" pitchFamily="34" charset="0"/>
-                        </a:rPr>
-                        <a:t>15911</a:t>
+                        <a:rPr lang="en-CH" sz="1800" b="0" i="0" u="none" strike="noStrike">
+                          <a:solidFill>
+                            <a:srgbClr val="000000"/>
+                          </a:solidFill>
+                          <a:effectLst/>
+                          <a:latin typeface="Aptos Narrow" panose="020B0004020202020204" pitchFamily="34" charset="0"/>
+                        </a:rPr>
+                        <a:t>2646</a:t>
                       </a:r>
                     </a:p>
                   </a:txBody>
@@ -10074,14 +9210,14 @@
                         <a:buNone/>
                       </a:pPr>
                       <a:r>
-                        <a:rPr lang="en-CH" sz="2200" b="0" i="0" u="none" strike="noStrike">
-                          <a:solidFill>
-                            <a:srgbClr val="000000"/>
-                          </a:solidFill>
-                          <a:effectLst/>
-                          <a:latin typeface="Aptos Narrow" panose="020B0004020202020204" pitchFamily="34" charset="0"/>
-                        </a:rPr>
-                        <a:t>3.26</a:t>
+                        <a:rPr lang="en-CH" sz="1800" b="1" i="0" u="none" strike="noStrike" dirty="0">
+                          <a:solidFill>
+                            <a:srgbClr val="000000"/>
+                          </a:solidFill>
+                          <a:effectLst/>
+                          <a:latin typeface="Aptos Narrow" panose="020B0004020202020204" pitchFamily="34" charset="0"/>
+                        </a:rPr>
+                        <a:t>0.54</a:t>
                       </a:r>
                     </a:p>
                   </a:txBody>
@@ -10103,7 +9239,7 @@
                         <a:buNone/>
                       </a:pPr>
                       <a:r>
-                        <a:rPr lang="en-GB" sz="2200" b="0" i="0" u="none" strike="noStrike">
+                        <a:rPr lang="en-GB" sz="1800" b="0" i="0" u="none" strike="noStrike">
                           <a:solidFill>
                             <a:srgbClr val="000000"/>
                           </a:solidFill>
@@ -10125,7 +9261,51 @@
                         <a:buNone/>
                       </a:pPr>
                       <a:r>
-                        <a:rPr lang="en-CH" sz="2200" b="0" i="0" u="none" strike="noStrike">
+                        <a:rPr lang="en-CH" sz="1800" b="0" i="0" u="none" strike="noStrike">
+                          <a:solidFill>
+                            <a:srgbClr val="000000"/>
+                          </a:solidFill>
+                          <a:effectLst/>
+                          <a:latin typeface="Aptos Narrow" panose="020B0004020202020204" pitchFamily="34" charset="0"/>
+                        </a:rPr>
+                        <a:t>1,868.0</a:t>
+                      </a:r>
+                    </a:p>
+                  </a:txBody>
+                  <a:tcPr marL="9525" marR="9525" marT="9525" marB="0" anchor="b"/>
+                </a:tc>
+                <a:tc>
+                  <a:txBody>
+                    <a:bodyPr/>
+                    <a:lstStyle/>
+                    <a:p>
+                      <a:pPr algn="l" fontAlgn="b">
+                        <a:buNone/>
+                      </a:pPr>
+                      <a:r>
+                        <a:rPr lang="en-CH" sz="1800" b="0" i="0" u="none" strike="noStrike">
+                          <a:solidFill>
+                            <a:srgbClr val="000000"/>
+                          </a:solidFill>
+                          <a:effectLst/>
+                          <a:latin typeface="Aptos Narrow" panose="020B0004020202020204" pitchFamily="34" charset="0"/>
+                        </a:rPr>
+                        <a:t>12</a:t>
+                      </a:r>
+                    </a:p>
+                  </a:txBody>
+                  <a:tcPr marL="9525" marR="9525" marT="9525" marB="0" anchor="b"/>
+                </a:tc>
+                <a:tc>
+                  <a:txBody>
+                    <a:bodyPr/>
+                    <a:lstStyle/>
+                    <a:p>
+                      <a:pPr algn="l" fontAlgn="b">
+                        <a:buNone/>
+                      </a:pPr>
+                      <a:r>
+                        <a:rPr lang="en-CH" sz="1800" b="1" i="0" u="none" strike="noStrike" dirty="0">
                           <a:solidFill>
                             <a:srgbClr val="000000"/>
                           </a:solidFill>
@@ -10133,50 +9313,6 @@
                           <a:latin typeface="Aptos Narrow" panose="020B0004020202020204" pitchFamily="34" charset="0"/>
                         </a:rPr>
                         <a:t>0</a:t>
-                      </a:r>
-                    </a:p>
-                  </a:txBody>
-                  <a:tcPr marL="9525" marR="9525" marT="9525" marB="0" anchor="b"/>
-                </a:tc>
-                <a:tc>
-                  <a:txBody>
-                    <a:bodyPr/>
-                    <a:lstStyle/>
-                    <a:p>
-                      <a:pPr algn="l" fontAlgn="b">
-                        <a:buNone/>
-                      </a:pPr>
-                      <a:r>
-                        <a:rPr lang="en-CH" sz="2200" b="0" i="0" u="none" strike="noStrike">
-                          <a:solidFill>
-                            <a:srgbClr val="000000"/>
-                          </a:solidFill>
-                          <a:effectLst/>
-                          <a:latin typeface="Aptos Narrow" panose="020B0004020202020204" pitchFamily="34" charset="0"/>
-                        </a:rPr>
-                        <a:t>15739</a:t>
-                      </a:r>
-                    </a:p>
-                  </a:txBody>
-                  <a:tcPr marL="9525" marR="9525" marT="9525" marB="0" anchor="b"/>
-                </a:tc>
-                <a:tc>
-                  <a:txBody>
-                    <a:bodyPr/>
-                    <a:lstStyle/>
-                    <a:p>
-                      <a:pPr algn="l" fontAlgn="b">
-                        <a:buNone/>
-                      </a:pPr>
-                      <a:r>
-                        <a:rPr lang="en-CH" sz="2200" b="0" i="0" u="none" strike="noStrike">
-                          <a:solidFill>
-                            <a:srgbClr val="000000"/>
-                          </a:solidFill>
-                          <a:effectLst/>
-                          <a:latin typeface="Aptos Narrow" panose="020B0004020202020204" pitchFamily="34" charset="0"/>
-                        </a:rPr>
-                        <a:t>51.61</a:t>
                       </a:r>
                     </a:p>
                   </a:txBody>
@@ -10198,7 +9334,7 @@
                         <a:buNone/>
                       </a:pPr>
                       <a:r>
-                        <a:rPr lang="en-GB" sz="2200" b="0" i="0" u="none" strike="noStrike">
+                        <a:rPr lang="en-GB" sz="1800" b="0" i="0" u="none" strike="noStrike">
                           <a:solidFill>
                             <a:srgbClr val="000000"/>
                           </a:solidFill>
@@ -10220,14 +9356,14 @@
                         <a:buNone/>
                       </a:pPr>
                       <a:r>
-                        <a:rPr lang="en-CH" sz="2200" b="0" i="0" u="none" strike="noStrike">
-                          <a:solidFill>
-                            <a:srgbClr val="000000"/>
-                          </a:solidFill>
-                          <a:effectLst/>
-                          <a:latin typeface="Aptos Narrow" panose="020B0004020202020204" pitchFamily="34" charset="0"/>
-                        </a:rPr>
-                        <a:t>0.36</a:t>
+                        <a:rPr lang="en-CH" sz="1800" b="0" i="0" u="none" strike="noStrike">
+                          <a:solidFill>
+                            <a:srgbClr val="000000"/>
+                          </a:solidFill>
+                          <a:effectLst/>
+                          <a:latin typeface="Aptos Narrow" panose="020B0004020202020204" pitchFamily="34" charset="0"/>
+                        </a:rPr>
+                        <a:t>7.8</a:t>
                       </a:r>
                     </a:p>
                   </a:txBody>
@@ -10242,14 +9378,14 @@
                         <a:buNone/>
                       </a:pPr>
                       <a:r>
-                        <a:rPr lang="en-CH" sz="2200" b="0" i="0" u="none" strike="noStrike">
-                          <a:solidFill>
-                            <a:srgbClr val="000000"/>
-                          </a:solidFill>
-                          <a:effectLst/>
-                          <a:latin typeface="Aptos Narrow" panose="020B0004020202020204" pitchFamily="34" charset="0"/>
-                        </a:rPr>
-                        <a:t>17101</a:t>
+                        <a:rPr lang="en-CH" sz="1800" b="0" i="0" u="none" strike="noStrike">
+                          <a:solidFill>
+                            <a:srgbClr val="000000"/>
+                          </a:solidFill>
+                          <a:effectLst/>
+                          <a:latin typeface="Aptos Narrow" panose="020B0004020202020204" pitchFamily="34" charset="0"/>
+                        </a:rPr>
+                        <a:t>481</a:t>
                       </a:r>
                     </a:p>
                   </a:txBody>
@@ -10264,14 +9400,14 @@
                         <a:buNone/>
                       </a:pPr>
                       <a:r>
-                        <a:rPr lang="en-CH" sz="2200" b="0" i="0" u="none" strike="noStrike">
-                          <a:solidFill>
-                            <a:srgbClr val="000000"/>
-                          </a:solidFill>
-                          <a:effectLst/>
-                          <a:latin typeface="Aptos Narrow" panose="020B0004020202020204" pitchFamily="34" charset="0"/>
-                        </a:rPr>
-                        <a:t>3.5</a:t>
+                        <a:rPr lang="en-CH" sz="1800" b="1" i="0" u="none" strike="noStrike">
+                          <a:solidFill>
+                            <a:srgbClr val="000000"/>
+                          </a:solidFill>
+                          <a:effectLst/>
+                          <a:latin typeface="Aptos Narrow" panose="020B0004020202020204" pitchFamily="34" charset="0"/>
+                        </a:rPr>
+                        <a:t>0.1</a:t>
                       </a:r>
                     </a:p>
                   </a:txBody>
@@ -10293,7 +9429,7 @@
                         <a:buNone/>
                       </a:pPr>
                       <a:r>
-                        <a:rPr lang="en-GB" sz="2200" b="1" i="0" u="none" strike="noStrike" dirty="0">
+                        <a:rPr lang="en-GB" sz="1800" b="0" i="0" u="none" strike="noStrike">
                           <a:solidFill>
                             <a:srgbClr val="000000"/>
                           </a:solidFill>
@@ -10315,14 +9451,14 @@
                         <a:buNone/>
                       </a:pPr>
                       <a:r>
-                        <a:rPr lang="en-CH" sz="2200" b="1" i="0" u="none" strike="noStrike">
-                          <a:solidFill>
-                            <a:srgbClr val="000000"/>
-                          </a:solidFill>
-                          <a:effectLst/>
-                          <a:latin typeface="Aptos Narrow" panose="020B0004020202020204" pitchFamily="34" charset="0"/>
-                        </a:rPr>
-                        <a:t>5,893.0</a:t>
+                        <a:rPr lang="en-CH" sz="1800" b="0" i="0" u="none" strike="noStrike">
+                          <a:solidFill>
+                            <a:srgbClr val="000000"/>
+                          </a:solidFill>
+                          <a:effectLst/>
+                          <a:latin typeface="Aptos Narrow" panose="020B0004020202020204" pitchFamily="34" charset="0"/>
+                        </a:rPr>
+                        <a:t>2,201.0</a:t>
                       </a:r>
                     </a:p>
                   </a:txBody>
@@ -10337,14 +9473,14 @@
                         <a:buNone/>
                       </a:pPr>
                       <a:r>
-                        <a:rPr lang="en-CH" sz="2200" b="1" i="0" u="none" strike="noStrike">
-                          <a:solidFill>
-                            <a:srgbClr val="000000"/>
-                          </a:solidFill>
-                          <a:effectLst/>
-                          <a:latin typeface="Aptos Narrow" panose="020B0004020202020204" pitchFamily="34" charset="0"/>
-                        </a:rPr>
-                        <a:t>18</a:t>
+                        <a:rPr lang="en-CH" sz="1800" b="0" i="0" u="none" strike="noStrike">
+                          <a:solidFill>
+                            <a:srgbClr val="000000"/>
+                          </a:solidFill>
+                          <a:effectLst/>
+                          <a:latin typeface="Aptos Narrow" panose="020B0004020202020204" pitchFamily="34" charset="0"/>
+                        </a:rPr>
+                        <a:t>184</a:t>
                       </a:r>
                     </a:p>
                   </a:txBody>
@@ -10359,14 +9495,14 @@
                         <a:buNone/>
                       </a:pPr>
                       <a:r>
-                        <a:rPr lang="en-CH" sz="2200" b="1" i="0" u="none" strike="noStrike" dirty="0">
-                          <a:solidFill>
-                            <a:srgbClr val="000000"/>
-                          </a:solidFill>
-                          <a:effectLst/>
-                          <a:latin typeface="Aptos Narrow" panose="020B0004020202020204" pitchFamily="34" charset="0"/>
-                        </a:rPr>
-                        <a:t>0</a:t>
+                        <a:rPr lang="en-CH" sz="1800" b="1" i="0" u="none" strike="noStrike" dirty="0">
+                          <a:solidFill>
+                            <a:srgbClr val="000000"/>
+                          </a:solidFill>
+                          <a:effectLst/>
+                          <a:latin typeface="Aptos Narrow" panose="020B0004020202020204" pitchFamily="34" charset="0"/>
+                        </a:rPr>
+                        <a:t>0.04</a:t>
                       </a:r>
                     </a:p>
                   </a:txBody>
@@ -10384,10 +9520,10 @@
       </p:graphicFrame>
       <p:sp>
         <p:nvSpPr>
-          <p:cNvPr id="5" name="Slide Number Placeholder 4">
+          <p:cNvPr id="4" name="Slide Number Placeholder 3">
             <a:extLst>
               <a:ext uri="{FF2B5EF4-FFF2-40B4-BE49-F238E27FC236}">
-                <a16:creationId xmlns:a16="http://schemas.microsoft.com/office/drawing/2014/main" id="{65FCF259-A3B8-0B09-2077-DCBF032B5A92}"/>
+                <a16:creationId xmlns:a16="http://schemas.microsoft.com/office/drawing/2014/main" id="{48865E9B-F842-8230-DEF1-8171B552BFC0}"/>
               </a:ext>
             </a:extLst>
           </p:cNvPr>
@@ -10405,7 +9541,7 @@
           <a:p>
             <a:fld id="{ABC65B0B-110A-D646-808D-174EFAE956EB}" type="slidenum">
               <a:rPr lang="en-CH" smtClean="0"/>
-              <a:t>19</a:t>
+              <a:t>18</a:t>
             </a:fld>
             <a:endParaRPr lang="en-CH"/>
           </a:p>
@@ -10413,10 +9549,10 @@
       </p:sp>
       <p:sp>
         <p:nvSpPr>
-          <p:cNvPr id="10" name="TextBox 9">
+          <p:cNvPr id="6" name="TextBox 5">
             <a:extLst>
               <a:ext uri="{FF2B5EF4-FFF2-40B4-BE49-F238E27FC236}">
-                <a16:creationId xmlns:a16="http://schemas.microsoft.com/office/drawing/2014/main" id="{D03A484E-D911-491F-09E7-915E197B05AA}"/>
+                <a16:creationId xmlns:a16="http://schemas.microsoft.com/office/drawing/2014/main" id="{1B29E439-26B5-F06D-BFC6-C2DB227B93B9}"/>
               </a:ext>
             </a:extLst>
           </p:cNvPr>
@@ -10426,7 +9562,7 @@
         <p:spPr>
           <a:xfrm>
             <a:off x="838199" y="6123543"/>
-            <a:ext cx="11075020" cy="430887"/>
+            <a:ext cx="10325840" cy="430887"/>
           </a:xfrm>
           <a:prstGeom prst="rect">
             <a:avLst/>
@@ -10441,15 +9577,36 @@
           <a:p>
             <a:r>
               <a:rPr lang="en-CH" sz="2200" dirty="0"/>
-              <a:t>Algorithms that detected outlier: Multivariate Gaussian, kNN, iForest, PCA Reconstruction</a:t>
-            </a:r>
+              <a:t>Algorithms that detected outlier: </a:t>
+            </a:r>
+            <a:r>
+              <a:rPr lang="en-GB" sz="2200" dirty="0"/>
+              <a:t>Multivariate Gaussian, k-Means, </a:t>
+            </a:r>
+            <a:r>
+              <a:rPr lang="en-GB" sz="2200" dirty="0" err="1"/>
+              <a:t>kNN</a:t>
+            </a:r>
+            <a:r>
+              <a:rPr lang="en-GB" sz="2200" dirty="0"/>
+              <a:t>, </a:t>
+            </a:r>
+            <a:r>
+              <a:rPr lang="en-GB" sz="2200" dirty="0" err="1"/>
+              <a:t>iForest</a:t>
+            </a:r>
+            <a:r>
+              <a:rPr lang="en-GB" sz="2200" dirty="0"/>
+              <a:t>, PCA</a:t>
+            </a:r>
+            <a:endParaRPr lang="en-CH" sz="2200" dirty="0"/>
           </a:p>
         </p:txBody>
       </p:sp>
     </p:spTree>
     <p:extLst>
       <p:ext uri="{BB962C8B-B14F-4D97-AF65-F5344CB8AC3E}">
-        <p14:creationId xmlns:p14="http://schemas.microsoft.com/office/powerpoint/2010/main" val="3987355141"/>
+        <p14:creationId xmlns:p14="http://schemas.microsoft.com/office/powerpoint/2010/main" val="504298987"/>
       </p:ext>
     </p:extLst>
   </p:cSld>
@@ -10459,149 +9616,7 @@
 </p:sld>
 </file>
 
-<file path=ppt/slides/slide2.xml><?xml version="1.0" encoding="utf-8"?>
-<p:sld xmlns:a="http://schemas.openxmlformats.org/drawingml/2006/main" xmlns:r="http://schemas.openxmlformats.org/officeDocument/2006/relationships" xmlns:p="http://schemas.openxmlformats.org/presentationml/2006/main">
-  <p:cSld>
-    <p:spTree>
-      <p:nvGrpSpPr>
-        <p:cNvPr id="1" name=""/>
-        <p:cNvGrpSpPr/>
-        <p:nvPr/>
-      </p:nvGrpSpPr>
-      <p:grpSpPr>
-        <a:xfrm>
-          <a:off x="0" y="0"/>
-          <a:ext cx="0" cy="0"/>
-          <a:chOff x="0" y="0"/>
-          <a:chExt cx="0" cy="0"/>
-        </a:xfrm>
-      </p:grpSpPr>
-      <p:sp>
-        <p:nvSpPr>
-          <p:cNvPr id="2" name="Title 1">
-            <a:extLst>
-              <a:ext uri="{FF2B5EF4-FFF2-40B4-BE49-F238E27FC236}">
-                <a16:creationId xmlns:a16="http://schemas.microsoft.com/office/drawing/2014/main" id="{6B7CF60A-F9D9-624B-456F-8624123D69EA}"/>
-              </a:ext>
-            </a:extLst>
-          </p:cNvPr>
-          <p:cNvSpPr>
-            <a:spLocks noGrp="1"/>
-          </p:cNvSpPr>
-          <p:nvPr>
-            <p:ph type="title"/>
-          </p:nvPr>
-        </p:nvSpPr>
-        <p:spPr/>
-        <p:txBody>
-          <a:bodyPr/>
-          <a:lstStyle/>
-          <a:p>
-            <a:r>
-              <a:rPr lang="en-CH" dirty="0"/>
-              <a:t>Topics</a:t>
-            </a:r>
-          </a:p>
-        </p:txBody>
-      </p:sp>
-      <p:sp>
-        <p:nvSpPr>
-          <p:cNvPr id="3" name="Content Placeholder 2">
-            <a:extLst>
-              <a:ext uri="{FF2B5EF4-FFF2-40B4-BE49-F238E27FC236}">
-                <a16:creationId xmlns:a16="http://schemas.microsoft.com/office/drawing/2014/main" id="{0E2934B4-16AA-8F2D-D4C1-01E6A7070D03}"/>
-              </a:ext>
-            </a:extLst>
-          </p:cNvPr>
-          <p:cNvSpPr>
-            <a:spLocks noGrp="1"/>
-          </p:cNvSpPr>
-          <p:nvPr>
-            <p:ph idx="1"/>
-          </p:nvPr>
-        </p:nvSpPr>
-        <p:spPr/>
-        <p:txBody>
-          <a:bodyPr/>
-          <a:lstStyle/>
-          <a:p>
-            <a:r>
-              <a:rPr lang="en-CH" dirty="0"/>
-              <a:t>Research Questions</a:t>
-            </a:r>
-          </a:p>
-          <a:p>
-            <a:r>
-              <a:rPr lang="en-CH" dirty="0"/>
-              <a:t>Data Preprocessing</a:t>
-            </a:r>
-          </a:p>
-          <a:p>
-            <a:r>
-              <a:rPr lang="en-CH" dirty="0"/>
-              <a:t>Initial Data Exploration</a:t>
-            </a:r>
-          </a:p>
-          <a:p>
-            <a:r>
-              <a:rPr lang="en-CH" dirty="0"/>
-              <a:t>Social Circle Detection and Characterization</a:t>
-            </a:r>
-          </a:p>
-          <a:p>
-            <a:r>
-              <a:rPr lang="en-CH" dirty="0"/>
-              <a:t>Anomaly Detection and Characterization</a:t>
-            </a:r>
-          </a:p>
-          <a:p>
-            <a:endParaRPr lang="en-CH" dirty="0"/>
-          </a:p>
-        </p:txBody>
-      </p:sp>
-      <p:sp>
-        <p:nvSpPr>
-          <p:cNvPr id="4" name="Slide Number Placeholder 3">
-            <a:extLst>
-              <a:ext uri="{FF2B5EF4-FFF2-40B4-BE49-F238E27FC236}">
-                <a16:creationId xmlns:a16="http://schemas.microsoft.com/office/drawing/2014/main" id="{E62335AD-A455-6CD8-4025-B346B976952F}"/>
-              </a:ext>
-            </a:extLst>
-          </p:cNvPr>
-          <p:cNvSpPr>
-            <a:spLocks noGrp="1"/>
-          </p:cNvSpPr>
-          <p:nvPr>
-            <p:ph type="sldNum" sz="quarter" idx="12"/>
-          </p:nvPr>
-        </p:nvSpPr>
-        <p:spPr/>
-        <p:txBody>
-          <a:bodyPr/>
-          <a:lstStyle/>
-          <a:p>
-            <a:fld id="{ABC65B0B-110A-D646-808D-174EFAE956EB}" type="slidenum">
-              <a:rPr lang="en-CH" smtClean="0"/>
-              <a:t>2</a:t>
-            </a:fld>
-            <a:endParaRPr lang="en-CH"/>
-          </a:p>
-        </p:txBody>
-      </p:sp>
-    </p:spTree>
-    <p:extLst>
-      <p:ext uri="{BB962C8B-B14F-4D97-AF65-F5344CB8AC3E}">
-        <p14:creationId xmlns:p14="http://schemas.microsoft.com/office/powerpoint/2010/main" val="3134700"/>
-      </p:ext>
-    </p:extLst>
-  </p:cSld>
-  <p:clrMapOvr>
-    <a:masterClrMapping/>
-  </p:clrMapOvr>
-</p:sld>
-</file>
-
-<file path=ppt/slides/slide20.xml><?xml version="1.0" encoding="utf-8"?>
+<file path=ppt/slides/slide19.xml><?xml version="1.0" encoding="utf-8"?>
 <p:sld xmlns:a="http://schemas.openxmlformats.org/drawingml/2006/main" xmlns:r="http://schemas.openxmlformats.org/officeDocument/2006/relationships" xmlns:p="http://schemas.openxmlformats.org/presentationml/2006/main">
   <p:cSld>
     <p:spTree>
@@ -10609,7 +9624,7 @@
         <p:cNvPr id="1" name="">
           <a:extLst>
             <a:ext uri="{FF2B5EF4-FFF2-40B4-BE49-F238E27FC236}">
-              <a16:creationId xmlns:a16="http://schemas.microsoft.com/office/drawing/2014/main" id="{4A2A3EB7-5F87-D29C-397E-4B887404B947}"/>
+              <a16:creationId xmlns:a16="http://schemas.microsoft.com/office/drawing/2014/main" id="{B7342414-92A9-7E6E-58E6-0A5AFE6E9D5B}"/>
             </a:ext>
           </a:extLst>
         </p:cNvPr>
@@ -10629,7 +9644,7 @@
           <p:cNvPr id="2" name="Title 1">
             <a:extLst>
               <a:ext uri="{FF2B5EF4-FFF2-40B4-BE49-F238E27FC236}">
-                <a16:creationId xmlns:a16="http://schemas.microsoft.com/office/drawing/2014/main" id="{38C282F5-CC3F-DA62-A83F-5FAB0FB51BB5}"/>
+                <a16:creationId xmlns:a16="http://schemas.microsoft.com/office/drawing/2014/main" id="{EF808DAF-763B-F701-7F83-6D353611603E}"/>
               </a:ext>
             </a:extLst>
           </p:cNvPr>
@@ -10642,11 +9657,13 @@
         </p:nvSpPr>
         <p:spPr/>
         <p:txBody>
-          <a:bodyPr/>
+          <a:bodyPr>
+            <a:normAutofit/>
+          </a:bodyPr>
           <a:lstStyle/>
           <a:p>
             <a:r>
-              <a:rPr lang="en-CH" dirty="0"/>
+              <a:rPr lang="en-CH" sz="4000" dirty="0"/>
               <a:t>Outlier User ”</a:t>
             </a:r>
             <a:r>
@@ -10655,17 +9672,20 @@
             </a:r>
             <a:r>
               <a:rPr lang="en-GB" dirty="0" err="1"/>
-              <a:t>ast</a:t>
-            </a:r>
-            <a:r>
-              <a:rPr lang="en-GB" dirty="0"/>
-              <a:t>” – </a:t>
-            </a:r>
-            <a:r>
-              <a:rPr lang="en-GB"/>
-              <a:t>The influencer</a:t>
-            </a:r>
-            <a:endParaRPr lang="en-CH" dirty="0"/>
+              <a:t>golaqa</a:t>
+            </a:r>
+            <a:r>
+              <a:rPr lang="en-GB" sz="4000" dirty="0"/>
+              <a:t>” </a:t>
+            </a:r>
+            <a:br>
+              <a:rPr lang="en-GB" sz="4000" dirty="0"/>
+            </a:br>
+            <a:r>
+              <a:rPr lang="en-GB" sz="4000" dirty="0"/>
+              <a:t>Like and Comment Spammer Bot (no Followers)</a:t>
+            </a:r>
+            <a:endParaRPr lang="en-CH" sz="4000" dirty="0"/>
           </a:p>
         </p:txBody>
       </p:sp>
@@ -10674,7 +9694,7 @@
           <p:cNvPr id="3" name="Table 2">
             <a:extLst>
               <a:ext uri="{FF2B5EF4-FFF2-40B4-BE49-F238E27FC236}">
-                <a16:creationId xmlns:a16="http://schemas.microsoft.com/office/drawing/2014/main" id="{A7DF77F9-4B79-324D-8BFF-11CFCA2FB6CC}"/>
+                <a16:creationId xmlns:a16="http://schemas.microsoft.com/office/drawing/2014/main" id="{5093CA9B-7957-CCA3-FD95-EC90BC9F42F1}"/>
               </a:ext>
             </a:extLst>
           </p:cNvPr>
@@ -10684,7 +9704,7 @@
           <p:nvPr>
             <p:extLst>
               <p:ext uri="{D42A27DB-BD31-4B8C-83A1-F6EECF244321}">
-                <p14:modId xmlns:p14="http://schemas.microsoft.com/office/powerpoint/2010/main" val="3917534419"/>
+                <p14:modId xmlns:p14="http://schemas.microsoft.com/office/powerpoint/2010/main" val="1098876012"/>
               </p:ext>
             </p:extLst>
           </p:nvPr>
@@ -10845,18 +9865,18 @@
                       </a:r>
                     </a:p>
                   </a:txBody>
-                  <a:tcPr anchor="ctr"/>
-                </a:tc>
-                <a:tc>
-                  <a:txBody>
-                    <a:bodyPr/>
-                    <a:lstStyle/>
-                    <a:p>
-                      <a:pPr algn="l" fontAlgn="ctr">
-                        <a:buNone/>
-                      </a:pPr>
-                      <a:r>
-                        <a:rPr lang="en-CH" sz="1800" b="0" i="0" u="none" strike="noStrike">
+                  <a:tcPr marL="9525" marR="9525" marT="9525" marB="0" anchor="b"/>
+                </a:tc>
+                <a:tc>
+                  <a:txBody>
+                    <a:bodyPr/>
+                    <a:lstStyle/>
+                    <a:p>
+                      <a:pPr algn="l" fontAlgn="b">
+                        <a:buNone/>
+                      </a:pPr>
+                      <a:r>
+                        <a:rPr lang="en-CH" sz="1800" b="1" i="0" u="none" strike="noStrike">
                           <a:solidFill>
                             <a:srgbClr val="000000"/>
                           </a:solidFill>
@@ -10867,18 +9887,18 @@
                       </a:r>
                     </a:p>
                   </a:txBody>
-                  <a:tcPr anchor="ctr"/>
-                </a:tc>
-                <a:tc>
-                  <a:txBody>
-                    <a:bodyPr/>
-                    <a:lstStyle/>
-                    <a:p>
-                      <a:pPr algn="l" fontAlgn="ctr">
-                        <a:buNone/>
-                      </a:pPr>
-                      <a:r>
-                        <a:rPr lang="en-CH" sz="1800" b="0" i="0" u="none" strike="noStrike">
+                  <a:tcPr marL="9525" marR="9525" marT="9525" marB="0" anchor="b"/>
+                </a:tc>
+                <a:tc>
+                  <a:txBody>
+                    <a:bodyPr/>
+                    <a:lstStyle/>
+                    <a:p>
+                      <a:pPr algn="l" fontAlgn="b">
+                        <a:buNone/>
+                      </a:pPr>
+                      <a:r>
+                        <a:rPr lang="en-CH" sz="1800" b="1" i="0" u="none" strike="noStrike">
                           <a:solidFill>
                             <a:srgbClr val="000000"/>
                           </a:solidFill>
@@ -10889,18 +9909,18 @@
                       </a:r>
                     </a:p>
                   </a:txBody>
-                  <a:tcPr anchor="ctr"/>
-                </a:tc>
-                <a:tc>
-                  <a:txBody>
-                    <a:bodyPr/>
-                    <a:lstStyle/>
-                    <a:p>
-                      <a:pPr algn="l" fontAlgn="ctr">
-                        <a:buNone/>
-                      </a:pPr>
-                      <a:r>
-                        <a:rPr lang="en-CH" sz="1800" b="0" i="0" u="none" strike="noStrike">
+                  <a:tcPr marL="9525" marR="9525" marT="9525" marB="0" anchor="b"/>
+                </a:tc>
+                <a:tc>
+                  <a:txBody>
+                    <a:bodyPr/>
+                    <a:lstStyle/>
+                    <a:p>
+                      <a:pPr algn="l" fontAlgn="b">
+                        <a:buNone/>
+                      </a:pPr>
+                      <a:r>
+                        <a:rPr lang="en-CH" sz="1800" b="1" i="0" u="none" strike="noStrike" dirty="0">
                           <a:solidFill>
                             <a:srgbClr val="000000"/>
                           </a:solidFill>
@@ -10911,7 +9931,7 @@
                       </a:r>
                     </a:p>
                   </a:txBody>
-                  <a:tcPr anchor="ctr"/>
+                  <a:tcPr marL="9525" marR="9525" marT="9525" marB="0" anchor="b"/>
                 </a:tc>
                 <a:extLst>
                   <a:ext uri="{0D108BD9-81ED-4DB2-BD59-A6C34878D82A}">
@@ -10929,7 +9949,7 @@
                         <a:buNone/>
                       </a:pPr>
                       <a:r>
-                        <a:rPr lang="en-GB" sz="1800" b="1" i="0" u="none" strike="noStrike">
+                        <a:rPr lang="en-GB" sz="1800" b="0" i="0" u="none" strike="noStrike" dirty="0">
                           <a:solidFill>
                             <a:srgbClr val="000000"/>
                           </a:solidFill>
@@ -10940,14 +9960,14 @@
                       </a:r>
                     </a:p>
                   </a:txBody>
-                  <a:tcPr anchor="ctr"/>
-                </a:tc>
-                <a:tc>
-                  <a:txBody>
-                    <a:bodyPr/>
-                    <a:lstStyle/>
-                    <a:p>
-                      <a:pPr algn="l" fontAlgn="ctr">
+                  <a:tcPr marL="9525" marR="9525" marT="9525" marB="0" anchor="b"/>
+                </a:tc>
+                <a:tc>
+                  <a:txBody>
+                    <a:bodyPr/>
+                    <a:lstStyle/>
+                    <a:p>
+                      <a:pPr algn="l" fontAlgn="b">
                         <a:buNone/>
                       </a:pPr>
                       <a:r>
@@ -10962,14 +9982,14 @@
                       </a:r>
                     </a:p>
                   </a:txBody>
-                  <a:tcPr anchor="ctr"/>
-                </a:tc>
-                <a:tc>
-                  <a:txBody>
-                    <a:bodyPr/>
-                    <a:lstStyle/>
-                    <a:p>
-                      <a:pPr algn="l" fontAlgn="ctr">
+                  <a:tcPr marL="9525" marR="9525" marT="9525" marB="0" anchor="b"/>
+                </a:tc>
+                <a:tc>
+                  <a:txBody>
+                    <a:bodyPr/>
+                    <a:lstStyle/>
+                    <a:p>
+                      <a:pPr algn="l" fontAlgn="b">
                         <a:buNone/>
                       </a:pPr>
                       <a:r>
@@ -10984,18 +10004,18 @@
                       </a:r>
                     </a:p>
                   </a:txBody>
-                  <a:tcPr anchor="ctr"/>
-                </a:tc>
-                <a:tc>
-                  <a:txBody>
-                    <a:bodyPr/>
-                    <a:lstStyle/>
-                    <a:p>
-                      <a:pPr algn="l" fontAlgn="ctr">
-                        <a:buNone/>
-                      </a:pPr>
-                      <a:r>
-                        <a:rPr lang="en-CH" sz="1800" b="0" i="0" u="none" strike="noStrike">
+                  <a:tcPr marL="9525" marR="9525" marT="9525" marB="0" anchor="b"/>
+                </a:tc>
+                <a:tc>
+                  <a:txBody>
+                    <a:bodyPr/>
+                    <a:lstStyle/>
+                    <a:p>
+                      <a:pPr algn="l" fontAlgn="b">
+                        <a:buNone/>
+                      </a:pPr>
+                      <a:r>
+                        <a:rPr lang="en-CH" sz="1800" b="0" i="0" u="none" strike="noStrike" dirty="0">
                           <a:solidFill>
                             <a:srgbClr val="000000"/>
                           </a:solidFill>
@@ -11006,7 +10026,7 @@
                       </a:r>
                     </a:p>
                   </a:txBody>
-                  <a:tcPr anchor="ctr"/>
+                  <a:tcPr marL="9525" marR="9525" marT="9525" marB="0" anchor="b"/>
                 </a:tc>
                 <a:extLst>
                   <a:ext uri="{0D108BD9-81ED-4DB2-BD59-A6C34878D82A}">
@@ -11024,7 +10044,7 @@
                         <a:buNone/>
                       </a:pPr>
                       <a:r>
-                        <a:rPr lang="en-GB" sz="1800" b="1" i="0" u="none" strike="noStrike" dirty="0">
+                        <a:rPr lang="en-GB" sz="1800" b="0" i="0" u="none" strike="noStrike">
                           <a:solidFill>
                             <a:srgbClr val="000000"/>
                           </a:solidFill>
@@ -11035,14 +10055,14 @@
                       </a:r>
                     </a:p>
                   </a:txBody>
-                  <a:tcPr anchor="ctr"/>
-                </a:tc>
-                <a:tc>
-                  <a:txBody>
-                    <a:bodyPr/>
-                    <a:lstStyle/>
-                    <a:p>
-                      <a:pPr algn="l" fontAlgn="ctr">
+                  <a:tcPr marL="9525" marR="9525" marT="9525" marB="0" anchor="b"/>
+                </a:tc>
+                <a:tc>
+                  <a:txBody>
+                    <a:bodyPr/>
+                    <a:lstStyle/>
+                    <a:p>
+                      <a:pPr algn="l" fontAlgn="b">
                         <a:buNone/>
                       </a:pPr>
                       <a:r>
@@ -11057,14 +10077,14 @@
                       </a:r>
                     </a:p>
                   </a:txBody>
-                  <a:tcPr anchor="ctr"/>
-                </a:tc>
-                <a:tc>
-                  <a:txBody>
-                    <a:bodyPr/>
-                    <a:lstStyle/>
-                    <a:p>
-                      <a:pPr algn="l" fontAlgn="ctr">
+                  <a:tcPr marL="9525" marR="9525" marT="9525" marB="0" anchor="b"/>
+                </a:tc>
+                <a:tc>
+                  <a:txBody>
+                    <a:bodyPr/>
+                    <a:lstStyle/>
+                    <a:p>
+                      <a:pPr algn="l" fontAlgn="b">
                         <a:buNone/>
                       </a:pPr>
                       <a:r>
@@ -11079,14 +10099,14 @@
                       </a:r>
                     </a:p>
                   </a:txBody>
-                  <a:tcPr anchor="ctr"/>
-                </a:tc>
-                <a:tc>
-                  <a:txBody>
-                    <a:bodyPr/>
-                    <a:lstStyle/>
-                    <a:p>
-                      <a:pPr algn="l" fontAlgn="ctr">
+                  <a:tcPr marL="9525" marR="9525" marT="9525" marB="0" anchor="b"/>
+                </a:tc>
+                <a:tc>
+                  <a:txBody>
+                    <a:bodyPr/>
+                    <a:lstStyle/>
+                    <a:p>
+                      <a:pPr algn="l" fontAlgn="b">
                         <a:buNone/>
                       </a:pPr>
                       <a:r>
@@ -11101,7 +10121,7 @@
                       </a:r>
                     </a:p>
                   </a:txBody>
-                  <a:tcPr anchor="ctr"/>
+                  <a:tcPr marL="9525" marR="9525" marT="9525" marB="0" anchor="b"/>
                 </a:tc>
                 <a:extLst>
                   <a:ext uri="{0D108BD9-81ED-4DB2-BD59-A6C34878D82A}">
@@ -11119,7 +10139,7 @@
                         <a:buNone/>
                       </a:pPr>
                       <a:r>
-                        <a:rPr lang="en-GB" sz="1800" b="1" i="0" u="none" strike="noStrike">
+                        <a:rPr lang="en-GB" sz="1800" b="0" i="0" u="none" strike="noStrike">
                           <a:solidFill>
                             <a:srgbClr val="000000"/>
                           </a:solidFill>
@@ -11130,14 +10150,14 @@
                       </a:r>
                     </a:p>
                   </a:txBody>
-                  <a:tcPr anchor="ctr"/>
-                </a:tc>
-                <a:tc>
-                  <a:txBody>
-                    <a:bodyPr/>
-                    <a:lstStyle/>
-                    <a:p>
-                      <a:pPr algn="l" fontAlgn="ctr">
+                  <a:tcPr marL="9525" marR="9525" marT="9525" marB="0" anchor="b"/>
+                </a:tc>
+                <a:tc>
+                  <a:txBody>
+                    <a:bodyPr/>
+                    <a:lstStyle/>
+                    <a:p>
+                      <a:pPr algn="l" fontAlgn="b">
                         <a:buNone/>
                       </a:pPr>
                       <a:r>
@@ -11152,14 +10172,14 @@
                       </a:r>
                     </a:p>
                   </a:txBody>
-                  <a:tcPr anchor="ctr"/>
-                </a:tc>
-                <a:tc>
-                  <a:txBody>
-                    <a:bodyPr/>
-                    <a:lstStyle/>
-                    <a:p>
-                      <a:pPr algn="l" fontAlgn="ctr">
+                  <a:tcPr marL="9525" marR="9525" marT="9525" marB="0" anchor="b"/>
+                </a:tc>
+                <a:tc>
+                  <a:txBody>
+                    <a:bodyPr/>
+                    <a:lstStyle/>
+                    <a:p>
+                      <a:pPr algn="l" fontAlgn="b">
                         <a:buNone/>
                       </a:pPr>
                       <a:r>
@@ -11174,14 +10194,14 @@
                       </a:r>
                     </a:p>
                   </a:txBody>
-                  <a:tcPr anchor="ctr"/>
-                </a:tc>
-                <a:tc>
-                  <a:txBody>
-                    <a:bodyPr/>
-                    <a:lstStyle/>
-                    <a:p>
-                      <a:pPr algn="l" fontAlgn="ctr">
+                  <a:tcPr marL="9525" marR="9525" marT="9525" marB="0" anchor="b"/>
+                </a:tc>
+                <a:tc>
+                  <a:txBody>
+                    <a:bodyPr/>
+                    <a:lstStyle/>
+                    <a:p>
+                      <a:pPr algn="l" fontAlgn="b">
                         <a:buNone/>
                       </a:pPr>
                       <a:r>
@@ -11196,7 +10216,7 @@
                       </a:r>
                     </a:p>
                   </a:txBody>
-                  <a:tcPr anchor="ctr"/>
+                  <a:tcPr marL="9525" marR="9525" marT="9525" marB="0" anchor="b"/>
                 </a:tc>
                 <a:extLst>
                   <a:ext uri="{0D108BD9-81ED-4DB2-BD59-A6C34878D82A}">
@@ -11225,18 +10245,18 @@
                       </a:r>
                     </a:p>
                   </a:txBody>
-                  <a:tcPr anchor="ctr"/>
-                </a:tc>
-                <a:tc>
-                  <a:txBody>
-                    <a:bodyPr/>
-                    <a:lstStyle/>
-                    <a:p>
-                      <a:pPr algn="l" fontAlgn="ctr">
-                        <a:buNone/>
-                      </a:pPr>
-                      <a:r>
-                        <a:rPr lang="en-CH" sz="1800" b="0" i="0" u="none" strike="noStrike">
+                  <a:tcPr marL="9525" marR="9525" marT="9525" marB="0" anchor="b"/>
+                </a:tc>
+                <a:tc>
+                  <a:txBody>
+                    <a:bodyPr/>
+                    <a:lstStyle/>
+                    <a:p>
+                      <a:pPr algn="l" fontAlgn="b">
+                        <a:buNone/>
+                      </a:pPr>
+                      <a:r>
+                        <a:rPr lang="en-CH" sz="1800" b="1" i="0" u="none" strike="noStrike">
                           <a:solidFill>
                             <a:srgbClr val="000000"/>
                           </a:solidFill>
@@ -11247,18 +10267,18 @@
                       </a:r>
                     </a:p>
                   </a:txBody>
-                  <a:tcPr anchor="ctr"/>
-                </a:tc>
-                <a:tc>
-                  <a:txBody>
-                    <a:bodyPr/>
-                    <a:lstStyle/>
-                    <a:p>
-                      <a:pPr algn="l" fontAlgn="ctr">
-                        <a:buNone/>
-                      </a:pPr>
-                      <a:r>
-                        <a:rPr lang="en-CH" sz="1800" b="0" i="0" u="none" strike="noStrike">
+                  <a:tcPr marL="9525" marR="9525" marT="9525" marB="0" anchor="b"/>
+                </a:tc>
+                <a:tc>
+                  <a:txBody>
+                    <a:bodyPr/>
+                    <a:lstStyle/>
+                    <a:p>
+                      <a:pPr algn="l" fontAlgn="b">
+                        <a:buNone/>
+                      </a:pPr>
+                      <a:r>
+                        <a:rPr lang="en-CH" sz="1800" b="1" i="0" u="none" strike="noStrike">
                           <a:solidFill>
                             <a:srgbClr val="000000"/>
                           </a:solidFill>
@@ -11269,18 +10289,18 @@
                       </a:r>
                     </a:p>
                   </a:txBody>
-                  <a:tcPr anchor="ctr"/>
-                </a:tc>
-                <a:tc>
-                  <a:txBody>
-                    <a:bodyPr/>
-                    <a:lstStyle/>
-                    <a:p>
-                      <a:pPr algn="l" fontAlgn="ctr">
-                        <a:buNone/>
-                      </a:pPr>
-                      <a:r>
-                        <a:rPr lang="en-CH" sz="1800" b="0" i="0" u="none" strike="noStrike">
+                  <a:tcPr marL="9525" marR="9525" marT="9525" marB="0" anchor="b"/>
+                </a:tc>
+                <a:tc>
+                  <a:txBody>
+                    <a:bodyPr/>
+                    <a:lstStyle/>
+                    <a:p>
+                      <a:pPr algn="l" fontAlgn="b">
+                        <a:buNone/>
+                      </a:pPr>
+                      <a:r>
+                        <a:rPr lang="en-CH" sz="1800" b="1" i="0" u="none" strike="noStrike" dirty="0">
                           <a:solidFill>
                             <a:srgbClr val="000000"/>
                           </a:solidFill>
@@ -11291,7 +10311,7 @@
                       </a:r>
                     </a:p>
                   </a:txBody>
-                  <a:tcPr anchor="ctr"/>
+                  <a:tcPr marL="9525" marR="9525" marT="9525" marB="0" anchor="b"/>
                 </a:tc>
                 <a:extLst>
                   <a:ext uri="{0D108BD9-81ED-4DB2-BD59-A6C34878D82A}">
@@ -11309,7 +10329,7 @@
                         <a:buNone/>
                       </a:pPr>
                       <a:r>
-                        <a:rPr lang="en-GB" sz="1800" b="1" i="0" u="none" strike="noStrike">
+                        <a:rPr lang="en-GB" sz="1800" b="0" i="0" u="none" strike="noStrike">
                           <a:solidFill>
                             <a:srgbClr val="000000"/>
                           </a:solidFill>
@@ -11320,14 +10340,14 @@
                       </a:r>
                     </a:p>
                   </a:txBody>
-                  <a:tcPr anchor="ctr"/>
-                </a:tc>
-                <a:tc>
-                  <a:txBody>
-                    <a:bodyPr/>
-                    <a:lstStyle/>
-                    <a:p>
-                      <a:pPr algn="l" fontAlgn="ctr">
+                  <a:tcPr marL="9525" marR="9525" marT="9525" marB="0" anchor="b"/>
+                </a:tc>
+                <a:tc>
+                  <a:txBody>
+                    <a:bodyPr/>
+                    <a:lstStyle/>
+                    <a:p>
+                      <a:pPr algn="l" fontAlgn="b">
                         <a:buNone/>
                       </a:pPr>
                       <a:r>
@@ -11342,14 +10362,14 @@
                       </a:r>
                     </a:p>
                   </a:txBody>
-                  <a:tcPr anchor="ctr"/>
-                </a:tc>
-                <a:tc>
-                  <a:txBody>
-                    <a:bodyPr/>
-                    <a:lstStyle/>
-                    <a:p>
-                      <a:pPr algn="l" fontAlgn="ctr">
+                  <a:tcPr marL="9525" marR="9525" marT="9525" marB="0" anchor="b"/>
+                </a:tc>
+                <a:tc>
+                  <a:txBody>
+                    <a:bodyPr/>
+                    <a:lstStyle/>
+                    <a:p>
+                      <a:pPr algn="l" fontAlgn="b">
                         <a:buNone/>
                       </a:pPr>
                       <a:r>
@@ -11364,14 +10384,14 @@
                       </a:r>
                     </a:p>
                   </a:txBody>
-                  <a:tcPr anchor="ctr"/>
-                </a:tc>
-                <a:tc>
-                  <a:txBody>
-                    <a:bodyPr/>
-                    <a:lstStyle/>
-                    <a:p>
-                      <a:pPr algn="l" fontAlgn="ctr">
+                  <a:tcPr marL="9525" marR="9525" marT="9525" marB="0" anchor="b"/>
+                </a:tc>
+                <a:tc>
+                  <a:txBody>
+                    <a:bodyPr/>
+                    <a:lstStyle/>
+                    <a:p>
+                      <a:pPr algn="l" fontAlgn="b">
                         <a:buNone/>
                       </a:pPr>
                       <a:r>
@@ -11386,7 +10406,7 @@
                       </a:r>
                     </a:p>
                   </a:txBody>
-                  <a:tcPr anchor="ctr"/>
+                  <a:tcPr marL="9525" marR="9525" marT="9525" marB="0" anchor="b"/>
                 </a:tc>
                 <a:extLst>
                   <a:ext uri="{0D108BD9-81ED-4DB2-BD59-A6C34878D82A}">
@@ -11404,7 +10424,7 @@
                         <a:buNone/>
                       </a:pPr>
                       <a:r>
-                        <a:rPr lang="en-GB" sz="1800" b="1" i="0" u="none" strike="noStrike" dirty="0">
+                        <a:rPr lang="en-GB" sz="1800" b="1" i="0" u="none" strike="noStrike">
                           <a:solidFill>
                             <a:srgbClr val="000000"/>
                           </a:solidFill>
@@ -11415,18 +10435,18 @@
                       </a:r>
                     </a:p>
                   </a:txBody>
-                  <a:tcPr anchor="ctr"/>
-                </a:tc>
-                <a:tc>
-                  <a:txBody>
-                    <a:bodyPr/>
-                    <a:lstStyle/>
-                    <a:p>
-                      <a:pPr algn="l" fontAlgn="ctr">
-                        <a:buNone/>
-                      </a:pPr>
-                      <a:r>
-                        <a:rPr lang="en-CH" sz="1800" b="0" i="0" u="none" strike="noStrike">
+                  <a:tcPr marL="9525" marR="9525" marT="9525" marB="0" anchor="b"/>
+                </a:tc>
+                <a:tc>
+                  <a:txBody>
+                    <a:bodyPr/>
+                    <a:lstStyle/>
+                    <a:p>
+                      <a:pPr algn="l" fontAlgn="b">
+                        <a:buNone/>
+                      </a:pPr>
+                      <a:r>
+                        <a:rPr lang="en-CH" sz="1800" b="1" i="0" u="none" strike="noStrike">
                           <a:solidFill>
                             <a:srgbClr val="000000"/>
                           </a:solidFill>
@@ -11437,18 +10457,18 @@
                       </a:r>
                     </a:p>
                   </a:txBody>
-                  <a:tcPr anchor="ctr"/>
-                </a:tc>
-                <a:tc>
-                  <a:txBody>
-                    <a:bodyPr/>
-                    <a:lstStyle/>
-                    <a:p>
-                      <a:pPr algn="l" fontAlgn="ctr">
-                        <a:buNone/>
-                      </a:pPr>
-                      <a:r>
-                        <a:rPr lang="en-CH" sz="1800" b="0" i="0" u="none" strike="noStrike">
+                  <a:tcPr marL="9525" marR="9525" marT="9525" marB="0" anchor="b"/>
+                </a:tc>
+                <a:tc>
+                  <a:txBody>
+                    <a:bodyPr/>
+                    <a:lstStyle/>
+                    <a:p>
+                      <a:pPr algn="l" fontAlgn="b">
+                        <a:buNone/>
+                      </a:pPr>
+                      <a:r>
+                        <a:rPr lang="en-CH" sz="1800" b="1" i="0" u="none" strike="noStrike">
                           <a:solidFill>
                             <a:srgbClr val="000000"/>
                           </a:solidFill>
@@ -11459,18 +10479,18 @@
                       </a:r>
                     </a:p>
                   </a:txBody>
-                  <a:tcPr anchor="ctr"/>
-                </a:tc>
-                <a:tc>
-                  <a:txBody>
-                    <a:bodyPr/>
-                    <a:lstStyle/>
-                    <a:p>
-                      <a:pPr algn="l" fontAlgn="ctr">
-                        <a:buNone/>
-                      </a:pPr>
-                      <a:r>
-                        <a:rPr lang="en-CH" sz="1800" b="0" i="0" u="none" strike="noStrike" dirty="0">
+                  <a:tcPr marL="9525" marR="9525" marT="9525" marB="0" anchor="b"/>
+                </a:tc>
+                <a:tc>
+                  <a:txBody>
+                    <a:bodyPr/>
+                    <a:lstStyle/>
+                    <a:p>
+                      <a:pPr algn="l" fontAlgn="b">
+                        <a:buNone/>
+                      </a:pPr>
+                      <a:r>
+                        <a:rPr lang="en-CH" sz="1800" b="1" i="0" u="none" strike="noStrike" dirty="0">
                           <a:solidFill>
                             <a:srgbClr val="000000"/>
                           </a:solidFill>
@@ -11481,7 +10501,7 @@
                       </a:r>
                     </a:p>
                   </a:txBody>
-                  <a:tcPr anchor="ctr"/>
+                  <a:tcPr marL="9525" marR="9525" marT="9525" marB="0" anchor="b"/>
                 </a:tc>
                 <a:extLst>
                   <a:ext uri="{0D108BD9-81ED-4DB2-BD59-A6C34878D82A}">
@@ -11498,7 +10518,7 @@
           <p:cNvPr id="4" name="Slide Number Placeholder 3">
             <a:extLst>
               <a:ext uri="{FF2B5EF4-FFF2-40B4-BE49-F238E27FC236}">
-                <a16:creationId xmlns:a16="http://schemas.microsoft.com/office/drawing/2014/main" id="{D7F8C392-1258-C605-7CF0-14AA345B88A5}"/>
+                <a16:creationId xmlns:a16="http://schemas.microsoft.com/office/drawing/2014/main" id="{527AC6A9-66F2-E219-EE9D-FC820177BB56}"/>
               </a:ext>
             </a:extLst>
           </p:cNvPr>
@@ -11516,7 +10536,7 @@
           <a:p>
             <a:fld id="{ABC65B0B-110A-D646-808D-174EFAE956EB}" type="slidenum">
               <a:rPr lang="en-CH" smtClean="0"/>
-              <a:t>20</a:t>
+              <a:t>19</a:t>
             </a:fld>
             <a:endParaRPr lang="en-CH"/>
           </a:p>
@@ -11527,7 +10547,7 @@
           <p:cNvPr id="6" name="TextBox 5">
             <a:extLst>
               <a:ext uri="{FF2B5EF4-FFF2-40B4-BE49-F238E27FC236}">
-                <a16:creationId xmlns:a16="http://schemas.microsoft.com/office/drawing/2014/main" id="{4A271B6D-65E8-6165-6673-4A550795FE05}"/>
+                <a16:creationId xmlns:a16="http://schemas.microsoft.com/office/drawing/2014/main" id="{2FC3414F-59AD-ABAC-D778-53B2A8411305}"/>
               </a:ext>
             </a:extLst>
           </p:cNvPr>
@@ -11537,7 +10557,7 @@
         <p:spPr>
           <a:xfrm>
             <a:off x="838199" y="6123543"/>
-            <a:ext cx="11190884" cy="430887"/>
+            <a:ext cx="10325840" cy="430887"/>
           </a:xfrm>
           <a:prstGeom prst="rect">
             <a:avLst/>
@@ -11552,15 +10572,1160 @@
           <a:p>
             <a:r>
               <a:rPr lang="en-CH" sz="2200" dirty="0"/>
-              <a:t>Algorithms that detected outlier: Multivariate Gaussian, kMeans, kNN, PCA Reconstruction</a:t>
-            </a:r>
+              <a:t>Algorithms that detected outlier: </a:t>
+            </a:r>
+            <a:r>
+              <a:rPr lang="en-GB" sz="2200" dirty="0"/>
+              <a:t>Multivariate Gaussian, k-Means, </a:t>
+            </a:r>
+            <a:r>
+              <a:rPr lang="en-GB" sz="2200" dirty="0" err="1"/>
+              <a:t>kNN</a:t>
+            </a:r>
+            <a:r>
+              <a:rPr lang="en-GB" sz="2200" dirty="0"/>
+              <a:t>, </a:t>
+            </a:r>
+            <a:r>
+              <a:rPr lang="en-GB" sz="2200" dirty="0" err="1"/>
+              <a:t>iForest</a:t>
+            </a:r>
+            <a:r>
+              <a:rPr lang="en-GB" sz="2200" dirty="0"/>
+              <a:t>, PCA</a:t>
+            </a:r>
+            <a:endParaRPr lang="en-CH" sz="2200" dirty="0"/>
           </a:p>
         </p:txBody>
       </p:sp>
     </p:spTree>
     <p:extLst>
       <p:ext uri="{BB962C8B-B14F-4D97-AF65-F5344CB8AC3E}">
-        <p14:creationId xmlns:p14="http://schemas.microsoft.com/office/powerpoint/2010/main" val="3203873567"/>
+        <p14:creationId xmlns:p14="http://schemas.microsoft.com/office/powerpoint/2010/main" val="2573814268"/>
+      </p:ext>
+    </p:extLst>
+  </p:cSld>
+  <p:clrMapOvr>
+    <a:masterClrMapping/>
+  </p:clrMapOvr>
+</p:sld>
+</file>
+
+<file path=ppt/slides/slide2.xml><?xml version="1.0" encoding="utf-8"?>
+<p:sld xmlns:a="http://schemas.openxmlformats.org/drawingml/2006/main" xmlns:r="http://schemas.openxmlformats.org/officeDocument/2006/relationships" xmlns:p="http://schemas.openxmlformats.org/presentationml/2006/main">
+  <p:cSld>
+    <p:spTree>
+      <p:nvGrpSpPr>
+        <p:cNvPr id="1" name=""/>
+        <p:cNvGrpSpPr/>
+        <p:nvPr/>
+      </p:nvGrpSpPr>
+      <p:grpSpPr>
+        <a:xfrm>
+          <a:off x="0" y="0"/>
+          <a:ext cx="0" cy="0"/>
+          <a:chOff x="0" y="0"/>
+          <a:chExt cx="0" cy="0"/>
+        </a:xfrm>
+      </p:grpSpPr>
+      <p:sp>
+        <p:nvSpPr>
+          <p:cNvPr id="2" name="Title 1">
+            <a:extLst>
+              <a:ext uri="{FF2B5EF4-FFF2-40B4-BE49-F238E27FC236}">
+                <a16:creationId xmlns:a16="http://schemas.microsoft.com/office/drawing/2014/main" id="{6B7CF60A-F9D9-624B-456F-8624123D69EA}"/>
+              </a:ext>
+            </a:extLst>
+          </p:cNvPr>
+          <p:cNvSpPr>
+            <a:spLocks noGrp="1"/>
+          </p:cNvSpPr>
+          <p:nvPr>
+            <p:ph type="title"/>
+          </p:nvPr>
+        </p:nvSpPr>
+        <p:spPr/>
+        <p:txBody>
+          <a:bodyPr/>
+          <a:lstStyle/>
+          <a:p>
+            <a:r>
+              <a:rPr lang="en-CH" dirty="0"/>
+              <a:t>Topics</a:t>
+            </a:r>
+          </a:p>
+        </p:txBody>
+      </p:sp>
+      <p:sp>
+        <p:nvSpPr>
+          <p:cNvPr id="3" name="Content Placeholder 2">
+            <a:extLst>
+              <a:ext uri="{FF2B5EF4-FFF2-40B4-BE49-F238E27FC236}">
+                <a16:creationId xmlns:a16="http://schemas.microsoft.com/office/drawing/2014/main" id="{0E2934B4-16AA-8F2D-D4C1-01E6A7070D03}"/>
+              </a:ext>
+            </a:extLst>
+          </p:cNvPr>
+          <p:cNvSpPr>
+            <a:spLocks noGrp="1"/>
+          </p:cNvSpPr>
+          <p:nvPr>
+            <p:ph idx="1"/>
+          </p:nvPr>
+        </p:nvSpPr>
+        <p:spPr/>
+        <p:txBody>
+          <a:bodyPr/>
+          <a:lstStyle/>
+          <a:p>
+            <a:r>
+              <a:rPr lang="en-CH" dirty="0"/>
+              <a:t>Research Questions</a:t>
+            </a:r>
+          </a:p>
+          <a:p>
+            <a:r>
+              <a:rPr lang="en-CH" dirty="0"/>
+              <a:t>Data Preprocessing</a:t>
+            </a:r>
+          </a:p>
+          <a:p>
+            <a:r>
+              <a:rPr lang="en-CH" dirty="0"/>
+              <a:t>Initial Data Exploration</a:t>
+            </a:r>
+          </a:p>
+          <a:p>
+            <a:r>
+              <a:rPr lang="en-CH" dirty="0"/>
+              <a:t>Social Circle Detection and Characterization</a:t>
+            </a:r>
+          </a:p>
+          <a:p>
+            <a:r>
+              <a:rPr lang="en-CH" dirty="0"/>
+              <a:t>Anomaly Detection and Characterization</a:t>
+            </a:r>
+          </a:p>
+          <a:p>
+            <a:endParaRPr lang="en-CH" dirty="0"/>
+          </a:p>
+        </p:txBody>
+      </p:sp>
+      <p:sp>
+        <p:nvSpPr>
+          <p:cNvPr id="4" name="Slide Number Placeholder 3">
+            <a:extLst>
+              <a:ext uri="{FF2B5EF4-FFF2-40B4-BE49-F238E27FC236}">
+                <a16:creationId xmlns:a16="http://schemas.microsoft.com/office/drawing/2014/main" id="{E62335AD-A455-6CD8-4025-B346B976952F}"/>
+              </a:ext>
+            </a:extLst>
+          </p:cNvPr>
+          <p:cNvSpPr>
+            <a:spLocks noGrp="1"/>
+          </p:cNvSpPr>
+          <p:nvPr>
+            <p:ph type="sldNum" sz="quarter" idx="12"/>
+          </p:nvPr>
+        </p:nvSpPr>
+        <p:spPr/>
+        <p:txBody>
+          <a:bodyPr/>
+          <a:lstStyle/>
+          <a:p>
+            <a:fld id="{ABC65B0B-110A-D646-808D-174EFAE956EB}" type="slidenum">
+              <a:rPr lang="en-CH" smtClean="0"/>
+              <a:t>2</a:t>
+            </a:fld>
+            <a:endParaRPr lang="en-CH"/>
+          </a:p>
+        </p:txBody>
+      </p:sp>
+    </p:spTree>
+    <p:extLst>
+      <p:ext uri="{BB962C8B-B14F-4D97-AF65-F5344CB8AC3E}">
+        <p14:creationId xmlns:p14="http://schemas.microsoft.com/office/powerpoint/2010/main" val="3134700"/>
+      </p:ext>
+    </p:extLst>
+  </p:cSld>
+  <p:clrMapOvr>
+    <a:masterClrMapping/>
+  </p:clrMapOvr>
+</p:sld>
+</file>
+
+<file path=ppt/slides/slide20.xml><?xml version="1.0" encoding="utf-8"?>
+<p:sld xmlns:a="http://schemas.openxmlformats.org/drawingml/2006/main" xmlns:r="http://schemas.openxmlformats.org/officeDocument/2006/relationships" xmlns:p="http://schemas.openxmlformats.org/presentationml/2006/main">
+  <p:cSld>
+    <p:spTree>
+      <p:nvGrpSpPr>
+        <p:cNvPr id="1" name="">
+          <a:extLst>
+            <a:ext uri="{FF2B5EF4-FFF2-40B4-BE49-F238E27FC236}">
+              <a16:creationId xmlns:a16="http://schemas.microsoft.com/office/drawing/2014/main" id="{780286F6-F02A-FDC8-8059-1D22D8E8B61A}"/>
+            </a:ext>
+          </a:extLst>
+        </p:cNvPr>
+        <p:cNvGrpSpPr/>
+        <p:nvPr/>
+      </p:nvGrpSpPr>
+      <p:grpSpPr>
+        <a:xfrm>
+          <a:off x="0" y="0"/>
+          <a:ext cx="0" cy="0"/>
+          <a:chOff x="0" y="0"/>
+          <a:chExt cx="0" cy="0"/>
+        </a:xfrm>
+      </p:grpSpPr>
+      <p:sp>
+        <p:nvSpPr>
+          <p:cNvPr id="2" name="Title 1">
+            <a:extLst>
+              <a:ext uri="{FF2B5EF4-FFF2-40B4-BE49-F238E27FC236}">
+                <a16:creationId xmlns:a16="http://schemas.microsoft.com/office/drawing/2014/main" id="{4A395575-6889-345E-3E3C-6EA5BBF18A7B}"/>
+              </a:ext>
+            </a:extLst>
+          </p:cNvPr>
+          <p:cNvSpPr>
+            <a:spLocks noGrp="1"/>
+          </p:cNvSpPr>
+          <p:nvPr>
+            <p:ph type="title"/>
+          </p:nvPr>
+        </p:nvSpPr>
+        <p:spPr/>
+        <p:txBody>
+          <a:bodyPr>
+            <a:normAutofit/>
+          </a:bodyPr>
+          <a:lstStyle/>
+          <a:p>
+            <a:r>
+              <a:rPr lang="en-CH" sz="4000" dirty="0"/>
+              <a:t>Outlier User ”</a:t>
+            </a:r>
+            <a:r>
+              <a:rPr lang="en-GB" dirty="0"/>
+              <a:t> </a:t>
+            </a:r>
+            <a:r>
+              <a:rPr lang="en-GB" dirty="0" err="1"/>
+              <a:t>falob</a:t>
+            </a:r>
+            <a:r>
+              <a:rPr lang="en-GB" sz="4000" dirty="0"/>
+              <a:t>” - Very active User: likes a lot of posts but doesn’t comment much</a:t>
+            </a:r>
+            <a:endParaRPr lang="en-CH" sz="4000" dirty="0"/>
+          </a:p>
+        </p:txBody>
+      </p:sp>
+      <p:graphicFrame>
+        <p:nvGraphicFramePr>
+          <p:cNvPr id="3" name="Table 2">
+            <a:extLst>
+              <a:ext uri="{FF2B5EF4-FFF2-40B4-BE49-F238E27FC236}">
+                <a16:creationId xmlns:a16="http://schemas.microsoft.com/office/drawing/2014/main" id="{9F675186-5840-47A5-78E4-0970B3A330FB}"/>
+              </a:ext>
+            </a:extLst>
+          </p:cNvPr>
+          <p:cNvGraphicFramePr>
+            <a:graphicFrameLocks noGrp="1"/>
+          </p:cNvGraphicFramePr>
+          <p:nvPr/>
+        </p:nvGraphicFramePr>
+        <p:xfrm>
+          <a:off x="838199" y="1690687"/>
+          <a:ext cx="10246895" cy="4260932"/>
+        </p:xfrm>
+        <a:graphic>
+          <a:graphicData uri="http://schemas.openxmlformats.org/drawingml/2006/table">
+            <a:tbl>
+              <a:tblPr firstRow="1" bandRow="1">
+                <a:tableStyleId>{5C22544A-7EE6-4342-B048-85BDC9FD1C3A}</a:tableStyleId>
+              </a:tblPr>
+              <a:tblGrid>
+                <a:gridCol w="4808622">
+                  <a:extLst>
+                    <a:ext uri="{9D8B030D-6E8A-4147-A177-3AD203B41FA5}">
+                      <a16:colId xmlns:a16="http://schemas.microsoft.com/office/drawing/2014/main" val="967672467"/>
+                    </a:ext>
+                  </a:extLst>
+                </a:gridCol>
+                <a:gridCol w="1876926">
+                  <a:extLst>
+                    <a:ext uri="{9D8B030D-6E8A-4147-A177-3AD203B41FA5}">
+                      <a16:colId xmlns:a16="http://schemas.microsoft.com/office/drawing/2014/main" val="4119636025"/>
+                    </a:ext>
+                  </a:extLst>
+                </a:gridCol>
+                <a:gridCol w="1668379">
+                  <a:extLst>
+                    <a:ext uri="{9D8B030D-6E8A-4147-A177-3AD203B41FA5}">
+                      <a16:colId xmlns:a16="http://schemas.microsoft.com/office/drawing/2014/main" val="1495807327"/>
+                    </a:ext>
+                  </a:extLst>
+                </a:gridCol>
+                <a:gridCol w="1892968">
+                  <a:extLst>
+                    <a:ext uri="{9D8B030D-6E8A-4147-A177-3AD203B41FA5}">
+                      <a16:colId xmlns:a16="http://schemas.microsoft.com/office/drawing/2014/main" val="1862839425"/>
+                    </a:ext>
+                  </a:extLst>
+                </a:gridCol>
+              </a:tblGrid>
+              <a:tr h="472897">
+                <a:tc>
+                  <a:txBody>
+                    <a:bodyPr/>
+                    <a:lstStyle/>
+                    <a:p>
+                      <a:pPr algn="l" fontAlgn="b">
+                        <a:buNone/>
+                      </a:pPr>
+                      <a:r>
+                        <a:rPr lang="en-GB" sz="1800" b="1" i="0" u="none" strike="noStrike" dirty="0">
+                          <a:solidFill>
+                            <a:schemeClr val="bg1"/>
+                          </a:solidFill>
+                          <a:effectLst/>
+                          <a:latin typeface="Aptos Narrow" panose="020B0004020202020204" pitchFamily="34" charset="0"/>
+                        </a:rPr>
+                        <a:t>Type</a:t>
+                      </a:r>
+                    </a:p>
+                  </a:txBody>
+                  <a:tcPr anchor="ctr"/>
+                </a:tc>
+                <a:tc>
+                  <a:txBody>
+                    <a:bodyPr/>
+                    <a:lstStyle/>
+                    <a:p>
+                      <a:pPr algn="l" fontAlgn="b">
+                        <a:buNone/>
+                      </a:pPr>
+                      <a:r>
+                        <a:rPr lang="en-GB" sz="1800" b="1" i="0" u="none" strike="noStrike" dirty="0">
+                          <a:solidFill>
+                            <a:schemeClr val="bg1"/>
+                          </a:solidFill>
+                          <a:effectLst/>
+                          <a:latin typeface="Aptos Narrow" panose="020B0004020202020204" pitchFamily="34" charset="0"/>
+                        </a:rPr>
+                        <a:t>Value</a:t>
+                      </a:r>
+                    </a:p>
+                  </a:txBody>
+                  <a:tcPr anchor="ctr"/>
+                </a:tc>
+                <a:tc>
+                  <a:txBody>
+                    <a:bodyPr/>
+                    <a:lstStyle/>
+                    <a:p>
+                      <a:pPr algn="l" fontAlgn="b">
+                        <a:buNone/>
+                      </a:pPr>
+                      <a:r>
+                        <a:rPr lang="en-GB" sz="1800" b="1" i="0" u="none" strike="noStrike" dirty="0">
+                          <a:solidFill>
+                            <a:schemeClr val="bg1"/>
+                          </a:solidFill>
+                          <a:effectLst/>
+                          <a:latin typeface="Aptos Narrow" panose="020B0004020202020204" pitchFamily="34" charset="0"/>
+                        </a:rPr>
+                        <a:t>Rank</a:t>
+                      </a:r>
+                    </a:p>
+                  </a:txBody>
+                  <a:tcPr anchor="ctr"/>
+                </a:tc>
+                <a:tc>
+                  <a:txBody>
+                    <a:bodyPr/>
+                    <a:lstStyle/>
+                    <a:p>
+                      <a:pPr algn="l" fontAlgn="b">
+                        <a:buNone/>
+                      </a:pPr>
+                      <a:r>
+                        <a:rPr lang="en-GB" sz="1800" b="1" i="0" u="none" strike="noStrike" dirty="0">
+                          <a:solidFill>
+                            <a:schemeClr val="bg1"/>
+                          </a:solidFill>
+                          <a:effectLst/>
+                          <a:latin typeface="Aptos Narrow" panose="020B0004020202020204" pitchFamily="34" charset="0"/>
+                        </a:rPr>
+                        <a:t>Top in %</a:t>
+                      </a:r>
+                    </a:p>
+                  </a:txBody>
+                  <a:tcPr anchor="ctr"/>
+                </a:tc>
+                <a:extLst>
+                  <a:ext uri="{0D108BD9-81ED-4DB2-BD59-A6C34878D82A}">
+                    <a16:rowId xmlns:a16="http://schemas.microsoft.com/office/drawing/2014/main" val="2445361585"/>
+                  </a:ext>
+                </a:extLst>
+              </a:tr>
+              <a:tr h="472897">
+                <a:tc>
+                  <a:txBody>
+                    <a:bodyPr/>
+                    <a:lstStyle/>
+                    <a:p>
+                      <a:pPr algn="l" fontAlgn="b">
+                        <a:buNone/>
+                      </a:pPr>
+                      <a:r>
+                        <a:rPr lang="en-GB" sz="1800" b="0" i="0" u="none" strike="noStrike">
+                          <a:solidFill>
+                            <a:srgbClr val="000000"/>
+                          </a:solidFill>
+                          <a:effectLst/>
+                          <a:latin typeface="Aptos Narrow" panose="020B0004020202020204" pitchFamily="34" charset="0"/>
+                        </a:rPr>
+                        <a:t>Follower Count</a:t>
+                      </a:r>
+                    </a:p>
+                  </a:txBody>
+                  <a:tcPr marL="9525" marR="9525" marT="9525" marB="0" anchor="b"/>
+                </a:tc>
+                <a:tc>
+                  <a:txBody>
+                    <a:bodyPr/>
+                    <a:lstStyle/>
+                    <a:p>
+                      <a:pPr algn="l" fontAlgn="b">
+                        <a:buNone/>
+                      </a:pPr>
+                      <a:r>
+                        <a:rPr lang="en-CH" sz="1800" b="0" i="0" u="none" strike="noStrike">
+                          <a:solidFill>
+                            <a:srgbClr val="000000"/>
+                          </a:solidFill>
+                          <a:effectLst/>
+                          <a:latin typeface="Aptos Narrow" panose="020B0004020202020204" pitchFamily="34" charset="0"/>
+                        </a:rPr>
+                        <a:t>507</a:t>
+                      </a:r>
+                    </a:p>
+                  </a:txBody>
+                  <a:tcPr marL="9525" marR="9525" marT="9525" marB="0" anchor="b"/>
+                </a:tc>
+                <a:tc>
+                  <a:txBody>
+                    <a:bodyPr/>
+                    <a:lstStyle/>
+                    <a:p>
+                      <a:pPr algn="l" fontAlgn="b">
+                        <a:buNone/>
+                      </a:pPr>
+                      <a:r>
+                        <a:rPr lang="en-CH" sz="1800" b="0" i="0" u="none" strike="noStrike">
+                          <a:solidFill>
+                            <a:srgbClr val="000000"/>
+                          </a:solidFill>
+                          <a:effectLst/>
+                          <a:latin typeface="Aptos Narrow" panose="020B0004020202020204" pitchFamily="34" charset="0"/>
+                        </a:rPr>
+                        <a:t>6455</a:t>
+                      </a:r>
+                    </a:p>
+                  </a:txBody>
+                  <a:tcPr marL="9525" marR="9525" marT="9525" marB="0" anchor="b"/>
+                </a:tc>
+                <a:tc>
+                  <a:txBody>
+                    <a:bodyPr/>
+                    <a:lstStyle/>
+                    <a:p>
+                      <a:pPr algn="l" fontAlgn="b">
+                        <a:buNone/>
+                      </a:pPr>
+                      <a:r>
+                        <a:rPr lang="en-CH" sz="1800" b="0" i="0" u="none" strike="noStrike">
+                          <a:solidFill>
+                            <a:srgbClr val="000000"/>
+                          </a:solidFill>
+                          <a:effectLst/>
+                          <a:latin typeface="Aptos Narrow" panose="020B0004020202020204" pitchFamily="34" charset="0"/>
+                        </a:rPr>
+                        <a:t>1.32</a:t>
+                      </a:r>
+                    </a:p>
+                  </a:txBody>
+                  <a:tcPr marL="9525" marR="9525" marT="9525" marB="0" anchor="b"/>
+                </a:tc>
+                <a:extLst>
+                  <a:ext uri="{0D108BD9-81ED-4DB2-BD59-A6C34878D82A}">
+                    <a16:rowId xmlns:a16="http://schemas.microsoft.com/office/drawing/2014/main" val="762743734"/>
+                  </a:ext>
+                </a:extLst>
+              </a:tr>
+              <a:tr h="472897">
+                <a:tc>
+                  <a:txBody>
+                    <a:bodyPr/>
+                    <a:lstStyle/>
+                    <a:p>
+                      <a:pPr algn="l" fontAlgn="b">
+                        <a:buNone/>
+                      </a:pPr>
+                      <a:r>
+                        <a:rPr lang="en-GB" sz="1800" b="0" i="0" u="none" strike="noStrike">
+                          <a:solidFill>
+                            <a:srgbClr val="000000"/>
+                          </a:solidFill>
+                          <a:effectLst/>
+                          <a:latin typeface="Aptos Narrow" panose="020B0004020202020204" pitchFamily="34" charset="0"/>
+                        </a:rPr>
+                        <a:t>Following Count</a:t>
+                      </a:r>
+                    </a:p>
+                  </a:txBody>
+                  <a:tcPr marL="9525" marR="9525" marT="9525" marB="0" anchor="b"/>
+                </a:tc>
+                <a:tc>
+                  <a:txBody>
+                    <a:bodyPr/>
+                    <a:lstStyle/>
+                    <a:p>
+                      <a:pPr algn="l" fontAlgn="b">
+                        <a:buNone/>
+                      </a:pPr>
+                      <a:r>
+                        <a:rPr lang="en-CH" sz="1800" b="0" i="0" u="none" strike="noStrike" dirty="0">
+                          <a:solidFill>
+                            <a:srgbClr val="000000"/>
+                          </a:solidFill>
+                          <a:effectLst/>
+                          <a:latin typeface="Aptos Narrow" panose="020B0004020202020204" pitchFamily="34" charset="0"/>
+                        </a:rPr>
+                        <a:t>940</a:t>
+                      </a:r>
+                    </a:p>
+                  </a:txBody>
+                  <a:tcPr marL="9525" marR="9525" marT="9525" marB="0" anchor="b"/>
+                </a:tc>
+                <a:tc>
+                  <a:txBody>
+                    <a:bodyPr/>
+                    <a:lstStyle/>
+                    <a:p>
+                      <a:pPr algn="l" fontAlgn="b">
+                        <a:buNone/>
+                      </a:pPr>
+                      <a:r>
+                        <a:rPr lang="en-CH" sz="1800" b="0" i="0" u="none" strike="noStrike">
+                          <a:solidFill>
+                            <a:srgbClr val="000000"/>
+                          </a:solidFill>
+                          <a:effectLst/>
+                          <a:latin typeface="Aptos Narrow" panose="020B0004020202020204" pitchFamily="34" charset="0"/>
+                        </a:rPr>
+                        <a:t>1926</a:t>
+                      </a:r>
+                    </a:p>
+                  </a:txBody>
+                  <a:tcPr marL="9525" marR="9525" marT="9525" marB="0" anchor="b"/>
+                </a:tc>
+                <a:tc>
+                  <a:txBody>
+                    <a:bodyPr/>
+                    <a:lstStyle/>
+                    <a:p>
+                      <a:pPr algn="l" fontAlgn="b">
+                        <a:buNone/>
+                      </a:pPr>
+                      <a:r>
+                        <a:rPr lang="en-CH" sz="1800" b="0" i="0" u="none" strike="noStrike">
+                          <a:solidFill>
+                            <a:srgbClr val="000000"/>
+                          </a:solidFill>
+                          <a:effectLst/>
+                          <a:latin typeface="Aptos Narrow" panose="020B0004020202020204" pitchFamily="34" charset="0"/>
+                        </a:rPr>
+                        <a:t>0.39</a:t>
+                      </a:r>
+                    </a:p>
+                  </a:txBody>
+                  <a:tcPr marL="9525" marR="9525" marT="9525" marB="0" anchor="b"/>
+                </a:tc>
+                <a:extLst>
+                  <a:ext uri="{0D108BD9-81ED-4DB2-BD59-A6C34878D82A}">
+                    <a16:rowId xmlns:a16="http://schemas.microsoft.com/office/drawing/2014/main" val="81564572"/>
+                  </a:ext>
+                </a:extLst>
+              </a:tr>
+              <a:tr h="472897">
+                <a:tc>
+                  <a:txBody>
+                    <a:bodyPr/>
+                    <a:lstStyle/>
+                    <a:p>
+                      <a:pPr algn="l" fontAlgn="b">
+                        <a:buNone/>
+                      </a:pPr>
+                      <a:r>
+                        <a:rPr lang="en-GB" sz="1800" b="0" i="0" u="none" strike="noStrike">
+                          <a:solidFill>
+                            <a:srgbClr val="000000"/>
+                          </a:solidFill>
+                          <a:effectLst/>
+                          <a:latin typeface="Aptos Narrow" panose="020B0004020202020204" pitchFamily="34" charset="0"/>
+                        </a:rPr>
+                        <a:t>Posts Created</a:t>
+                      </a:r>
+                    </a:p>
+                  </a:txBody>
+                  <a:tcPr marL="9525" marR="9525" marT="9525" marB="0" anchor="b"/>
+                </a:tc>
+                <a:tc>
+                  <a:txBody>
+                    <a:bodyPr/>
+                    <a:lstStyle/>
+                    <a:p>
+                      <a:pPr algn="l" fontAlgn="b">
+                        <a:buNone/>
+                      </a:pPr>
+                      <a:r>
+                        <a:rPr lang="en-CH" sz="1800" b="0" i="0" u="none" strike="noStrike" dirty="0">
+                          <a:solidFill>
+                            <a:srgbClr val="000000"/>
+                          </a:solidFill>
+                          <a:effectLst/>
+                          <a:latin typeface="Aptos Narrow" panose="020B0004020202020204" pitchFamily="34" charset="0"/>
+                        </a:rPr>
+                        <a:t>2</a:t>
+                      </a:r>
+                    </a:p>
+                  </a:txBody>
+                  <a:tcPr marL="9525" marR="9525" marT="9525" marB="0" anchor="b"/>
+                </a:tc>
+                <a:tc>
+                  <a:txBody>
+                    <a:bodyPr/>
+                    <a:lstStyle/>
+                    <a:p>
+                      <a:pPr algn="l" fontAlgn="b">
+                        <a:buNone/>
+                      </a:pPr>
+                      <a:r>
+                        <a:rPr lang="en-CH" sz="1800" b="0" i="0" u="none" strike="noStrike">
+                          <a:solidFill>
+                            <a:srgbClr val="000000"/>
+                          </a:solidFill>
+                          <a:effectLst/>
+                          <a:latin typeface="Aptos Narrow" panose="020B0004020202020204" pitchFamily="34" charset="0"/>
+                        </a:rPr>
+                        <a:t>163603</a:t>
+                      </a:r>
+                    </a:p>
+                  </a:txBody>
+                  <a:tcPr marL="9525" marR="9525" marT="9525" marB="0" anchor="b"/>
+                </a:tc>
+                <a:tc>
+                  <a:txBody>
+                    <a:bodyPr/>
+                    <a:lstStyle/>
+                    <a:p>
+                      <a:pPr algn="l" fontAlgn="b">
+                        <a:buNone/>
+                      </a:pPr>
+                      <a:r>
+                        <a:rPr lang="en-CH" sz="1800" b="0" i="0" u="none" strike="noStrike">
+                          <a:solidFill>
+                            <a:srgbClr val="000000"/>
+                          </a:solidFill>
+                          <a:effectLst/>
+                          <a:latin typeface="Aptos Narrow" panose="020B0004020202020204" pitchFamily="34" charset="0"/>
+                        </a:rPr>
+                        <a:t>35.32</a:t>
+                      </a:r>
+                    </a:p>
+                  </a:txBody>
+                  <a:tcPr marL="9525" marR="9525" marT="9525" marB="0" anchor="b"/>
+                </a:tc>
+                <a:extLst>
+                  <a:ext uri="{0D108BD9-81ED-4DB2-BD59-A6C34878D82A}">
+                    <a16:rowId xmlns:a16="http://schemas.microsoft.com/office/drawing/2014/main" val="437662955"/>
+                  </a:ext>
+                </a:extLst>
+              </a:tr>
+              <a:tr h="711775">
+                <a:tc>
+                  <a:txBody>
+                    <a:bodyPr/>
+                    <a:lstStyle/>
+                    <a:p>
+                      <a:pPr algn="l" fontAlgn="b">
+                        <a:buNone/>
+                      </a:pPr>
+                      <a:r>
+                        <a:rPr lang="en-GB" sz="1800" b="0" i="0" u="none" strike="noStrike">
+                          <a:solidFill>
+                            <a:srgbClr val="000000"/>
+                          </a:solidFill>
+                          <a:effectLst/>
+                          <a:latin typeface="Aptos Narrow" panose="020B0004020202020204" pitchFamily="34" charset="0"/>
+                        </a:rPr>
+                        <a:t>Likes Received per Post (on average)</a:t>
+                      </a:r>
+                    </a:p>
+                  </a:txBody>
+                  <a:tcPr marL="9525" marR="9525" marT="9525" marB="0" anchor="b"/>
+                </a:tc>
+                <a:tc>
+                  <a:txBody>
+                    <a:bodyPr/>
+                    <a:lstStyle/>
+                    <a:p>
+                      <a:pPr algn="l" fontAlgn="b">
+                        <a:buNone/>
+                      </a:pPr>
+                      <a:r>
+                        <a:rPr lang="en-CH" sz="1800" b="0" i="0" u="none" strike="noStrike" dirty="0">
+                          <a:solidFill>
+                            <a:srgbClr val="000000"/>
+                          </a:solidFill>
+                          <a:effectLst/>
+                          <a:latin typeface="Aptos Narrow" panose="020B0004020202020204" pitchFamily="34" charset="0"/>
+                        </a:rPr>
+                        <a:t>78.5</a:t>
+                      </a:r>
+                    </a:p>
+                  </a:txBody>
+                  <a:tcPr marL="9525" marR="9525" marT="9525" marB="0" anchor="b"/>
+                </a:tc>
+                <a:tc>
+                  <a:txBody>
+                    <a:bodyPr/>
+                    <a:lstStyle/>
+                    <a:p>
+                      <a:pPr algn="l" fontAlgn="b">
+                        <a:buNone/>
+                      </a:pPr>
+                      <a:r>
+                        <a:rPr lang="en-CH" sz="1800" b="0" i="0" u="none" strike="noStrike">
+                          <a:solidFill>
+                            <a:srgbClr val="000000"/>
+                          </a:solidFill>
+                          <a:effectLst/>
+                          <a:latin typeface="Aptos Narrow" panose="020B0004020202020204" pitchFamily="34" charset="0"/>
+                        </a:rPr>
+                        <a:t>1</a:t>
+                      </a:r>
+                    </a:p>
+                  </a:txBody>
+                  <a:tcPr marL="9525" marR="9525" marT="9525" marB="0" anchor="b"/>
+                </a:tc>
+                <a:tc>
+                  <a:txBody>
+                    <a:bodyPr/>
+                    <a:lstStyle/>
+                    <a:p>
+                      <a:pPr algn="l" fontAlgn="b">
+                        <a:buNone/>
+                      </a:pPr>
+                      <a:r>
+                        <a:rPr lang="en-CH" sz="1800" b="0" i="0" u="none" strike="noStrike">
+                          <a:solidFill>
+                            <a:srgbClr val="000000"/>
+                          </a:solidFill>
+                          <a:effectLst/>
+                          <a:latin typeface="Aptos Narrow" panose="020B0004020202020204" pitchFamily="34" charset="0"/>
+                        </a:rPr>
+                        <a:t>0</a:t>
+                      </a:r>
+                    </a:p>
+                  </a:txBody>
+                  <a:tcPr marL="9525" marR="9525" marT="9525" marB="0" anchor="b"/>
+                </a:tc>
+                <a:extLst>
+                  <a:ext uri="{0D108BD9-81ED-4DB2-BD59-A6C34878D82A}">
+                    <a16:rowId xmlns:a16="http://schemas.microsoft.com/office/drawing/2014/main" val="1161320379"/>
+                  </a:ext>
+                </a:extLst>
+              </a:tr>
+              <a:tr h="472897">
+                <a:tc>
+                  <a:txBody>
+                    <a:bodyPr/>
+                    <a:lstStyle/>
+                    <a:p>
+                      <a:pPr algn="l" fontAlgn="b">
+                        <a:buNone/>
+                      </a:pPr>
+                      <a:r>
+                        <a:rPr lang="en-GB" sz="1800" b="1" i="0" u="none" strike="noStrike">
+                          <a:solidFill>
+                            <a:srgbClr val="000000"/>
+                          </a:solidFill>
+                          <a:effectLst/>
+                          <a:latin typeface="Aptos Narrow" panose="020B0004020202020204" pitchFamily="34" charset="0"/>
+                        </a:rPr>
+                        <a:t>Likes Given</a:t>
+                      </a:r>
+                    </a:p>
+                  </a:txBody>
+                  <a:tcPr marL="9525" marR="9525" marT="9525" marB="0" anchor="b"/>
+                </a:tc>
+                <a:tc>
+                  <a:txBody>
+                    <a:bodyPr/>
+                    <a:lstStyle/>
+                    <a:p>
+                      <a:pPr algn="l" fontAlgn="b">
+                        <a:buNone/>
+                      </a:pPr>
+                      <a:r>
+                        <a:rPr lang="en-CH" sz="1800" b="1" i="0" u="none" strike="noStrike" dirty="0">
+                          <a:solidFill>
+                            <a:srgbClr val="000000"/>
+                          </a:solidFill>
+                          <a:effectLst/>
+                          <a:latin typeface="Aptos Narrow" panose="020B0004020202020204" pitchFamily="34" charset="0"/>
+                        </a:rPr>
+                        <a:t>25,224.0</a:t>
+                      </a:r>
+                    </a:p>
+                  </a:txBody>
+                  <a:tcPr marL="9525" marR="9525" marT="9525" marB="0" anchor="b"/>
+                </a:tc>
+                <a:tc>
+                  <a:txBody>
+                    <a:bodyPr/>
+                    <a:lstStyle/>
+                    <a:p>
+                      <a:pPr algn="l" fontAlgn="b">
+                        <a:buNone/>
+                      </a:pPr>
+                      <a:r>
+                        <a:rPr lang="en-CH" sz="1800" b="1" i="0" u="none" strike="noStrike" dirty="0">
+                          <a:solidFill>
+                            <a:srgbClr val="000000"/>
+                          </a:solidFill>
+                          <a:effectLst/>
+                          <a:latin typeface="Aptos Narrow" panose="020B0004020202020204" pitchFamily="34" charset="0"/>
+                        </a:rPr>
+                        <a:t>1</a:t>
+                      </a:r>
+                    </a:p>
+                  </a:txBody>
+                  <a:tcPr marL="9525" marR="9525" marT="9525" marB="0" anchor="b"/>
+                </a:tc>
+                <a:tc>
+                  <a:txBody>
+                    <a:bodyPr/>
+                    <a:lstStyle/>
+                    <a:p>
+                      <a:pPr algn="l" fontAlgn="b">
+                        <a:buNone/>
+                      </a:pPr>
+                      <a:r>
+                        <a:rPr lang="en-CH" sz="1800" b="1" i="0" u="none" strike="noStrike" dirty="0">
+                          <a:solidFill>
+                            <a:srgbClr val="000000"/>
+                          </a:solidFill>
+                          <a:effectLst/>
+                          <a:latin typeface="Aptos Narrow" panose="020B0004020202020204" pitchFamily="34" charset="0"/>
+                        </a:rPr>
+                        <a:t>0</a:t>
+                      </a:r>
+                    </a:p>
+                  </a:txBody>
+                  <a:tcPr marL="9525" marR="9525" marT="9525" marB="0" anchor="b"/>
+                </a:tc>
+                <a:extLst>
+                  <a:ext uri="{0D108BD9-81ED-4DB2-BD59-A6C34878D82A}">
+                    <a16:rowId xmlns:a16="http://schemas.microsoft.com/office/drawing/2014/main" val="1554292978"/>
+                  </a:ext>
+                </a:extLst>
+              </a:tr>
+              <a:tr h="711775">
+                <a:tc>
+                  <a:txBody>
+                    <a:bodyPr/>
+                    <a:lstStyle/>
+                    <a:p>
+                      <a:pPr algn="l" fontAlgn="b">
+                        <a:buNone/>
+                      </a:pPr>
+                      <a:r>
+                        <a:rPr lang="en-GB" sz="1800" b="0" i="0" u="none" strike="noStrike">
+                          <a:solidFill>
+                            <a:srgbClr val="000000"/>
+                          </a:solidFill>
+                          <a:effectLst/>
+                          <a:latin typeface="Aptos Narrow" panose="020B0004020202020204" pitchFamily="34" charset="0"/>
+                        </a:rPr>
+                        <a:t>Comments Received per Post (on average)</a:t>
+                      </a:r>
+                    </a:p>
+                  </a:txBody>
+                  <a:tcPr marL="9525" marR="9525" marT="9525" marB="0" anchor="b"/>
+                </a:tc>
+                <a:tc>
+                  <a:txBody>
+                    <a:bodyPr/>
+                    <a:lstStyle/>
+                    <a:p>
+                      <a:pPr algn="l" fontAlgn="b">
+                        <a:buNone/>
+                      </a:pPr>
+                      <a:r>
+                        <a:rPr lang="en-CH" sz="1800" b="0" i="0" u="none" strike="noStrike">
+                          <a:solidFill>
+                            <a:srgbClr val="000000"/>
+                          </a:solidFill>
+                          <a:effectLst/>
+                          <a:latin typeface="Aptos Narrow" panose="020B0004020202020204" pitchFamily="34" charset="0"/>
+                        </a:rPr>
+                        <a:t>26</a:t>
+                      </a:r>
+                    </a:p>
+                  </a:txBody>
+                  <a:tcPr marL="9525" marR="9525" marT="9525" marB="0" anchor="b"/>
+                </a:tc>
+                <a:tc>
+                  <a:txBody>
+                    <a:bodyPr/>
+                    <a:lstStyle/>
+                    <a:p>
+                      <a:pPr algn="l" fontAlgn="b">
+                        <a:buNone/>
+                      </a:pPr>
+                      <a:r>
+                        <a:rPr lang="en-CH" sz="1800" b="0" i="0" u="none" strike="noStrike" dirty="0">
+                          <a:solidFill>
+                            <a:srgbClr val="000000"/>
+                          </a:solidFill>
+                          <a:effectLst/>
+                          <a:latin typeface="Aptos Narrow" panose="020B0004020202020204" pitchFamily="34" charset="0"/>
+                        </a:rPr>
+                        <a:t>25</a:t>
+                      </a:r>
+                    </a:p>
+                  </a:txBody>
+                  <a:tcPr marL="9525" marR="9525" marT="9525" marB="0" anchor="b"/>
+                </a:tc>
+                <a:tc>
+                  <a:txBody>
+                    <a:bodyPr/>
+                    <a:lstStyle/>
+                    <a:p>
+                      <a:pPr algn="l" fontAlgn="b">
+                        <a:buNone/>
+                      </a:pPr>
+                      <a:r>
+                        <a:rPr lang="en-CH" sz="1800" b="0" i="0" u="none" strike="noStrike" dirty="0">
+                          <a:solidFill>
+                            <a:srgbClr val="000000"/>
+                          </a:solidFill>
+                          <a:effectLst/>
+                          <a:latin typeface="Aptos Narrow" panose="020B0004020202020204" pitchFamily="34" charset="0"/>
+                        </a:rPr>
+                        <a:t>0.01</a:t>
+                      </a:r>
+                    </a:p>
+                  </a:txBody>
+                  <a:tcPr marL="9525" marR="9525" marT="9525" marB="0" anchor="b"/>
+                </a:tc>
+                <a:extLst>
+                  <a:ext uri="{0D108BD9-81ED-4DB2-BD59-A6C34878D82A}">
+                    <a16:rowId xmlns:a16="http://schemas.microsoft.com/office/drawing/2014/main" val="2399198692"/>
+                  </a:ext>
+                </a:extLst>
+              </a:tr>
+              <a:tr h="472897">
+                <a:tc>
+                  <a:txBody>
+                    <a:bodyPr/>
+                    <a:lstStyle/>
+                    <a:p>
+                      <a:pPr algn="l" fontAlgn="b">
+                        <a:buNone/>
+                      </a:pPr>
+                      <a:r>
+                        <a:rPr lang="en-GB" sz="1800" b="0" i="0" u="none" strike="noStrike">
+                          <a:solidFill>
+                            <a:srgbClr val="000000"/>
+                          </a:solidFill>
+                          <a:effectLst/>
+                          <a:latin typeface="Aptos Narrow" panose="020B0004020202020204" pitchFamily="34" charset="0"/>
+                        </a:rPr>
+                        <a:t>Comments Given</a:t>
+                      </a:r>
+                    </a:p>
+                  </a:txBody>
+                  <a:tcPr marL="9525" marR="9525" marT="9525" marB="0" anchor="b"/>
+                </a:tc>
+                <a:tc>
+                  <a:txBody>
+                    <a:bodyPr/>
+                    <a:lstStyle/>
+                    <a:p>
+                      <a:pPr algn="l" fontAlgn="b">
+                        <a:buNone/>
+                      </a:pPr>
+                      <a:r>
+                        <a:rPr lang="en-CH" sz="1800" b="0" i="0" u="none" strike="noStrike">
+                          <a:solidFill>
+                            <a:srgbClr val="000000"/>
+                          </a:solidFill>
+                          <a:effectLst/>
+                          <a:latin typeface="Aptos Narrow" panose="020B0004020202020204" pitchFamily="34" charset="0"/>
+                        </a:rPr>
+                        <a:t>2</a:t>
+                      </a:r>
+                    </a:p>
+                  </a:txBody>
+                  <a:tcPr marL="9525" marR="9525" marT="9525" marB="0" anchor="b"/>
+                </a:tc>
+                <a:tc>
+                  <a:txBody>
+                    <a:bodyPr/>
+                    <a:lstStyle/>
+                    <a:p>
+                      <a:pPr algn="l" fontAlgn="b">
+                        <a:buNone/>
+                      </a:pPr>
+                      <a:r>
+                        <a:rPr lang="en-CH" sz="1800" b="0" i="0" u="none" strike="noStrike">
+                          <a:solidFill>
+                            <a:srgbClr val="000000"/>
+                          </a:solidFill>
+                          <a:effectLst/>
+                          <a:latin typeface="Aptos Narrow" panose="020B0004020202020204" pitchFamily="34" charset="0"/>
+                        </a:rPr>
+                        <a:t>25251</a:t>
+                      </a:r>
+                    </a:p>
+                  </a:txBody>
+                  <a:tcPr marL="9525" marR="9525" marT="9525" marB="0" anchor="b"/>
+                </a:tc>
+                <a:tc>
+                  <a:txBody>
+                    <a:bodyPr/>
+                    <a:lstStyle/>
+                    <a:p>
+                      <a:pPr algn="l" fontAlgn="b">
+                        <a:buNone/>
+                      </a:pPr>
+                      <a:r>
+                        <a:rPr lang="en-CH" sz="1800" b="0" i="0" u="none" strike="noStrike" dirty="0">
+                          <a:solidFill>
+                            <a:srgbClr val="000000"/>
+                          </a:solidFill>
+                          <a:effectLst/>
+                          <a:latin typeface="Aptos Narrow" panose="020B0004020202020204" pitchFamily="34" charset="0"/>
+                        </a:rPr>
+                        <a:t>5.69</a:t>
+                      </a:r>
+                    </a:p>
+                  </a:txBody>
+                  <a:tcPr marL="9525" marR="9525" marT="9525" marB="0" anchor="b"/>
+                </a:tc>
+                <a:extLst>
+                  <a:ext uri="{0D108BD9-81ED-4DB2-BD59-A6C34878D82A}">
+                    <a16:rowId xmlns:a16="http://schemas.microsoft.com/office/drawing/2014/main" val="38688272"/>
+                  </a:ext>
+                </a:extLst>
+              </a:tr>
+            </a:tbl>
+          </a:graphicData>
+        </a:graphic>
+      </p:graphicFrame>
+      <p:sp>
+        <p:nvSpPr>
+          <p:cNvPr id="4" name="Slide Number Placeholder 3">
+            <a:extLst>
+              <a:ext uri="{FF2B5EF4-FFF2-40B4-BE49-F238E27FC236}">
+                <a16:creationId xmlns:a16="http://schemas.microsoft.com/office/drawing/2014/main" id="{7DE26470-DBF2-914E-1934-8CD02922DACD}"/>
+              </a:ext>
+            </a:extLst>
+          </p:cNvPr>
+          <p:cNvSpPr>
+            <a:spLocks noGrp="1"/>
+          </p:cNvSpPr>
+          <p:nvPr>
+            <p:ph type="sldNum" sz="quarter" idx="12"/>
+          </p:nvPr>
+        </p:nvSpPr>
+        <p:spPr/>
+        <p:txBody>
+          <a:bodyPr/>
+          <a:lstStyle/>
+          <a:p>
+            <a:fld id="{ABC65B0B-110A-D646-808D-174EFAE956EB}" type="slidenum">
+              <a:rPr lang="en-CH" smtClean="0"/>
+              <a:t>20</a:t>
+            </a:fld>
+            <a:endParaRPr lang="en-CH"/>
+          </a:p>
+        </p:txBody>
+      </p:sp>
+      <p:sp>
+        <p:nvSpPr>
+          <p:cNvPr id="6" name="TextBox 5">
+            <a:extLst>
+              <a:ext uri="{FF2B5EF4-FFF2-40B4-BE49-F238E27FC236}">
+                <a16:creationId xmlns:a16="http://schemas.microsoft.com/office/drawing/2014/main" id="{5269FD2B-0396-EDDE-E4EA-DE420F2BB1DA}"/>
+              </a:ext>
+            </a:extLst>
+          </p:cNvPr>
+          <p:cNvSpPr txBox="1"/>
+          <p:nvPr/>
+        </p:nvSpPr>
+        <p:spPr>
+          <a:xfrm>
+            <a:off x="838199" y="6123543"/>
+            <a:ext cx="10325840" cy="430887"/>
+          </a:xfrm>
+          <a:prstGeom prst="rect">
+            <a:avLst/>
+          </a:prstGeom>
+          <a:noFill/>
+        </p:spPr>
+        <p:txBody>
+          <a:bodyPr wrap="none" rtlCol="0">
+            <a:spAutoFit/>
+          </a:bodyPr>
+          <a:lstStyle/>
+          <a:p>
+            <a:r>
+              <a:rPr lang="en-CH" sz="2200" dirty="0"/>
+              <a:t>Algorithms that detected outlier: </a:t>
+            </a:r>
+            <a:r>
+              <a:rPr lang="en-GB" sz="2200" dirty="0"/>
+              <a:t>Multivariate Gaussian, k-Means, </a:t>
+            </a:r>
+            <a:r>
+              <a:rPr lang="en-GB" sz="2200" dirty="0" err="1"/>
+              <a:t>kNN</a:t>
+            </a:r>
+            <a:r>
+              <a:rPr lang="en-GB" sz="2200" dirty="0"/>
+              <a:t>, </a:t>
+            </a:r>
+            <a:r>
+              <a:rPr lang="en-GB" sz="2200" dirty="0" err="1"/>
+              <a:t>iForest</a:t>
+            </a:r>
+            <a:r>
+              <a:rPr lang="en-GB" sz="2200" dirty="0"/>
+              <a:t>, PCA</a:t>
+            </a:r>
+            <a:endParaRPr lang="en-CH" sz="2200" dirty="0"/>
+          </a:p>
+        </p:txBody>
+      </p:sp>
+    </p:spTree>
+    <p:extLst>
+      <p:ext uri="{BB962C8B-B14F-4D97-AF65-F5344CB8AC3E}">
+        <p14:creationId xmlns:p14="http://schemas.microsoft.com/office/powerpoint/2010/main" val="1530786088"/>
       </p:ext>
     </p:extLst>
   </p:cSld>
@@ -11768,7 +11933,13 @@
           <a:p>
             <a:r>
               <a:rPr lang="en-CH" dirty="0"/>
-              <a:t>Create more attributes of the users (e.g.: political view score based on profile and post descriptions)</a:t>
+              <a:t>Create more attributes of the users (e.g.: gender, political view and academic level based on profile and post descriptions)</a:t>
+            </a:r>
+          </a:p>
+          <a:p>
+            <a:r>
+              <a:rPr lang="en-CH" dirty="0"/>
+              <a:t>Create association rules within the friendfeed network and social circles (e.g. if the users are using facebook, they are likely to also use twitter)</a:t>
             </a:r>
           </a:p>
         </p:txBody>

</xml_diff>

<commit_message>
Final state of presentation
</commit_message>
<xml_diff>
--- a/project/project-presentation-group51.pptx
+++ b/project/project-presentation-group51.pptx
@@ -5,7 +5,7 @@
     <p:sldMasterId id="2147483648" r:id="rId1"/>
   </p:sldMasterIdLst>
   <p:notesMasterIdLst>
-    <p:notesMasterId r:id="rId33"/>
+    <p:notesMasterId r:id="rId30"/>
   </p:notesMasterIdLst>
   <p:sldIdLst>
     <p:sldId id="256" r:id="rId2"/>
@@ -15,30 +15,27 @@
     <p:sldId id="284" r:id="rId6"/>
     <p:sldId id="285" r:id="rId7"/>
     <p:sldId id="286" r:id="rId8"/>
-    <p:sldId id="287" r:id="rId9"/>
-    <p:sldId id="258" r:id="rId10"/>
-    <p:sldId id="257" r:id="rId11"/>
-    <p:sldId id="266" r:id="rId12"/>
-    <p:sldId id="268" r:id="rId13"/>
-    <p:sldId id="261" r:id="rId14"/>
-    <p:sldId id="288" r:id="rId15"/>
-    <p:sldId id="279" r:id="rId16"/>
-    <p:sldId id="282" r:id="rId17"/>
-    <p:sldId id="289" r:id="rId18"/>
-    <p:sldId id="290" r:id="rId19"/>
-    <p:sldId id="291" r:id="rId20"/>
-    <p:sldId id="293" r:id="rId21"/>
-    <p:sldId id="292" r:id="rId22"/>
-    <p:sldId id="294" r:id="rId23"/>
-    <p:sldId id="298" r:id="rId24"/>
-    <p:sldId id="264" r:id="rId25"/>
-    <p:sldId id="269" r:id="rId26"/>
-    <p:sldId id="283" r:id="rId27"/>
-    <p:sldId id="295" r:id="rId28"/>
-    <p:sldId id="296" r:id="rId29"/>
-    <p:sldId id="297" r:id="rId30"/>
-    <p:sldId id="281" r:id="rId31"/>
-    <p:sldId id="274" r:id="rId32"/>
+    <p:sldId id="258" r:id="rId9"/>
+    <p:sldId id="257" r:id="rId10"/>
+    <p:sldId id="266" r:id="rId11"/>
+    <p:sldId id="268" r:id="rId12"/>
+    <p:sldId id="261" r:id="rId13"/>
+    <p:sldId id="288" r:id="rId14"/>
+    <p:sldId id="279" r:id="rId15"/>
+    <p:sldId id="289" r:id="rId16"/>
+    <p:sldId id="290" r:id="rId17"/>
+    <p:sldId id="291" r:id="rId18"/>
+    <p:sldId id="292" r:id="rId19"/>
+    <p:sldId id="294" r:id="rId20"/>
+    <p:sldId id="298" r:id="rId21"/>
+    <p:sldId id="264" r:id="rId22"/>
+    <p:sldId id="269" r:id="rId23"/>
+    <p:sldId id="283" r:id="rId24"/>
+    <p:sldId id="295" r:id="rId25"/>
+    <p:sldId id="296" r:id="rId26"/>
+    <p:sldId id="297" r:id="rId27"/>
+    <p:sldId id="281" r:id="rId28"/>
+    <p:sldId id="274" r:id="rId29"/>
   </p:sldIdLst>
   <p:sldSz cx="12192000" cy="6858000"/>
   <p:notesSz cx="6858000" cy="9144000"/>
@@ -647,7 +644,7 @@
           <a:p>
             <a:fld id="{9D5711ED-9794-EB46-8888-A9216C3D6C48}" type="slidenum">
               <a:rPr lang="en-CH" smtClean="0"/>
-              <a:t>13</a:t>
+              <a:t>12</a:t>
             </a:fld>
             <a:endParaRPr lang="en-CH"/>
           </a:p>
@@ -758,7 +755,7 @@
           <a:p>
             <a:fld id="{9D5711ED-9794-EB46-8888-A9216C3D6C48}" type="slidenum">
               <a:rPr lang="en-CH" smtClean="0"/>
-              <a:t>14</a:t>
+              <a:t>13</a:t>
             </a:fld>
             <a:endParaRPr lang="en-CH"/>
           </a:p>
@@ -842,7 +839,7 @@
           <a:p>
             <a:fld id="{9D5711ED-9794-EB46-8888-A9216C3D6C48}" type="slidenum">
               <a:rPr lang="en-CH" smtClean="0"/>
-              <a:t>15</a:t>
+              <a:t>14</a:t>
             </a:fld>
             <a:endParaRPr lang="en-CH"/>
           </a:p>
@@ -862,100 +859,6 @@
 </file>
 
 <file path=ppt/notesSlides/notesSlide5.xml><?xml version="1.0" encoding="utf-8"?>
-<p:notes xmlns:a="http://schemas.openxmlformats.org/drawingml/2006/main" xmlns:r="http://schemas.openxmlformats.org/officeDocument/2006/relationships" xmlns:p="http://schemas.openxmlformats.org/presentationml/2006/main">
-  <p:cSld>
-    <p:spTree>
-      <p:nvGrpSpPr>
-        <p:cNvPr id="1" name=""/>
-        <p:cNvGrpSpPr/>
-        <p:nvPr/>
-      </p:nvGrpSpPr>
-      <p:grpSpPr>
-        <a:xfrm>
-          <a:off x="0" y="0"/>
-          <a:ext cx="0" cy="0"/>
-          <a:chOff x="0" y="0"/>
-          <a:chExt cx="0" cy="0"/>
-        </a:xfrm>
-      </p:grpSpPr>
-      <p:sp>
-        <p:nvSpPr>
-          <p:cNvPr id="2" name="Slide Image Placeholder 1"/>
-          <p:cNvSpPr>
-            <a:spLocks noGrp="1" noRot="1" noChangeAspect="1"/>
-          </p:cNvSpPr>
-          <p:nvPr>
-            <p:ph type="sldImg"/>
-          </p:nvPr>
-        </p:nvSpPr>
-        <p:spPr/>
-      </p:sp>
-      <p:sp>
-        <p:nvSpPr>
-          <p:cNvPr id="3" name="Notes Placeholder 2"/>
-          <p:cNvSpPr>
-            <a:spLocks noGrp="1"/>
-          </p:cNvSpPr>
-          <p:nvPr>
-            <p:ph type="body" idx="1"/>
-          </p:nvPr>
-        </p:nvSpPr>
-        <p:spPr/>
-        <p:txBody>
-          <a:bodyPr/>
-          <a:lstStyle/>
-          <a:p>
-            <a:r>
-              <a:rPr lang="en-CH" dirty="0"/>
-              <a:t>RQ 1:</a:t>
-            </a:r>
-            <a:br>
-              <a:rPr lang="en-CH" dirty="0"/>
-            </a:br>
-            <a:r>
-              <a:rPr lang="en-CH" dirty="0"/>
-              <a:t>Is it possible to identify distinct social circles within the Friendfeed network based on user connections, and characterize them in terms of shared interests and activity patterns? </a:t>
-            </a:r>
-          </a:p>
-        </p:txBody>
-      </p:sp>
-      <p:sp>
-        <p:nvSpPr>
-          <p:cNvPr id="4" name="Slide Number Placeholder 3"/>
-          <p:cNvSpPr>
-            <a:spLocks noGrp="1"/>
-          </p:cNvSpPr>
-          <p:nvPr>
-            <p:ph type="sldNum" sz="quarter" idx="5"/>
-          </p:nvPr>
-        </p:nvSpPr>
-        <p:spPr/>
-        <p:txBody>
-          <a:bodyPr/>
-          <a:lstStyle/>
-          <a:p>
-            <a:fld id="{9D5711ED-9794-EB46-8888-A9216C3D6C48}" type="slidenum">
-              <a:rPr lang="en-CH" smtClean="0"/>
-              <a:t>16</a:t>
-            </a:fld>
-            <a:endParaRPr lang="en-CH"/>
-          </a:p>
-        </p:txBody>
-      </p:sp>
-    </p:spTree>
-    <p:extLst>
-      <p:ext uri="{BB962C8B-B14F-4D97-AF65-F5344CB8AC3E}">
-        <p14:creationId xmlns:p14="http://schemas.microsoft.com/office/powerpoint/2010/main" val="3928392192"/>
-      </p:ext>
-    </p:extLst>
-  </p:cSld>
-  <p:clrMapOvr>
-    <a:masterClrMapping/>
-  </p:clrMapOvr>
-</p:notes>
-</file>
-
-<file path=ppt/notesSlides/notesSlide6.xml><?xml version="1.0" encoding="utf-8"?>
 <p:notes xmlns:a="http://schemas.openxmlformats.org/drawingml/2006/main" xmlns:r="http://schemas.openxmlformats.org/officeDocument/2006/relationships" xmlns:p="http://schemas.openxmlformats.org/presentationml/2006/main">
   <p:cSld>
     <p:spTree>
@@ -1071,7 +974,7 @@
           <a:p>
             <a:fld id="{9D5711ED-9794-EB46-8888-A9216C3D6C48}" type="slidenum">
               <a:rPr lang="en-CH" smtClean="0"/>
-              <a:t>23</a:t>
+              <a:t>20</a:t>
             </a:fld>
             <a:endParaRPr lang="en-CH"/>
           </a:p>
@@ -1081,6 +984,221 @@
     <p:extLst>
       <p:ext uri="{BB962C8B-B14F-4D97-AF65-F5344CB8AC3E}">
         <p14:creationId xmlns:p14="http://schemas.microsoft.com/office/powerpoint/2010/main" val="1958987553"/>
+      </p:ext>
+    </p:extLst>
+  </p:cSld>
+  <p:clrMapOvr>
+    <a:masterClrMapping/>
+  </p:clrMapOvr>
+</p:notes>
+</file>
+
+<file path=ppt/notesSlides/notesSlide6.xml><?xml version="1.0" encoding="utf-8"?>
+<p:notes xmlns:a="http://schemas.openxmlformats.org/drawingml/2006/main" xmlns:r="http://schemas.openxmlformats.org/officeDocument/2006/relationships" xmlns:p="http://schemas.openxmlformats.org/presentationml/2006/main">
+  <p:cSld>
+    <p:spTree>
+      <p:nvGrpSpPr>
+        <p:cNvPr id="1" name=""/>
+        <p:cNvGrpSpPr/>
+        <p:nvPr/>
+      </p:nvGrpSpPr>
+      <p:grpSpPr>
+        <a:xfrm>
+          <a:off x="0" y="0"/>
+          <a:ext cx="0" cy="0"/>
+          <a:chOff x="0" y="0"/>
+          <a:chExt cx="0" cy="0"/>
+        </a:xfrm>
+      </p:grpSpPr>
+      <p:sp>
+        <p:nvSpPr>
+          <p:cNvPr id="2" name="Slide Image Placeholder 1"/>
+          <p:cNvSpPr>
+            <a:spLocks noGrp="1" noRot="1" noChangeAspect="1"/>
+          </p:cNvSpPr>
+          <p:nvPr>
+            <p:ph type="sldImg"/>
+          </p:nvPr>
+        </p:nvSpPr>
+        <p:spPr/>
+      </p:sp>
+      <p:sp>
+        <p:nvSpPr>
+          <p:cNvPr id="3" name="Notes Placeholder 2"/>
+          <p:cNvSpPr>
+            <a:spLocks noGrp="1"/>
+          </p:cNvSpPr>
+          <p:nvPr>
+            <p:ph type="body" idx="1"/>
+          </p:nvPr>
+        </p:nvSpPr>
+        <p:spPr/>
+        <p:txBody>
+          <a:bodyPr/>
+          <a:lstStyle/>
+          <a:p>
+            <a:r>
+              <a:rPr lang="en-GB" b="1" dirty="0"/>
+              <a:t>1. Statistical Approach</a:t>
+            </a:r>
+            <a:endParaRPr lang="en-GB" dirty="0"/>
+          </a:p>
+          <a:p>
+            <a:r>
+              <a:rPr lang="en-GB" dirty="0"/>
+              <a:t>Identifies points that have a low probability of belonging to an assumed data distribution (e.g., Gaussian).</a:t>
+            </a:r>
+          </a:p>
+          <a:p>
+            <a:r>
+              <a:rPr lang="en-GB" b="1" dirty="0"/>
+              <a:t>2. Clustering-based Approach</a:t>
+            </a:r>
+            <a:endParaRPr lang="en-GB" dirty="0"/>
+          </a:p>
+          <a:p>
+            <a:r>
+              <a:rPr lang="en-GB" dirty="0"/>
+              <a:t>Flags data points that are the furthest from the </a:t>
+            </a:r>
+            <a:r>
+              <a:rPr lang="en-GB" dirty="0" err="1"/>
+              <a:t>center</a:t>
+            </a:r>
+            <a:r>
+              <a:rPr lang="en-GB" dirty="0"/>
+              <a:t> of their assigned cluster.</a:t>
+            </a:r>
+          </a:p>
+          <a:p>
+            <a:r>
+              <a:rPr lang="en-GB" b="1" dirty="0"/>
+              <a:t>3. Distance-based Approach (k-NN -&gt; k nearest </a:t>
+            </a:r>
+            <a:r>
+              <a:rPr lang="en-GB" b="1" dirty="0" err="1"/>
+              <a:t>neighbots</a:t>
+            </a:r>
+            <a:r>
+              <a:rPr lang="en-GB" b="1" dirty="0"/>
+              <a:t>)</a:t>
+            </a:r>
+            <a:endParaRPr lang="en-GB" dirty="0"/>
+          </a:p>
+          <a:p>
+            <a:r>
+              <a:rPr lang="en-GB" dirty="0"/>
+              <a:t>Considers points with the largest distances to their nearest </a:t>
+            </a:r>
+            <a:r>
+              <a:rPr lang="en-GB" dirty="0" err="1"/>
+              <a:t>neighbors</a:t>
+            </a:r>
+            <a:r>
+              <a:rPr lang="en-GB" dirty="0"/>
+              <a:t> as outliers.</a:t>
+            </a:r>
+          </a:p>
+          <a:p>
+            <a:r>
+              <a:rPr lang="en-GB" b="1" dirty="0"/>
+              <a:t>4. Density-based Approach (LOF -&gt; Local Outlier Factor))</a:t>
+            </a:r>
+            <a:endParaRPr lang="en-GB" dirty="0"/>
+          </a:p>
+          <a:p>
+            <a:r>
+              <a:rPr lang="en-GB" dirty="0"/>
+              <a:t>Finds outliers in areas of significantly lower point density compared to their local </a:t>
+            </a:r>
+            <a:r>
+              <a:rPr lang="en-GB" dirty="0" err="1"/>
+              <a:t>neighborhood</a:t>
+            </a:r>
+            <a:r>
+              <a:rPr lang="en-GB" dirty="0"/>
+              <a:t>.</a:t>
+            </a:r>
+          </a:p>
+          <a:p>
+            <a:r>
+              <a:rPr lang="en-GB" b="1" dirty="0"/>
+              <a:t>5. Isolation-based Approach (</a:t>
+            </a:r>
+            <a:r>
+              <a:rPr lang="en-GB" b="1" dirty="0" err="1"/>
+              <a:t>iForest</a:t>
+            </a:r>
+            <a:r>
+              <a:rPr lang="en-GB" b="1" dirty="0"/>
+              <a:t>)</a:t>
+            </a:r>
+            <a:endParaRPr lang="en-GB" dirty="0"/>
+          </a:p>
+          <a:p>
+            <a:r>
+              <a:rPr lang="en-GB" dirty="0"/>
+              <a:t>Based on the principle that anomalies are easier to separate (isolate) from the main data.</a:t>
+            </a:r>
+          </a:p>
+          <a:p>
+            <a:r>
+              <a:rPr lang="en-GB" b="1" dirty="0"/>
+              <a:t>6. One-Class SVM</a:t>
+            </a:r>
+            <a:endParaRPr lang="en-GB" dirty="0"/>
+          </a:p>
+          <a:p>
+            <a:r>
+              <a:rPr lang="en-GB" dirty="0"/>
+              <a:t>Learns a boundary that encloses the majority of the data; points falling outside are flagged as outliers.</a:t>
+            </a:r>
+          </a:p>
+          <a:p>
+            <a:r>
+              <a:rPr lang="en-GB" b="1" dirty="0"/>
+              <a:t>7. Reconstruction-based Approach (PCA)</a:t>
+            </a:r>
+            <a:endParaRPr lang="en-GB" dirty="0"/>
+          </a:p>
+          <a:p>
+            <a:r>
+              <a:rPr lang="en-GB" dirty="0"/>
+              <a:t>Flags points with a high error when being reconstructed from a compressed, lower-dimensional version of the data.</a:t>
+            </a:r>
+          </a:p>
+          <a:p>
+            <a:endParaRPr lang="en-CH" dirty="0"/>
+          </a:p>
+        </p:txBody>
+      </p:sp>
+      <p:sp>
+        <p:nvSpPr>
+          <p:cNvPr id="4" name="Slide Number Placeholder 3"/>
+          <p:cNvSpPr>
+            <a:spLocks noGrp="1"/>
+          </p:cNvSpPr>
+          <p:nvPr>
+            <p:ph type="sldNum" sz="quarter" idx="5"/>
+          </p:nvPr>
+        </p:nvSpPr>
+        <p:spPr/>
+        <p:txBody>
+          <a:bodyPr/>
+          <a:lstStyle/>
+          <a:p>
+            <a:fld id="{9D5711ED-9794-EB46-8888-A9216C3D6C48}" type="slidenum">
+              <a:rPr lang="en-CH" smtClean="0"/>
+              <a:t>21</a:t>
+            </a:fld>
+            <a:endParaRPr lang="en-CH"/>
+          </a:p>
+        </p:txBody>
+      </p:sp>
+    </p:spTree>
+    <p:extLst>
+      <p:ext uri="{BB962C8B-B14F-4D97-AF65-F5344CB8AC3E}">
+        <p14:creationId xmlns:p14="http://schemas.microsoft.com/office/powerpoint/2010/main" val="80196891"/>
       </p:ext>
     </p:extLst>
   </p:cSld>
@@ -1134,137 +1252,6 @@
           <a:bodyPr/>
           <a:lstStyle/>
           <a:p>
-            <a:r>
-              <a:rPr lang="en-GB" b="1" dirty="0"/>
-              <a:t>1. Statistical Approach</a:t>
-            </a:r>
-            <a:endParaRPr lang="en-GB" dirty="0"/>
-          </a:p>
-          <a:p>
-            <a:r>
-              <a:rPr lang="en-GB" dirty="0"/>
-              <a:t>Identifies points that have a low probability of belonging to an assumed data distribution (e.g., Gaussian).</a:t>
-            </a:r>
-          </a:p>
-          <a:p>
-            <a:r>
-              <a:rPr lang="en-GB" b="1" dirty="0"/>
-              <a:t>2. Clustering-based Approach</a:t>
-            </a:r>
-            <a:endParaRPr lang="en-GB" dirty="0"/>
-          </a:p>
-          <a:p>
-            <a:r>
-              <a:rPr lang="en-GB" dirty="0"/>
-              <a:t>Flags data points that are the furthest from the </a:t>
-            </a:r>
-            <a:r>
-              <a:rPr lang="en-GB" dirty="0" err="1"/>
-              <a:t>center</a:t>
-            </a:r>
-            <a:r>
-              <a:rPr lang="en-GB" dirty="0"/>
-              <a:t> of their assigned cluster.</a:t>
-            </a:r>
-          </a:p>
-          <a:p>
-            <a:r>
-              <a:rPr lang="en-GB" b="1" dirty="0"/>
-              <a:t>3. Distance-based Approach (k-NN -&gt; k nearest </a:t>
-            </a:r>
-            <a:r>
-              <a:rPr lang="en-GB" b="1" dirty="0" err="1"/>
-              <a:t>neighbots</a:t>
-            </a:r>
-            <a:r>
-              <a:rPr lang="en-GB" b="1" dirty="0"/>
-              <a:t>)</a:t>
-            </a:r>
-            <a:endParaRPr lang="en-GB" dirty="0"/>
-          </a:p>
-          <a:p>
-            <a:r>
-              <a:rPr lang="en-GB" dirty="0"/>
-              <a:t>Considers points with the largest distances to their nearest </a:t>
-            </a:r>
-            <a:r>
-              <a:rPr lang="en-GB" dirty="0" err="1"/>
-              <a:t>neighbors</a:t>
-            </a:r>
-            <a:r>
-              <a:rPr lang="en-GB" dirty="0"/>
-              <a:t> as outliers.</a:t>
-            </a:r>
-          </a:p>
-          <a:p>
-            <a:r>
-              <a:rPr lang="en-GB" b="1" dirty="0"/>
-              <a:t>4. Density-based Approach (LOF -&gt; Local Outlier Factor))</a:t>
-            </a:r>
-            <a:endParaRPr lang="en-GB" dirty="0"/>
-          </a:p>
-          <a:p>
-            <a:r>
-              <a:rPr lang="en-GB" dirty="0"/>
-              <a:t>Finds outliers in areas of significantly lower point density compared to their local </a:t>
-            </a:r>
-            <a:r>
-              <a:rPr lang="en-GB" dirty="0" err="1"/>
-              <a:t>neighborhood</a:t>
-            </a:r>
-            <a:r>
-              <a:rPr lang="en-GB" dirty="0"/>
-              <a:t>.</a:t>
-            </a:r>
-          </a:p>
-          <a:p>
-            <a:r>
-              <a:rPr lang="en-GB" b="1" dirty="0"/>
-              <a:t>5. Isolation-based Approach (</a:t>
-            </a:r>
-            <a:r>
-              <a:rPr lang="en-GB" b="1" dirty="0" err="1"/>
-              <a:t>iForest</a:t>
-            </a:r>
-            <a:r>
-              <a:rPr lang="en-GB" b="1" dirty="0"/>
-              <a:t>)</a:t>
-            </a:r>
-            <a:endParaRPr lang="en-GB" dirty="0"/>
-          </a:p>
-          <a:p>
-            <a:r>
-              <a:rPr lang="en-GB" dirty="0"/>
-              <a:t>Based on the principle that anomalies are easier to separate (isolate) from the main data.</a:t>
-            </a:r>
-          </a:p>
-          <a:p>
-            <a:r>
-              <a:rPr lang="en-GB" b="1" dirty="0"/>
-              <a:t>6. One-Class SVM</a:t>
-            </a:r>
-            <a:endParaRPr lang="en-GB" dirty="0"/>
-          </a:p>
-          <a:p>
-            <a:r>
-              <a:rPr lang="en-GB" dirty="0"/>
-              <a:t>Learns a boundary that encloses the majority of the data; points falling outside are flagged as outliers.</a:t>
-            </a:r>
-          </a:p>
-          <a:p>
-            <a:r>
-              <a:rPr lang="en-GB" b="1" dirty="0"/>
-              <a:t>7. Reconstruction-based Approach (PCA)</a:t>
-            </a:r>
-            <a:endParaRPr lang="en-GB" dirty="0"/>
-          </a:p>
-          <a:p>
-            <a:r>
-              <a:rPr lang="en-GB" dirty="0"/>
-              <a:t>Flags points with a high error when being reconstructed from a compressed, lower-dimensional version of the data.</a:t>
-            </a:r>
-          </a:p>
-          <a:p>
             <a:endParaRPr lang="en-CH" dirty="0"/>
           </a:p>
         </p:txBody>
@@ -1286,7 +1273,7 @@
           <a:p>
             <a:fld id="{9D5711ED-9794-EB46-8888-A9216C3D6C48}" type="slidenum">
               <a:rPr lang="en-CH" smtClean="0"/>
-              <a:t>24</a:t>
+              <a:t>23</a:t>
             </a:fld>
             <a:endParaRPr lang="en-CH"/>
           </a:p>
@@ -1295,7 +1282,7 @@
     </p:spTree>
     <p:extLst>
       <p:ext uri="{BB962C8B-B14F-4D97-AF65-F5344CB8AC3E}">
-        <p14:creationId xmlns:p14="http://schemas.microsoft.com/office/powerpoint/2010/main" val="80196891"/>
+        <p14:creationId xmlns:p14="http://schemas.microsoft.com/office/powerpoint/2010/main" val="2982053909"/>
       </p:ext>
     </p:extLst>
   </p:cSld>
@@ -1349,90 +1336,6 @@
           <a:bodyPr/>
           <a:lstStyle/>
           <a:p>
-            <a:endParaRPr lang="en-CH" dirty="0"/>
-          </a:p>
-        </p:txBody>
-      </p:sp>
-      <p:sp>
-        <p:nvSpPr>
-          <p:cNvPr id="4" name="Slide Number Placeholder 3"/>
-          <p:cNvSpPr>
-            <a:spLocks noGrp="1"/>
-          </p:cNvSpPr>
-          <p:nvPr>
-            <p:ph type="sldNum" sz="quarter" idx="5"/>
-          </p:nvPr>
-        </p:nvSpPr>
-        <p:spPr/>
-        <p:txBody>
-          <a:bodyPr/>
-          <a:lstStyle/>
-          <a:p>
-            <a:fld id="{9D5711ED-9794-EB46-8888-A9216C3D6C48}" type="slidenum">
-              <a:rPr lang="en-CH" smtClean="0"/>
-              <a:t>26</a:t>
-            </a:fld>
-            <a:endParaRPr lang="en-CH"/>
-          </a:p>
-        </p:txBody>
-      </p:sp>
-    </p:spTree>
-    <p:extLst>
-      <p:ext uri="{BB962C8B-B14F-4D97-AF65-F5344CB8AC3E}">
-        <p14:creationId xmlns:p14="http://schemas.microsoft.com/office/powerpoint/2010/main" val="2982053909"/>
-      </p:ext>
-    </p:extLst>
-  </p:cSld>
-  <p:clrMapOvr>
-    <a:masterClrMapping/>
-  </p:clrMapOvr>
-</p:notes>
-</file>
-
-<file path=ppt/notesSlides/notesSlide9.xml><?xml version="1.0" encoding="utf-8"?>
-<p:notes xmlns:a="http://schemas.openxmlformats.org/drawingml/2006/main" xmlns:r="http://schemas.openxmlformats.org/officeDocument/2006/relationships" xmlns:p="http://schemas.openxmlformats.org/presentationml/2006/main">
-  <p:cSld>
-    <p:spTree>
-      <p:nvGrpSpPr>
-        <p:cNvPr id="1" name=""/>
-        <p:cNvGrpSpPr/>
-        <p:nvPr/>
-      </p:nvGrpSpPr>
-      <p:grpSpPr>
-        <a:xfrm>
-          <a:off x="0" y="0"/>
-          <a:ext cx="0" cy="0"/>
-          <a:chOff x="0" y="0"/>
-          <a:chExt cx="0" cy="0"/>
-        </a:xfrm>
-      </p:grpSpPr>
-      <p:sp>
-        <p:nvSpPr>
-          <p:cNvPr id="2" name="Slide Image Placeholder 1"/>
-          <p:cNvSpPr>
-            <a:spLocks noGrp="1" noRot="1" noChangeAspect="1"/>
-          </p:cNvSpPr>
-          <p:nvPr>
-            <p:ph type="sldImg"/>
-          </p:nvPr>
-        </p:nvSpPr>
-        <p:spPr/>
-      </p:sp>
-      <p:sp>
-        <p:nvSpPr>
-          <p:cNvPr id="3" name="Notes Placeholder 2"/>
-          <p:cNvSpPr>
-            <a:spLocks noGrp="1"/>
-          </p:cNvSpPr>
-          <p:nvPr>
-            <p:ph type="body" idx="1"/>
-          </p:nvPr>
-        </p:nvSpPr>
-        <p:spPr/>
-        <p:txBody>
-          <a:bodyPr/>
-          <a:lstStyle/>
-          <a:p>
             <a:pPr marL="0" marR="0" lvl="0" indent="0" algn="l" defTabSz="914400" rtl="0" eaLnBrk="1" fontAlgn="auto" latinLnBrk="0" hangingPunct="1">
               <a:lnSpc>
                 <a:spcPct val="100000"/>
@@ -1481,7 +1384,7 @@
           <a:p>
             <a:fld id="{9D5711ED-9794-EB46-8888-A9216C3D6C48}" type="slidenum">
               <a:rPr lang="en-CH" smtClean="0"/>
-              <a:t>30</a:t>
+              <a:t>27</a:t>
             </a:fld>
             <a:endParaRPr lang="en-CH"/>
           </a:p>
@@ -4861,179 +4764,6 @@
   <p:cSld>
     <p:spTree>
       <p:nvGrpSpPr>
-        <p:cNvPr id="1" name=""/>
-        <p:cNvGrpSpPr/>
-        <p:nvPr/>
-      </p:nvGrpSpPr>
-      <p:grpSpPr>
-        <a:xfrm>
-          <a:off x="0" y="0"/>
-          <a:ext cx="0" cy="0"/>
-          <a:chOff x="0" y="0"/>
-          <a:chExt cx="0" cy="0"/>
-        </a:xfrm>
-      </p:grpSpPr>
-      <p:sp>
-        <p:nvSpPr>
-          <p:cNvPr id="2" name="Title 1">
-            <a:extLst>
-              <a:ext uri="{FF2B5EF4-FFF2-40B4-BE49-F238E27FC236}">
-                <a16:creationId xmlns:a16="http://schemas.microsoft.com/office/drawing/2014/main" id="{3108730E-CB4B-A1CE-88EE-1506162CE5DB}"/>
-              </a:ext>
-            </a:extLst>
-          </p:cNvPr>
-          <p:cNvSpPr>
-            <a:spLocks noGrp="1"/>
-          </p:cNvSpPr>
-          <p:nvPr>
-            <p:ph type="title"/>
-          </p:nvPr>
-        </p:nvSpPr>
-        <p:spPr/>
-        <p:txBody>
-          <a:bodyPr/>
-          <a:lstStyle/>
-          <a:p>
-            <a:r>
-              <a:rPr lang="en-CH" dirty="0"/>
-              <a:t>Initial Data Exploration</a:t>
-            </a:r>
-          </a:p>
-        </p:txBody>
-      </p:sp>
-      <p:pic>
-        <p:nvPicPr>
-          <p:cNvPr id="5" name="Content Placeholder 4">
-            <a:extLst>
-              <a:ext uri="{FF2B5EF4-FFF2-40B4-BE49-F238E27FC236}">
-                <a16:creationId xmlns:a16="http://schemas.microsoft.com/office/drawing/2014/main" id="{512F95F2-1D99-48F4-60CC-712C6381F388}"/>
-              </a:ext>
-            </a:extLst>
-          </p:cNvPr>
-          <p:cNvPicPr>
-            <a:picLocks noGrp="1" noChangeAspect="1"/>
-          </p:cNvPicPr>
-          <p:nvPr>
-            <p:ph idx="1"/>
-          </p:nvPr>
-        </p:nvPicPr>
-        <p:blipFill>
-          <a:blip r:embed="rId2"/>
-          <a:srcRect/>
-          <a:stretch/>
-        </p:blipFill>
-        <p:spPr>
-          <a:xfrm>
-            <a:off x="229954" y="1901115"/>
-            <a:ext cx="5194300" cy="4140200"/>
-          </a:xfrm>
-        </p:spPr>
-      </p:pic>
-      <p:pic>
-        <p:nvPicPr>
-          <p:cNvPr id="7" name="Picture 6">
-            <a:extLst>
-              <a:ext uri="{FF2B5EF4-FFF2-40B4-BE49-F238E27FC236}">
-                <a16:creationId xmlns:a16="http://schemas.microsoft.com/office/drawing/2014/main" id="{737E4160-FDEF-68C8-7603-A14445440AE9}"/>
-              </a:ext>
-            </a:extLst>
-          </p:cNvPr>
-          <p:cNvPicPr>
-            <a:picLocks noChangeAspect="1"/>
-          </p:cNvPicPr>
-          <p:nvPr/>
-        </p:nvPicPr>
-        <p:blipFill>
-          <a:blip r:embed="rId3"/>
-          <a:srcRect/>
-          <a:stretch/>
-        </p:blipFill>
-        <p:spPr>
-          <a:xfrm>
-            <a:off x="7590971" y="154698"/>
-            <a:ext cx="4060618" cy="3236581"/>
-          </a:xfrm>
-          <a:prstGeom prst="rect">
-            <a:avLst/>
-          </a:prstGeom>
-        </p:spPr>
-      </p:pic>
-      <p:pic>
-        <p:nvPicPr>
-          <p:cNvPr id="9" name="Picture 8">
-            <a:extLst>
-              <a:ext uri="{FF2B5EF4-FFF2-40B4-BE49-F238E27FC236}">
-                <a16:creationId xmlns:a16="http://schemas.microsoft.com/office/drawing/2014/main" id="{47C9538D-C514-E33E-D134-F1F0E62A59B5}"/>
-              </a:ext>
-            </a:extLst>
-          </p:cNvPr>
-          <p:cNvPicPr>
-            <a:picLocks noChangeAspect="1"/>
-          </p:cNvPicPr>
-          <p:nvPr/>
-        </p:nvPicPr>
-        <p:blipFill>
-          <a:blip r:embed="rId4"/>
-          <a:srcRect/>
-          <a:stretch/>
-        </p:blipFill>
-        <p:spPr>
-          <a:xfrm>
-            <a:off x="7474856" y="3528867"/>
-            <a:ext cx="4176733" cy="3329131"/>
-          </a:xfrm>
-          <a:prstGeom prst="rect">
-            <a:avLst/>
-          </a:prstGeom>
-        </p:spPr>
-      </p:pic>
-      <p:sp>
-        <p:nvSpPr>
-          <p:cNvPr id="3" name="Slide Number Placeholder 2">
-            <a:extLst>
-              <a:ext uri="{FF2B5EF4-FFF2-40B4-BE49-F238E27FC236}">
-                <a16:creationId xmlns:a16="http://schemas.microsoft.com/office/drawing/2014/main" id="{B9021DA9-D207-1D0E-5FBA-289203F0BF85}"/>
-              </a:ext>
-            </a:extLst>
-          </p:cNvPr>
-          <p:cNvSpPr>
-            <a:spLocks noGrp="1"/>
-          </p:cNvSpPr>
-          <p:nvPr>
-            <p:ph type="sldNum" sz="quarter" idx="12"/>
-          </p:nvPr>
-        </p:nvSpPr>
-        <p:spPr/>
-        <p:txBody>
-          <a:bodyPr/>
-          <a:lstStyle/>
-          <a:p>
-            <a:fld id="{ABC65B0B-110A-D646-808D-174EFAE956EB}" type="slidenum">
-              <a:rPr lang="en-CH" smtClean="0"/>
-              <a:t>10</a:t>
-            </a:fld>
-            <a:endParaRPr lang="en-CH"/>
-          </a:p>
-        </p:txBody>
-      </p:sp>
-    </p:spTree>
-    <p:extLst>
-      <p:ext uri="{BB962C8B-B14F-4D97-AF65-F5344CB8AC3E}">
-        <p14:creationId xmlns:p14="http://schemas.microsoft.com/office/powerpoint/2010/main" val="4092990420"/>
-      </p:ext>
-    </p:extLst>
-  </p:cSld>
-  <p:clrMapOvr>
-    <a:masterClrMapping/>
-  </p:clrMapOvr>
-</p:sld>
-</file>
-
-<file path=ppt/slides/slide11.xml><?xml version="1.0" encoding="utf-8"?>
-<p:sld xmlns:a="http://schemas.openxmlformats.org/drawingml/2006/main" xmlns:r="http://schemas.openxmlformats.org/officeDocument/2006/relationships" xmlns:p="http://schemas.openxmlformats.org/presentationml/2006/main">
-  <p:cSld>
-    <p:spTree>
-      <p:nvGrpSpPr>
         <p:cNvPr id="1" name="">
           <a:extLst>
             <a:ext uri="{FF2B5EF4-FFF2-40B4-BE49-F238E27FC236}">
@@ -5160,7 +4890,7 @@
           <a:p>
             <a:fld id="{ABC65B0B-110A-D646-808D-174EFAE956EB}" type="slidenum">
               <a:rPr lang="en-CH" smtClean="0"/>
-              <a:t>11</a:t>
+              <a:t>10</a:t>
             </a:fld>
             <a:endParaRPr lang="en-CH"/>
           </a:p>
@@ -5179,7 +4909,7 @@
 </p:sld>
 </file>
 
-<file path=ppt/slides/slide12.xml><?xml version="1.0" encoding="utf-8"?>
+<file path=ppt/slides/slide11.xml><?xml version="1.0" encoding="utf-8"?>
 <p:sld xmlns:a="http://schemas.openxmlformats.org/drawingml/2006/main" xmlns:r="http://schemas.openxmlformats.org/officeDocument/2006/relationships" xmlns:p="http://schemas.openxmlformats.org/presentationml/2006/main">
   <p:cSld>
     <p:spTree>
@@ -6189,7 +5919,7 @@
           <a:p>
             <a:fld id="{ABC65B0B-110A-D646-808D-174EFAE956EB}" type="slidenum">
               <a:rPr lang="en-CH" smtClean="0"/>
-              <a:t>12</a:t>
+              <a:t>11</a:t>
             </a:fld>
             <a:endParaRPr lang="en-CH"/>
           </a:p>
@@ -6208,7 +5938,7 @@
 </p:sld>
 </file>
 
-<file path=ppt/slides/slide13.xml><?xml version="1.0" encoding="utf-8"?>
+<file path=ppt/slides/slide12.xml><?xml version="1.0" encoding="utf-8"?>
 <p:sld xmlns:a="http://schemas.openxmlformats.org/drawingml/2006/main" xmlns:r="http://schemas.openxmlformats.org/officeDocument/2006/relationships" xmlns:p="http://schemas.openxmlformats.org/presentationml/2006/main">
   <p:cSld>
     <p:spTree>
@@ -6446,7 +6176,7 @@
           <a:p>
             <a:fld id="{ABC65B0B-110A-D646-808D-174EFAE956EB}" type="slidenum">
               <a:rPr lang="en-CH" smtClean="0"/>
-              <a:t>13</a:t>
+              <a:t>12</a:t>
             </a:fld>
             <a:endParaRPr lang="en-CH"/>
           </a:p>
@@ -6465,7 +6195,7 @@
 </p:sld>
 </file>
 
-<file path=ppt/slides/slide14.xml><?xml version="1.0" encoding="utf-8"?>
+<file path=ppt/slides/slide13.xml><?xml version="1.0" encoding="utf-8"?>
 <p:sld xmlns:a="http://schemas.openxmlformats.org/drawingml/2006/main" xmlns:r="http://schemas.openxmlformats.org/officeDocument/2006/relationships" xmlns:p="http://schemas.openxmlformats.org/presentationml/2006/main">
   <p:cSld>
     <p:spTree>
@@ -6612,7 +6342,7 @@
           <a:p>
             <a:fld id="{ABC65B0B-110A-D646-808D-174EFAE956EB}" type="slidenum">
               <a:rPr lang="en-CH" smtClean="0"/>
-              <a:t>14</a:t>
+              <a:t>13</a:t>
             </a:fld>
             <a:endParaRPr lang="en-CH"/>
           </a:p>
@@ -6661,7 +6391,7 @@
 </p:sld>
 </file>
 
-<file path=ppt/slides/slide15.xml><?xml version="1.0" encoding="utf-8"?>
+<file path=ppt/slides/slide14.xml><?xml version="1.0" encoding="utf-8"?>
 <p:sld xmlns:a="http://schemas.openxmlformats.org/drawingml/2006/main" xmlns:r="http://schemas.openxmlformats.org/officeDocument/2006/relationships" xmlns:p="http://schemas.openxmlformats.org/presentationml/2006/main">
   <p:cSld>
     <p:spTree>
@@ -6705,12 +6435,8 @@
           <a:lstStyle/>
           <a:p>
             <a:r>
-              <a:rPr lang="en-US" dirty="0" err="1"/>
-              <a:t>Louvian</a:t>
-            </a:r>
-            <a:r>
               <a:rPr lang="en-US" dirty="0"/>
-              <a:t> - </a:t>
+              <a:t>Leiden - </a:t>
             </a:r>
             <a:r>
               <a:rPr lang="en-CH" dirty="0"/>
@@ -6774,7 +6500,7 @@
           <a:p>
             <a:fld id="{ABC65B0B-110A-D646-808D-174EFAE956EB}" type="slidenum">
               <a:rPr lang="en-CH" smtClean="0"/>
-              <a:t>15</a:t>
+              <a:t>14</a:t>
             </a:fld>
             <a:endParaRPr lang="en-CH"/>
           </a:p>
@@ -7213,6 +6939,205 @@
 </p:sld>
 </file>
 
+<file path=ppt/slides/slide15.xml><?xml version="1.0" encoding="utf-8"?>
+<p:sld xmlns:a="http://schemas.openxmlformats.org/drawingml/2006/main" xmlns:r="http://schemas.openxmlformats.org/officeDocument/2006/relationships" xmlns:p="http://schemas.openxmlformats.org/presentationml/2006/main">
+  <p:cSld>
+    <p:spTree>
+      <p:nvGrpSpPr>
+        <p:cNvPr id="1" name=""/>
+        <p:cNvGrpSpPr/>
+        <p:nvPr/>
+      </p:nvGrpSpPr>
+      <p:grpSpPr>
+        <a:xfrm>
+          <a:off x="0" y="0"/>
+          <a:ext cx="0" cy="0"/>
+          <a:chOff x="0" y="0"/>
+          <a:chExt cx="0" cy="0"/>
+        </a:xfrm>
+      </p:grpSpPr>
+      <p:sp>
+        <p:nvSpPr>
+          <p:cNvPr id="2" name="Title 1">
+            <a:extLst>
+              <a:ext uri="{FF2B5EF4-FFF2-40B4-BE49-F238E27FC236}">
+                <a16:creationId xmlns:a16="http://schemas.microsoft.com/office/drawing/2014/main" id="{16702692-5EE2-6625-CE0E-B435FA0ED391}"/>
+              </a:ext>
+            </a:extLst>
+          </p:cNvPr>
+          <p:cNvSpPr>
+            <a:spLocks noGrp="1"/>
+          </p:cNvSpPr>
+          <p:nvPr>
+            <p:ph type="title"/>
+          </p:nvPr>
+        </p:nvSpPr>
+        <p:spPr>
+          <a:xfrm>
+            <a:off x="838200" y="365126"/>
+            <a:ext cx="10515600" cy="1149910"/>
+          </a:xfrm>
+        </p:spPr>
+        <p:txBody>
+          <a:bodyPr>
+            <a:normAutofit fontScale="90000"/>
+          </a:bodyPr>
+          <a:lstStyle/>
+          <a:p>
+            <a:r>
+              <a:rPr lang="en-US" dirty="0"/>
+              <a:t>Approach for Characterizing Users (Based on Top 3 Services)</a:t>
+            </a:r>
+          </a:p>
+        </p:txBody>
+      </p:sp>
+      <p:sp>
+        <p:nvSpPr>
+          <p:cNvPr id="3" name="Content Placeholder 2">
+            <a:extLst>
+              <a:ext uri="{FF2B5EF4-FFF2-40B4-BE49-F238E27FC236}">
+                <a16:creationId xmlns:a16="http://schemas.microsoft.com/office/drawing/2014/main" id="{2658C697-C5B6-F310-3CC9-4BB8691340DD}"/>
+              </a:ext>
+            </a:extLst>
+          </p:cNvPr>
+          <p:cNvSpPr>
+            <a:spLocks noGrp="1"/>
+          </p:cNvSpPr>
+          <p:nvPr>
+            <p:ph idx="1"/>
+          </p:nvPr>
+        </p:nvSpPr>
+        <p:spPr>
+          <a:xfrm>
+            <a:off x="838200" y="1676400"/>
+            <a:ext cx="10515600" cy="4500563"/>
+          </a:xfrm>
+        </p:spPr>
+        <p:txBody>
+          <a:bodyPr>
+            <a:normAutofit/>
+          </a:bodyPr>
+          <a:lstStyle/>
+          <a:p>
+            <a:pPr marL="0" indent="0">
+              <a:buNone/>
+            </a:pPr>
+            <a:r>
+              <a:rPr lang="en-US" sz="2000" b="1" dirty="0"/>
+              <a:t>Agglomerative approach (Complete Linkage)</a:t>
+            </a:r>
+          </a:p>
+          <a:p>
+            <a:r>
+              <a:rPr lang="en-US" sz="2000" dirty="0"/>
+              <a:t>It is well-suited for detecting </a:t>
+            </a:r>
+            <a:r>
+              <a:rPr lang="en-US" sz="2000" b="1" dirty="0"/>
+              <a:t>nested or naturally forming user communities</a:t>
+            </a:r>
+            <a:r>
+              <a:rPr lang="en-US" sz="2000" dirty="0"/>
+              <a:t> based on their top services.</a:t>
+            </a:r>
+          </a:p>
+          <a:p>
+            <a:r>
+              <a:rPr lang="en-US" sz="2000" dirty="0"/>
+              <a:t>Complete Linkage to add maximum distance between members to ensure compact clusters and avoid chaining.</a:t>
+            </a:r>
+          </a:p>
+          <a:p>
+            <a:pPr marL="0" indent="0">
+              <a:buNone/>
+            </a:pPr>
+            <a:br>
+              <a:rPr lang="en-US" sz="2000" dirty="0"/>
+            </a:br>
+            <a:r>
+              <a:rPr lang="en-US" sz="2200" b="1" dirty="0"/>
+              <a:t>Steps for Clustering </a:t>
+            </a:r>
+            <a:r>
+              <a:rPr lang="en-US" sz="2200" b="1"/>
+              <a:t>User Communities</a:t>
+            </a:r>
+            <a:endParaRPr lang="en-US" sz="2200" b="1" dirty="0"/>
+          </a:p>
+          <a:p>
+            <a:r>
+              <a:rPr lang="en-US" sz="2000" dirty="0"/>
+              <a:t>Removed communities with fewer than 4 users to reduce noise</a:t>
+            </a:r>
+          </a:p>
+          <a:p>
+            <a:r>
+              <a:rPr lang="en-US" sz="2000" dirty="0"/>
+              <a:t>Computed Jaccard distance matrix for categorical (service-type) data</a:t>
+            </a:r>
+          </a:p>
+          <a:p>
+            <a:r>
+              <a:rPr lang="en-US" sz="2000" dirty="0"/>
+              <a:t>Applied Z-linkage to determine the optimal distance threshold and number of clusters</a:t>
+            </a:r>
+          </a:p>
+          <a:p>
+            <a:r>
+              <a:rPr lang="en-US" sz="2000" dirty="0"/>
+              <a:t>Performed Agglomerative Clustering using Complete Linkage to group similar communities</a:t>
+            </a:r>
+          </a:p>
+          <a:p>
+            <a:r>
+              <a:rPr lang="en-US" sz="2000" dirty="0"/>
+              <a:t>Evaluated clustering using the Silhouette Score</a:t>
+            </a:r>
+          </a:p>
+        </p:txBody>
+      </p:sp>
+      <p:sp>
+        <p:nvSpPr>
+          <p:cNvPr id="4" name="Slide Number Placeholder 3">
+            <a:extLst>
+              <a:ext uri="{FF2B5EF4-FFF2-40B4-BE49-F238E27FC236}">
+                <a16:creationId xmlns:a16="http://schemas.microsoft.com/office/drawing/2014/main" id="{57DED087-7A94-9E78-D926-A46975DF6015}"/>
+              </a:ext>
+            </a:extLst>
+          </p:cNvPr>
+          <p:cNvSpPr>
+            <a:spLocks noGrp="1"/>
+          </p:cNvSpPr>
+          <p:nvPr>
+            <p:ph type="sldNum" sz="quarter" idx="12"/>
+          </p:nvPr>
+        </p:nvSpPr>
+        <p:spPr/>
+        <p:txBody>
+          <a:bodyPr/>
+          <a:lstStyle/>
+          <a:p>
+            <a:fld id="{ABC65B0B-110A-D646-808D-174EFAE956EB}" type="slidenum">
+              <a:rPr lang="en-CH" smtClean="0"/>
+              <a:t>15</a:t>
+            </a:fld>
+            <a:endParaRPr lang="en-CH"/>
+          </a:p>
+        </p:txBody>
+      </p:sp>
+    </p:spTree>
+    <p:extLst>
+      <p:ext uri="{BB962C8B-B14F-4D97-AF65-F5344CB8AC3E}">
+        <p14:creationId xmlns:p14="http://schemas.microsoft.com/office/powerpoint/2010/main" val="517412533"/>
+      </p:ext>
+    </p:extLst>
+  </p:cSld>
+  <p:clrMapOvr>
+    <a:masterClrMapping/>
+  </p:clrMapOvr>
+</p:sld>
+</file>
+
 <file path=ppt/slides/slide16.xml><?xml version="1.0" encoding="utf-8"?>
 <p:sld xmlns:a="http://schemas.openxmlformats.org/drawingml/2006/main" xmlns:r="http://schemas.openxmlformats.org/officeDocument/2006/relationships" xmlns:p="http://schemas.openxmlformats.org/presentationml/2006/main">
   <p:cSld>
@@ -7235,387 +7160,6 @@
           <p:cNvPr id="2" name="Title 1">
             <a:extLst>
               <a:ext uri="{FF2B5EF4-FFF2-40B4-BE49-F238E27FC236}">
-                <a16:creationId xmlns:a16="http://schemas.microsoft.com/office/drawing/2014/main" id="{B4046953-F8AC-3A07-DD29-CAC38BC8A222}"/>
-              </a:ext>
-            </a:extLst>
-          </p:cNvPr>
-          <p:cNvSpPr>
-            <a:spLocks noGrp="1"/>
-          </p:cNvSpPr>
-          <p:nvPr>
-            <p:ph type="title"/>
-          </p:nvPr>
-        </p:nvSpPr>
-        <p:spPr/>
-        <p:txBody>
-          <a:bodyPr/>
-          <a:lstStyle/>
-          <a:p>
-            <a:r>
-              <a:rPr lang="en-US" dirty="0"/>
-              <a:t>Characterize social circles based on services</a:t>
-            </a:r>
-            <a:endParaRPr lang="en-CH" dirty="0"/>
-          </a:p>
-        </p:txBody>
-      </p:sp>
-      <p:sp>
-        <p:nvSpPr>
-          <p:cNvPr id="3" name="Content Placeholder 2">
-            <a:extLst>
-              <a:ext uri="{FF2B5EF4-FFF2-40B4-BE49-F238E27FC236}">
-                <a16:creationId xmlns:a16="http://schemas.microsoft.com/office/drawing/2014/main" id="{5C9C55E4-AFFB-BA73-6C91-DF7548FB056B}"/>
-              </a:ext>
-            </a:extLst>
-          </p:cNvPr>
-          <p:cNvSpPr>
-            <a:spLocks noGrp="1"/>
-          </p:cNvSpPr>
-          <p:nvPr>
-            <p:ph idx="1"/>
-          </p:nvPr>
-        </p:nvSpPr>
-        <p:spPr>
-          <a:xfrm>
-            <a:off x="838200" y="1613647"/>
-            <a:ext cx="10515600" cy="1537541"/>
-          </a:xfrm>
-        </p:spPr>
-        <p:txBody>
-          <a:bodyPr>
-            <a:normAutofit/>
-          </a:bodyPr>
-          <a:lstStyle/>
-          <a:p>
-            <a:r>
-              <a:rPr lang="en-US" sz="2400" b="1" dirty="0"/>
-              <a:t>Total Communities Detected using Services:</a:t>
-            </a:r>
-            <a:r>
-              <a:rPr lang="en-US" sz="2400" dirty="0"/>
-              <a:t> 1,438</a:t>
-            </a:r>
-            <a:endParaRPr lang="en-US" sz="2400" b="1" dirty="0"/>
-          </a:p>
-          <a:p>
-            <a:r>
-              <a:rPr lang="en-US" sz="2400" b="1" dirty="0"/>
-              <a:t>Highest Service Count:</a:t>
-            </a:r>
-            <a:r>
-              <a:rPr lang="en-US" sz="2400" dirty="0"/>
-              <a:t> 61 (Community 0, </a:t>
-            </a:r>
-            <a:r>
-              <a:rPr lang="en-US" sz="2400" i="1" dirty="0"/>
-              <a:t>User Count:</a:t>
-            </a:r>
-            <a:r>
-              <a:rPr lang="en-US" sz="2400" dirty="0"/>
-              <a:t> 147,071)</a:t>
-            </a:r>
-          </a:p>
-          <a:p>
-            <a:r>
-              <a:rPr lang="en-US" sz="2400" b="1" dirty="0"/>
-              <a:t>Lowest Service Count:</a:t>
-            </a:r>
-            <a:r>
-              <a:rPr lang="en-US" sz="2400" dirty="0"/>
-              <a:t> 1 (Community 1704, User Count: 2)</a:t>
-            </a:r>
-            <a:endParaRPr lang="en-CH" sz="2400" dirty="0"/>
-          </a:p>
-        </p:txBody>
-      </p:sp>
-      <p:sp>
-        <p:nvSpPr>
-          <p:cNvPr id="4" name="Slide Number Placeholder 3">
-            <a:extLst>
-              <a:ext uri="{FF2B5EF4-FFF2-40B4-BE49-F238E27FC236}">
-                <a16:creationId xmlns:a16="http://schemas.microsoft.com/office/drawing/2014/main" id="{0DF41BE0-8525-3BF1-7388-A5F868254207}"/>
-              </a:ext>
-            </a:extLst>
-          </p:cNvPr>
-          <p:cNvSpPr>
-            <a:spLocks noGrp="1"/>
-          </p:cNvSpPr>
-          <p:nvPr>
-            <p:ph type="sldNum" sz="quarter" idx="12"/>
-          </p:nvPr>
-        </p:nvSpPr>
-        <p:spPr/>
-        <p:txBody>
-          <a:bodyPr/>
-          <a:lstStyle/>
-          <a:p>
-            <a:fld id="{ABC65B0B-110A-D646-808D-174EFAE956EB}" type="slidenum">
-              <a:rPr lang="en-CH" smtClean="0"/>
-              <a:t>16</a:t>
-            </a:fld>
-            <a:endParaRPr lang="en-CH"/>
-          </a:p>
-        </p:txBody>
-      </p:sp>
-      <p:pic>
-        <p:nvPicPr>
-          <p:cNvPr id="6" name="Picture 5">
-            <a:extLst>
-              <a:ext uri="{FF2B5EF4-FFF2-40B4-BE49-F238E27FC236}">
-                <a16:creationId xmlns:a16="http://schemas.microsoft.com/office/drawing/2014/main" id="{EB54EDBC-B3FB-B20A-B420-E5EDE3908E11}"/>
-              </a:ext>
-            </a:extLst>
-          </p:cNvPr>
-          <p:cNvPicPr>
-            <a:picLocks noChangeAspect="1"/>
-          </p:cNvPicPr>
-          <p:nvPr/>
-        </p:nvPicPr>
-        <p:blipFill>
-          <a:blip r:embed="rId3"/>
-          <a:stretch>
-            <a:fillRect/>
-          </a:stretch>
-        </p:blipFill>
-        <p:spPr>
-          <a:xfrm>
-            <a:off x="925697" y="3035683"/>
-            <a:ext cx="5513740" cy="3457192"/>
-          </a:xfrm>
-          <a:prstGeom prst="rect">
-            <a:avLst/>
-          </a:prstGeom>
-        </p:spPr>
-      </p:pic>
-    </p:spTree>
-    <p:extLst>
-      <p:ext uri="{BB962C8B-B14F-4D97-AF65-F5344CB8AC3E}">
-        <p14:creationId xmlns:p14="http://schemas.microsoft.com/office/powerpoint/2010/main" val="2685224527"/>
-      </p:ext>
-    </p:extLst>
-  </p:cSld>
-  <p:clrMapOvr>
-    <a:masterClrMapping/>
-  </p:clrMapOvr>
-</p:sld>
-</file>
-
-<file path=ppt/slides/slide17.xml><?xml version="1.0" encoding="utf-8"?>
-<p:sld xmlns:a="http://schemas.openxmlformats.org/drawingml/2006/main" xmlns:r="http://schemas.openxmlformats.org/officeDocument/2006/relationships" xmlns:p="http://schemas.openxmlformats.org/presentationml/2006/main">
-  <p:cSld>
-    <p:spTree>
-      <p:nvGrpSpPr>
-        <p:cNvPr id="1" name=""/>
-        <p:cNvGrpSpPr/>
-        <p:nvPr/>
-      </p:nvGrpSpPr>
-      <p:grpSpPr>
-        <a:xfrm>
-          <a:off x="0" y="0"/>
-          <a:ext cx="0" cy="0"/>
-          <a:chOff x="0" y="0"/>
-          <a:chExt cx="0" cy="0"/>
-        </a:xfrm>
-      </p:grpSpPr>
-      <p:sp>
-        <p:nvSpPr>
-          <p:cNvPr id="2" name="Title 1">
-            <a:extLst>
-              <a:ext uri="{FF2B5EF4-FFF2-40B4-BE49-F238E27FC236}">
-                <a16:creationId xmlns:a16="http://schemas.microsoft.com/office/drawing/2014/main" id="{16702692-5EE2-6625-CE0E-B435FA0ED391}"/>
-              </a:ext>
-            </a:extLst>
-          </p:cNvPr>
-          <p:cNvSpPr>
-            <a:spLocks noGrp="1"/>
-          </p:cNvSpPr>
-          <p:nvPr>
-            <p:ph type="title"/>
-          </p:nvPr>
-        </p:nvSpPr>
-        <p:spPr>
-          <a:xfrm>
-            <a:off x="838200" y="365126"/>
-            <a:ext cx="10515600" cy="1149910"/>
-          </a:xfrm>
-        </p:spPr>
-        <p:txBody>
-          <a:bodyPr>
-            <a:normAutofit fontScale="90000"/>
-          </a:bodyPr>
-          <a:lstStyle/>
-          <a:p>
-            <a:r>
-              <a:rPr lang="en-US" dirty="0"/>
-              <a:t>Approach for Characterizing Users (Based on Top 3 Services)</a:t>
-            </a:r>
-          </a:p>
-        </p:txBody>
-      </p:sp>
-      <p:sp>
-        <p:nvSpPr>
-          <p:cNvPr id="3" name="Content Placeholder 2">
-            <a:extLst>
-              <a:ext uri="{FF2B5EF4-FFF2-40B4-BE49-F238E27FC236}">
-                <a16:creationId xmlns:a16="http://schemas.microsoft.com/office/drawing/2014/main" id="{2658C697-C5B6-F310-3CC9-4BB8691340DD}"/>
-              </a:ext>
-            </a:extLst>
-          </p:cNvPr>
-          <p:cNvSpPr>
-            <a:spLocks noGrp="1"/>
-          </p:cNvSpPr>
-          <p:nvPr>
-            <p:ph idx="1"/>
-          </p:nvPr>
-        </p:nvSpPr>
-        <p:spPr>
-          <a:xfrm>
-            <a:off x="838200" y="1676400"/>
-            <a:ext cx="10515600" cy="4500563"/>
-          </a:xfrm>
-        </p:spPr>
-        <p:txBody>
-          <a:bodyPr>
-            <a:normAutofit/>
-          </a:bodyPr>
-          <a:lstStyle/>
-          <a:p>
-            <a:pPr marL="0" indent="0">
-              <a:buNone/>
-            </a:pPr>
-            <a:r>
-              <a:rPr lang="en-US" sz="2000" b="1" dirty="0"/>
-              <a:t>Agglomerative approach (Complete Linkage) –</a:t>
-            </a:r>
-          </a:p>
-          <a:p>
-            <a:r>
-              <a:rPr lang="en-US" sz="2000" dirty="0"/>
-              <a:t>It is well-suited for detecting </a:t>
-            </a:r>
-            <a:r>
-              <a:rPr lang="en-US" sz="2000" b="1" dirty="0"/>
-              <a:t>nested or naturally forming user communities</a:t>
-            </a:r>
-            <a:r>
-              <a:rPr lang="en-US" sz="2000" dirty="0"/>
-              <a:t> based on their top services.</a:t>
-            </a:r>
-          </a:p>
-          <a:p>
-            <a:r>
-              <a:rPr lang="en-US" sz="2000" dirty="0"/>
-              <a:t>Complete Linkage to add maximum distance between members to ensure compact clusters and avoid chaining.</a:t>
-            </a:r>
-          </a:p>
-          <a:p>
-            <a:pPr marL="0" indent="0">
-              <a:buNone/>
-            </a:pPr>
-            <a:br>
-              <a:rPr lang="en-US" sz="2000" dirty="0"/>
-            </a:br>
-            <a:r>
-              <a:rPr lang="en-US" sz="2200" b="1" dirty="0"/>
-              <a:t>Steps for Clustering User Communities -</a:t>
-            </a:r>
-          </a:p>
-          <a:p>
-            <a:r>
-              <a:rPr lang="en-US" sz="2000" dirty="0"/>
-              <a:t>Removed communities with fewer than 4 users to reduce noise</a:t>
-            </a:r>
-          </a:p>
-          <a:p>
-            <a:r>
-              <a:rPr lang="en-US" sz="2000" dirty="0"/>
-              <a:t>Computed Jaccard distance matrix for categorical (service-type) data</a:t>
-            </a:r>
-          </a:p>
-          <a:p>
-            <a:r>
-              <a:rPr lang="en-US" sz="2000" dirty="0"/>
-              <a:t>Applied Z-linkage to determine the optimal distance threshold and number of clusters</a:t>
-            </a:r>
-          </a:p>
-          <a:p>
-            <a:r>
-              <a:rPr lang="en-US" sz="2000" dirty="0"/>
-              <a:t>Performed Agglomerative Clustering using Complete Linkage to group similar communities</a:t>
-            </a:r>
-          </a:p>
-          <a:p>
-            <a:r>
-              <a:rPr lang="en-US" sz="2000" dirty="0"/>
-              <a:t>Evaluated clustering using the Silhouette Score</a:t>
-            </a:r>
-          </a:p>
-        </p:txBody>
-      </p:sp>
-      <p:sp>
-        <p:nvSpPr>
-          <p:cNvPr id="4" name="Slide Number Placeholder 3">
-            <a:extLst>
-              <a:ext uri="{FF2B5EF4-FFF2-40B4-BE49-F238E27FC236}">
-                <a16:creationId xmlns:a16="http://schemas.microsoft.com/office/drawing/2014/main" id="{57DED087-7A94-9E78-D926-A46975DF6015}"/>
-              </a:ext>
-            </a:extLst>
-          </p:cNvPr>
-          <p:cNvSpPr>
-            <a:spLocks noGrp="1"/>
-          </p:cNvSpPr>
-          <p:nvPr>
-            <p:ph type="sldNum" sz="quarter" idx="12"/>
-          </p:nvPr>
-        </p:nvSpPr>
-        <p:spPr/>
-        <p:txBody>
-          <a:bodyPr/>
-          <a:lstStyle/>
-          <a:p>
-            <a:fld id="{ABC65B0B-110A-D646-808D-174EFAE956EB}" type="slidenum">
-              <a:rPr lang="en-CH" smtClean="0"/>
-              <a:t>17</a:t>
-            </a:fld>
-            <a:endParaRPr lang="en-CH"/>
-          </a:p>
-        </p:txBody>
-      </p:sp>
-    </p:spTree>
-    <p:extLst>
-      <p:ext uri="{BB962C8B-B14F-4D97-AF65-F5344CB8AC3E}">
-        <p14:creationId xmlns:p14="http://schemas.microsoft.com/office/powerpoint/2010/main" val="517412533"/>
-      </p:ext>
-    </p:extLst>
-  </p:cSld>
-  <p:clrMapOvr>
-    <a:masterClrMapping/>
-  </p:clrMapOvr>
-</p:sld>
-</file>
-
-<file path=ppt/slides/slide18.xml><?xml version="1.0" encoding="utf-8"?>
-<p:sld xmlns:a="http://schemas.openxmlformats.org/drawingml/2006/main" xmlns:r="http://schemas.openxmlformats.org/officeDocument/2006/relationships" xmlns:p="http://schemas.openxmlformats.org/presentationml/2006/main">
-  <p:cSld>
-    <p:spTree>
-      <p:nvGrpSpPr>
-        <p:cNvPr id="1" name=""/>
-        <p:cNvGrpSpPr/>
-        <p:nvPr/>
-      </p:nvGrpSpPr>
-      <p:grpSpPr>
-        <a:xfrm>
-          <a:off x="0" y="0"/>
-          <a:ext cx="0" cy="0"/>
-          <a:chOff x="0" y="0"/>
-          <a:chExt cx="0" cy="0"/>
-        </a:xfrm>
-      </p:grpSpPr>
-      <p:sp>
-        <p:nvSpPr>
-          <p:cNvPr id="2" name="Title 1">
-            <a:extLst>
-              <a:ext uri="{FF2B5EF4-FFF2-40B4-BE49-F238E27FC236}">
                 <a16:creationId xmlns:a16="http://schemas.microsoft.com/office/drawing/2014/main" id="{8C7F2CBE-7398-C4BE-8BAD-2177E004D07D}"/>
               </a:ext>
             </a:extLst>
@@ -7669,7 +7213,7 @@
           <a:p>
             <a:fld id="{ABC65B0B-110A-D646-808D-174EFAE956EB}" type="slidenum">
               <a:rPr lang="en-CH" smtClean="0"/>
-              <a:t>18</a:t>
+              <a:t>16</a:t>
             </a:fld>
             <a:endParaRPr lang="en-CH"/>
           </a:p>
@@ -7986,7 +7530,7 @@
 </p:sld>
 </file>
 
-<file path=ppt/slides/slide19.xml><?xml version="1.0" encoding="utf-8"?>
+<file path=ppt/slides/slide17.xml><?xml version="1.0" encoding="utf-8"?>
 <p:sld xmlns:a="http://schemas.openxmlformats.org/drawingml/2006/main" xmlns:r="http://schemas.openxmlformats.org/officeDocument/2006/relationships" xmlns:p="http://schemas.openxmlformats.org/presentationml/2006/main">
   <p:cSld>
     <p:spTree>
@@ -8026,15 +7570,7 @@
           <a:p>
             <a:r>
               <a:rPr lang="en-US" dirty="0"/>
-              <a:t>Approach for Characterizing Users (Based on </a:t>
-            </a:r>
-            <a:r>
-              <a:rPr lang="en-US" dirty="0" err="1"/>
-              <a:t>activites</a:t>
-            </a:r>
-            <a:r>
-              <a:rPr lang="en-US" dirty="0"/>
-              <a:t>)</a:t>
+              <a:t>Approach for Characterizing Users (Based on activities)</a:t>
             </a:r>
           </a:p>
         </p:txBody>
@@ -8152,7 +7688,7 @@
           <a:p>
             <a:fld id="{ABC65B0B-110A-D646-808D-174EFAE956EB}" type="slidenum">
               <a:rPr lang="en-CH" smtClean="0"/>
-              <a:t>19</a:t>
+              <a:t>17</a:t>
             </a:fld>
             <a:endParaRPr lang="en-CH"/>
           </a:p>
@@ -8171,7 +7707,7 @@
 </p:sld>
 </file>
 
-<file path=ppt/slides/slide2.xml><?xml version="1.0" encoding="utf-8"?>
+<file path=ppt/slides/slide18.xml><?xml version="1.0" encoding="utf-8"?>
 <p:sld xmlns:a="http://schemas.openxmlformats.org/drawingml/2006/main" xmlns:r="http://schemas.openxmlformats.org/officeDocument/2006/relationships" xmlns:p="http://schemas.openxmlformats.org/presentationml/2006/main">
   <p:cSld>
     <p:spTree>
@@ -8193,7 +7729,7 @@
           <p:cNvPr id="2" name="Title 1">
             <a:extLst>
               <a:ext uri="{FF2B5EF4-FFF2-40B4-BE49-F238E27FC236}">
-                <a16:creationId xmlns:a16="http://schemas.microsoft.com/office/drawing/2014/main" id="{6B7CF60A-F9D9-624B-456F-8624123D69EA}"/>
+                <a16:creationId xmlns:a16="http://schemas.microsoft.com/office/drawing/2014/main" id="{09FABF17-B47A-2168-B964-A0FC6C01DEE8}"/>
               </a:ext>
             </a:extLst>
           </p:cNvPr>
@@ -8210,26 +7746,26 @@
           <a:lstStyle/>
           <a:p>
             <a:r>
-              <a:rPr lang="en-CH" dirty="0"/>
-              <a:t>Topics</a:t>
-            </a:r>
-          </a:p>
-        </p:txBody>
-      </p:sp>
-      <p:sp>
-        <p:nvSpPr>
-          <p:cNvPr id="3" name="Content Placeholder 2">
-            <a:extLst>
-              <a:ext uri="{FF2B5EF4-FFF2-40B4-BE49-F238E27FC236}">
-                <a16:creationId xmlns:a16="http://schemas.microsoft.com/office/drawing/2014/main" id="{0E2934B4-16AA-8F2D-D4C1-01E6A7070D03}"/>
-              </a:ext>
-            </a:extLst>
-          </p:cNvPr>
-          <p:cNvSpPr>
-            <a:spLocks noGrp="1"/>
-          </p:cNvSpPr>
-          <p:nvPr>
-            <p:ph idx="1"/>
+              <a:rPr lang="en-US" dirty="0"/>
+              <a:t>DBSCAN Clustering Results</a:t>
+            </a:r>
+          </a:p>
+        </p:txBody>
+      </p:sp>
+      <p:sp>
+        <p:nvSpPr>
+          <p:cNvPr id="4" name="Slide Number Placeholder 3">
+            <a:extLst>
+              <a:ext uri="{FF2B5EF4-FFF2-40B4-BE49-F238E27FC236}">
+                <a16:creationId xmlns:a16="http://schemas.microsoft.com/office/drawing/2014/main" id="{A409BD9C-E516-01F8-2996-1C3A7C6991A1}"/>
+              </a:ext>
+            </a:extLst>
+          </p:cNvPr>
+          <p:cNvSpPr>
+            <a:spLocks noGrp="1"/>
+          </p:cNvSpPr>
+          <p:nvPr>
+            <p:ph type="sldNum" sz="quarter" idx="12"/>
           </p:nvPr>
         </p:nvSpPr>
         <p:spPr/>
@@ -8237,207 +7773,32 @@
           <a:bodyPr/>
           <a:lstStyle/>
           <a:p>
-            <a:r>
-              <a:rPr lang="en-CH" dirty="0"/>
-              <a:t>Research Questions</a:t>
-            </a:r>
-          </a:p>
-          <a:p>
-            <a:r>
-              <a:rPr lang="en-CH" dirty="0"/>
-              <a:t>Data Preprocessing</a:t>
-            </a:r>
-          </a:p>
-          <a:p>
-            <a:r>
-              <a:rPr lang="en-CH" dirty="0"/>
-              <a:t>Initial Data Exploration</a:t>
-            </a:r>
-          </a:p>
-          <a:p>
-            <a:r>
-              <a:rPr lang="en-CH" dirty="0"/>
-              <a:t>Social Circle Detection and Characterization</a:t>
-            </a:r>
-          </a:p>
-          <a:p>
-            <a:r>
-              <a:rPr lang="en-CH" dirty="0"/>
-              <a:t>Anomaly Detection and Characterization</a:t>
-            </a:r>
-          </a:p>
-          <a:p>
-            <a:endParaRPr lang="en-CH" dirty="0"/>
-          </a:p>
-        </p:txBody>
-      </p:sp>
-      <p:sp>
-        <p:nvSpPr>
-          <p:cNvPr id="4" name="Slide Number Placeholder 3">
-            <a:extLst>
-              <a:ext uri="{FF2B5EF4-FFF2-40B4-BE49-F238E27FC236}">
-                <a16:creationId xmlns:a16="http://schemas.microsoft.com/office/drawing/2014/main" id="{E62335AD-A455-6CD8-4025-B346B976952F}"/>
-              </a:ext>
-            </a:extLst>
-          </p:cNvPr>
-          <p:cNvSpPr>
-            <a:spLocks noGrp="1"/>
-          </p:cNvSpPr>
-          <p:nvPr>
-            <p:ph type="sldNum" sz="quarter" idx="12"/>
-          </p:nvPr>
-        </p:nvSpPr>
-        <p:spPr/>
-        <p:txBody>
-          <a:bodyPr/>
-          <a:lstStyle/>
-          <a:p>
             <a:fld id="{ABC65B0B-110A-D646-808D-174EFAE956EB}" type="slidenum">
               <a:rPr lang="en-CH" smtClean="0"/>
-              <a:t>2</a:t>
+              <a:t>18</a:t>
             </a:fld>
             <a:endParaRPr lang="en-CH"/>
           </a:p>
         </p:txBody>
       </p:sp>
-    </p:spTree>
-    <p:extLst>
-      <p:ext uri="{BB962C8B-B14F-4D97-AF65-F5344CB8AC3E}">
-        <p14:creationId xmlns:p14="http://schemas.microsoft.com/office/powerpoint/2010/main" val="3134700"/>
-      </p:ext>
-    </p:extLst>
-  </p:cSld>
-  <p:clrMapOvr>
-    <a:masterClrMapping/>
-  </p:clrMapOvr>
-</p:sld>
-</file>
-
-<file path=ppt/slides/slide20.xml><?xml version="1.0" encoding="utf-8"?>
-<p:sld xmlns:a="http://schemas.openxmlformats.org/drawingml/2006/main" xmlns:r="http://schemas.openxmlformats.org/officeDocument/2006/relationships" xmlns:p="http://schemas.openxmlformats.org/presentationml/2006/main">
-  <p:cSld>
-    <p:spTree>
-      <p:nvGrpSpPr>
-        <p:cNvPr id="1" name=""/>
-        <p:cNvGrpSpPr/>
-        <p:nvPr/>
-      </p:nvGrpSpPr>
-      <p:grpSpPr>
-        <a:xfrm>
-          <a:off x="0" y="0"/>
-          <a:ext cx="0" cy="0"/>
-          <a:chOff x="0" y="0"/>
-          <a:chExt cx="0" cy="0"/>
-        </a:xfrm>
-      </p:grpSpPr>
-      <p:sp>
-        <p:nvSpPr>
-          <p:cNvPr id="2" name="Title 1">
-            <a:extLst>
-              <a:ext uri="{FF2B5EF4-FFF2-40B4-BE49-F238E27FC236}">
-                <a16:creationId xmlns:a16="http://schemas.microsoft.com/office/drawing/2014/main" id="{C51F9C72-0787-AD8B-9FB3-74F86B34F05D}"/>
-              </a:ext>
-            </a:extLst>
-          </p:cNvPr>
-          <p:cNvSpPr>
-            <a:spLocks noGrp="1"/>
-          </p:cNvSpPr>
-          <p:nvPr>
-            <p:ph type="title"/>
-          </p:nvPr>
-        </p:nvSpPr>
-        <p:spPr/>
-        <p:txBody>
-          <a:bodyPr/>
-          <a:lstStyle/>
-          <a:p>
-            <a:r>
-              <a:rPr lang="en-US" b="1" dirty="0"/>
-              <a:t>DBSCAN approach</a:t>
-            </a:r>
-            <a:endParaRPr lang="en-US" dirty="0"/>
-          </a:p>
-        </p:txBody>
-      </p:sp>
-      <p:sp>
-        <p:nvSpPr>
-          <p:cNvPr id="4" name="Slide Number Placeholder 3">
-            <a:extLst>
-              <a:ext uri="{FF2B5EF4-FFF2-40B4-BE49-F238E27FC236}">
-                <a16:creationId xmlns:a16="http://schemas.microsoft.com/office/drawing/2014/main" id="{76F9EFDC-1B21-9423-CF95-EED996F0A701}"/>
-              </a:ext>
-            </a:extLst>
-          </p:cNvPr>
-          <p:cNvSpPr>
-            <a:spLocks noGrp="1"/>
-          </p:cNvSpPr>
-          <p:nvPr>
-            <p:ph type="sldNum" sz="quarter" idx="12"/>
-          </p:nvPr>
-        </p:nvSpPr>
-        <p:spPr/>
-        <p:txBody>
-          <a:bodyPr/>
-          <a:lstStyle/>
-          <a:p>
-            <a:fld id="{ABC65B0B-110A-D646-808D-174EFAE956EB}" type="slidenum">
-              <a:rPr lang="en-CH" smtClean="0"/>
-              <a:t>20</a:t>
-            </a:fld>
-            <a:endParaRPr lang="en-CH"/>
-          </a:p>
-        </p:txBody>
-      </p:sp>
-      <p:pic>
-        <p:nvPicPr>
-          <p:cNvPr id="5" name="Content Placeholder 5">
-            <a:extLst>
-              <a:ext uri="{FF2B5EF4-FFF2-40B4-BE49-F238E27FC236}">
-                <a16:creationId xmlns:a16="http://schemas.microsoft.com/office/drawing/2014/main" id="{0CCCC1D2-CA09-ADE1-4E4E-7C9813A1CB68}"/>
-              </a:ext>
-            </a:extLst>
-          </p:cNvPr>
-          <p:cNvPicPr>
-            <a:picLocks noGrp="1" noChangeAspect="1"/>
-          </p:cNvPicPr>
-          <p:nvPr>
-            <p:ph idx="1"/>
-          </p:nvPr>
-        </p:nvPicPr>
-        <p:blipFill>
-          <a:blip r:embed="rId2"/>
-          <a:stretch>
-            <a:fillRect/>
-          </a:stretch>
-        </p:blipFill>
+      <p:sp>
+        <p:nvSpPr>
+          <p:cNvPr id="8" name="Content Placeholder 2">
+            <a:extLst>
+              <a:ext uri="{FF2B5EF4-FFF2-40B4-BE49-F238E27FC236}">
+                <a16:creationId xmlns:a16="http://schemas.microsoft.com/office/drawing/2014/main" id="{580EE751-4B06-7EC8-8ECE-DAB7AD61D32A}"/>
+              </a:ext>
+            </a:extLst>
+          </p:cNvPr>
+          <p:cNvSpPr txBox="1">
+            <a:spLocks/>
+          </p:cNvSpPr>
+          <p:nvPr/>
+        </p:nvSpPr>
         <p:spPr>
           <a:xfrm>
-            <a:off x="927846" y="2492188"/>
-            <a:ext cx="9601185" cy="3864162"/>
-          </a:xfrm>
-          <a:prstGeom prst="rect">
-            <a:avLst/>
-          </a:prstGeom>
-        </p:spPr>
-      </p:pic>
-      <p:sp>
-        <p:nvSpPr>
-          <p:cNvPr id="6" name="Content Placeholder 2">
-            <a:extLst>
-              <a:ext uri="{FF2B5EF4-FFF2-40B4-BE49-F238E27FC236}">
-                <a16:creationId xmlns:a16="http://schemas.microsoft.com/office/drawing/2014/main" id="{73ED7A92-5F28-E45B-D814-D60AD61A3428}"/>
-              </a:ext>
-            </a:extLst>
-          </p:cNvPr>
-          <p:cNvSpPr txBox="1">
-            <a:spLocks/>
-          </p:cNvSpPr>
-          <p:nvPr/>
-        </p:nvSpPr>
-        <p:spPr>
-          <a:xfrm>
-            <a:off x="838200" y="1690688"/>
-            <a:ext cx="10771094" cy="1189907"/>
+            <a:off x="739588" y="1690688"/>
+            <a:ext cx="6010836" cy="4127405"/>
           </a:xfrm>
           <a:prstGeom prst="rect">
             <a:avLst/>
@@ -8612,218 +7973,502 @@
             </a:lvl9pPr>
           </a:lstStyle>
           <a:p>
-            <a:endParaRPr lang="en-US" sz="2000" b="1" dirty="0"/>
-          </a:p>
-        </p:txBody>
-      </p:sp>
-      <p:sp>
-        <p:nvSpPr>
-          <p:cNvPr id="7" name="Content Placeholder 2">
-            <a:extLst>
-              <a:ext uri="{FF2B5EF4-FFF2-40B4-BE49-F238E27FC236}">
-                <a16:creationId xmlns:a16="http://schemas.microsoft.com/office/drawing/2014/main" id="{CADEB593-0B1B-EFCC-7685-29200BCCD2BA}"/>
-              </a:ext>
-            </a:extLst>
-          </p:cNvPr>
-          <p:cNvSpPr txBox="1">
-            <a:spLocks/>
-          </p:cNvSpPr>
+            <a:pPr marL="0" indent="0">
+              <a:buNone/>
+            </a:pPr>
+            <a:r>
+              <a:rPr lang="en-US" sz="2400" b="1" dirty="0"/>
+              <a:t>Observation:</a:t>
+            </a:r>
+          </a:p>
+          <a:p>
+            <a:r>
+              <a:rPr lang="en-US" sz="2000" dirty="0"/>
+              <a:t>Total clusters detected: 4</a:t>
+            </a:r>
+          </a:p>
+          <a:p>
+            <a:r>
+              <a:rPr lang="en-US" sz="2000" dirty="0"/>
+              <a:t>Noise: 2 communities were identified as noise (assigned to cluster -1)</a:t>
+            </a:r>
+          </a:p>
+          <a:p>
+            <a:r>
+              <a:rPr lang="en-US" sz="2000" dirty="0"/>
+              <a:t>Major cluster: 1,731 communities grouped together, indicating a large, highly similar group</a:t>
+            </a:r>
+          </a:p>
+          <a:p>
+            <a:r>
+              <a:rPr lang="en-US" sz="2000" dirty="0"/>
+              <a:t>Smaller clusters: 4 communities distributed across the remaining 2 clusters, representing small, distinct activity patterns</a:t>
+            </a:r>
+          </a:p>
+        </p:txBody>
+      </p:sp>
+      <p:pic>
+        <p:nvPicPr>
+          <p:cNvPr id="18" name="Picture 17">
+            <a:extLst>
+              <a:ext uri="{FF2B5EF4-FFF2-40B4-BE49-F238E27FC236}">
+                <a16:creationId xmlns:a16="http://schemas.microsoft.com/office/drawing/2014/main" id="{E412AF62-7E1C-2EC8-25CD-E75846847ECB}"/>
+              </a:ext>
+            </a:extLst>
+          </p:cNvPr>
+          <p:cNvPicPr>
+            <a:picLocks noChangeAspect="1"/>
+          </p:cNvPicPr>
           <p:nvPr/>
-        </p:nvSpPr>
+        </p:nvPicPr>
+        <p:blipFill>
+          <a:blip r:embed="rId2"/>
+          <a:stretch>
+            <a:fillRect/>
+          </a:stretch>
+        </p:blipFill>
         <p:spPr>
           <a:xfrm>
-            <a:off x="838200" y="1690688"/>
-            <a:ext cx="10771094" cy="711853"/>
+            <a:off x="6849036" y="1554807"/>
+            <a:ext cx="4800847" cy="4605804"/>
           </a:xfrm>
           <a:prstGeom prst="rect">
             <a:avLst/>
           </a:prstGeom>
         </p:spPr>
-        <p:txBody>
-          <a:bodyPr vert="horz" lIns="91440" tIns="45720" rIns="91440" bIns="45720" rtlCol="0">
-            <a:normAutofit/>
+      </p:pic>
+      <p:sp>
+        <p:nvSpPr>
+          <p:cNvPr id="3" name="TextBox 2">
+            <a:extLst>
+              <a:ext uri="{FF2B5EF4-FFF2-40B4-BE49-F238E27FC236}">
+                <a16:creationId xmlns:a16="http://schemas.microsoft.com/office/drawing/2014/main" id="{2618D8A0-D076-D468-9028-59B7B27B1E97}"/>
+              </a:ext>
+            </a:extLst>
+          </p:cNvPr>
+          <p:cNvSpPr txBox="1"/>
+          <p:nvPr/>
+        </p:nvSpPr>
+        <p:spPr>
+          <a:xfrm rot="16200000">
+            <a:off x="9599412" y="2303268"/>
+            <a:ext cx="4184073" cy="307777"/>
+          </a:xfrm>
+          <a:prstGeom prst="rect">
+            <a:avLst/>
+          </a:prstGeom>
+          <a:solidFill>
+            <a:schemeClr val="bg1"/>
+          </a:solidFill>
+        </p:spPr>
+        <p:txBody>
+          <a:bodyPr wrap="square" rtlCol="0">
+            <a:spAutoFit/>
           </a:bodyPr>
-          <a:lstStyle>
-            <a:lvl1pPr marL="228600" indent="-228600" algn="l" defTabSz="914400" rtl="0" eaLnBrk="1" latinLnBrk="0" hangingPunct="1">
-              <a:lnSpc>
-                <a:spcPct val="90000"/>
-              </a:lnSpc>
-              <a:spcBef>
-                <a:spcPts val="1000"/>
-              </a:spcBef>
-              <a:buFont typeface="Arial" panose="020B0604020202020204" pitchFamily="34" charset="0"/>
-              <a:buChar char="•"/>
-              <a:defRPr sz="2800" kern="1200">
-                <a:solidFill>
-                  <a:schemeClr val="tx1"/>
-                </a:solidFill>
-                <a:latin typeface="+mn-lt"/>
-                <a:ea typeface="+mn-ea"/>
-                <a:cs typeface="+mn-cs"/>
-              </a:defRPr>
-            </a:lvl1pPr>
-            <a:lvl2pPr marL="685800" indent="-228600" algn="l" defTabSz="914400" rtl="0" eaLnBrk="1" latinLnBrk="0" hangingPunct="1">
-              <a:lnSpc>
-                <a:spcPct val="90000"/>
-              </a:lnSpc>
-              <a:spcBef>
-                <a:spcPts val="500"/>
-              </a:spcBef>
-              <a:buFont typeface="Arial" panose="020B0604020202020204" pitchFamily="34" charset="0"/>
-              <a:buChar char="•"/>
-              <a:defRPr sz="2400" kern="1200">
-                <a:solidFill>
-                  <a:schemeClr val="tx1"/>
-                </a:solidFill>
-                <a:latin typeface="+mn-lt"/>
-                <a:ea typeface="+mn-ea"/>
-                <a:cs typeface="+mn-cs"/>
-              </a:defRPr>
-            </a:lvl2pPr>
-            <a:lvl3pPr marL="1143000" indent="-228600" algn="l" defTabSz="914400" rtl="0" eaLnBrk="1" latinLnBrk="0" hangingPunct="1">
-              <a:lnSpc>
-                <a:spcPct val="90000"/>
-              </a:lnSpc>
-              <a:spcBef>
-                <a:spcPts val="500"/>
-              </a:spcBef>
-              <a:buFont typeface="Arial" panose="020B0604020202020204" pitchFamily="34" charset="0"/>
-              <a:buChar char="•"/>
-              <a:defRPr sz="2000" kern="1200">
-                <a:solidFill>
-                  <a:schemeClr val="tx1"/>
-                </a:solidFill>
-                <a:latin typeface="+mn-lt"/>
-                <a:ea typeface="+mn-ea"/>
-                <a:cs typeface="+mn-cs"/>
-              </a:defRPr>
-            </a:lvl3pPr>
-            <a:lvl4pPr marL="1600200" indent="-228600" algn="l" defTabSz="914400" rtl="0" eaLnBrk="1" latinLnBrk="0" hangingPunct="1">
-              <a:lnSpc>
-                <a:spcPct val="90000"/>
-              </a:lnSpc>
-              <a:spcBef>
-                <a:spcPts val="500"/>
-              </a:spcBef>
-              <a:buFont typeface="Arial" panose="020B0604020202020204" pitchFamily="34" charset="0"/>
-              <a:buChar char="•"/>
-              <a:defRPr sz="1800" kern="1200">
-                <a:solidFill>
-                  <a:schemeClr val="tx1"/>
-                </a:solidFill>
-                <a:latin typeface="+mn-lt"/>
-                <a:ea typeface="+mn-ea"/>
-                <a:cs typeface="+mn-cs"/>
-              </a:defRPr>
-            </a:lvl4pPr>
-            <a:lvl5pPr marL="2057400" indent="-228600" algn="l" defTabSz="914400" rtl="0" eaLnBrk="1" latinLnBrk="0" hangingPunct="1">
-              <a:lnSpc>
-                <a:spcPct val="90000"/>
-              </a:lnSpc>
-              <a:spcBef>
-                <a:spcPts val="500"/>
-              </a:spcBef>
-              <a:buFont typeface="Arial" panose="020B0604020202020204" pitchFamily="34" charset="0"/>
-              <a:buChar char="•"/>
-              <a:defRPr sz="1800" kern="1200">
-                <a:solidFill>
-                  <a:schemeClr val="tx1"/>
-                </a:solidFill>
-                <a:latin typeface="+mn-lt"/>
-                <a:ea typeface="+mn-ea"/>
-                <a:cs typeface="+mn-cs"/>
-              </a:defRPr>
-            </a:lvl5pPr>
-            <a:lvl6pPr marL="2514600" indent="-228600" algn="l" defTabSz="914400" rtl="0" eaLnBrk="1" latinLnBrk="0" hangingPunct="1">
-              <a:lnSpc>
-                <a:spcPct val="90000"/>
-              </a:lnSpc>
-              <a:spcBef>
-                <a:spcPts val="500"/>
-              </a:spcBef>
-              <a:buFont typeface="Arial" panose="020B0604020202020204" pitchFamily="34" charset="0"/>
-              <a:buChar char="•"/>
-              <a:defRPr sz="1800" kern="1200">
-                <a:solidFill>
-                  <a:schemeClr val="tx1"/>
-                </a:solidFill>
-                <a:latin typeface="+mn-lt"/>
-                <a:ea typeface="+mn-ea"/>
-                <a:cs typeface="+mn-cs"/>
-              </a:defRPr>
-            </a:lvl6pPr>
-            <a:lvl7pPr marL="2971800" indent="-228600" algn="l" defTabSz="914400" rtl="0" eaLnBrk="1" latinLnBrk="0" hangingPunct="1">
-              <a:lnSpc>
-                <a:spcPct val="90000"/>
-              </a:lnSpc>
-              <a:spcBef>
-                <a:spcPts val="500"/>
-              </a:spcBef>
-              <a:buFont typeface="Arial" panose="020B0604020202020204" pitchFamily="34" charset="0"/>
-              <a:buChar char="•"/>
-              <a:defRPr sz="1800" kern="1200">
-                <a:solidFill>
-                  <a:schemeClr val="tx1"/>
-                </a:solidFill>
-                <a:latin typeface="+mn-lt"/>
-                <a:ea typeface="+mn-ea"/>
-                <a:cs typeface="+mn-cs"/>
-              </a:defRPr>
-            </a:lvl7pPr>
-            <a:lvl8pPr marL="3429000" indent="-228600" algn="l" defTabSz="914400" rtl="0" eaLnBrk="1" latinLnBrk="0" hangingPunct="1">
-              <a:lnSpc>
-                <a:spcPct val="90000"/>
-              </a:lnSpc>
-              <a:spcBef>
-                <a:spcPts val="500"/>
-              </a:spcBef>
-              <a:buFont typeface="Arial" panose="020B0604020202020204" pitchFamily="34" charset="0"/>
-              <a:buChar char="•"/>
-              <a:defRPr sz="1800" kern="1200">
-                <a:solidFill>
-                  <a:schemeClr val="tx1"/>
-                </a:solidFill>
-                <a:latin typeface="+mn-lt"/>
-                <a:ea typeface="+mn-ea"/>
-                <a:cs typeface="+mn-cs"/>
-              </a:defRPr>
-            </a:lvl8pPr>
-            <a:lvl9pPr marL="3886200" indent="-228600" algn="l" defTabSz="914400" rtl="0" eaLnBrk="1" latinLnBrk="0" hangingPunct="1">
-              <a:lnSpc>
-                <a:spcPct val="90000"/>
-              </a:lnSpc>
-              <a:spcBef>
-                <a:spcPts val="500"/>
-              </a:spcBef>
-              <a:buFont typeface="Arial" panose="020B0604020202020204" pitchFamily="34" charset="0"/>
-              <a:buChar char="•"/>
-              <a:defRPr sz="1800" kern="1200">
-                <a:solidFill>
-                  <a:schemeClr val="tx1"/>
-                </a:solidFill>
-                <a:latin typeface="+mn-lt"/>
-                <a:ea typeface="+mn-ea"/>
-                <a:cs typeface="+mn-cs"/>
-              </a:defRPr>
-            </a:lvl9pPr>
-          </a:lstStyle>
-          <a:p>
-            <a:pPr marL="0" indent="0">
-              <a:buFont typeface="Arial" panose="020B0604020202020204" pitchFamily="34" charset="0"/>
-              <a:buNone/>
-            </a:pPr>
-            <a:r>
-              <a:rPr lang="en-US" sz="2000" dirty="0"/>
-              <a:t>Features for DBSCAN clustering </a:t>
-            </a:r>
-            <a:endParaRPr lang="en-US" sz="2000" b="1" dirty="0"/>
+          <a:lstStyle/>
+          <a:p>
+            <a:r>
+              <a:rPr lang="en-CH" sz="1400" dirty="0"/>
+              <a:t>Comments_Per_Member</a:t>
+            </a:r>
           </a:p>
         </p:txBody>
       </p:sp>
     </p:spTree>
     <p:extLst>
       <p:ext uri="{BB962C8B-B14F-4D97-AF65-F5344CB8AC3E}">
-        <p14:creationId xmlns:p14="http://schemas.microsoft.com/office/powerpoint/2010/main" val="21638255"/>
+        <p14:creationId xmlns:p14="http://schemas.microsoft.com/office/powerpoint/2010/main" val="2199118116"/>
+      </p:ext>
+    </p:extLst>
+  </p:cSld>
+  <p:clrMapOvr>
+    <a:masterClrMapping/>
+  </p:clrMapOvr>
+</p:sld>
+</file>
+
+<file path=ppt/slides/slide19.xml><?xml version="1.0" encoding="utf-8"?>
+<p:sld xmlns:a="http://schemas.openxmlformats.org/drawingml/2006/main" xmlns:r="http://schemas.openxmlformats.org/officeDocument/2006/relationships" xmlns:p="http://schemas.openxmlformats.org/presentationml/2006/main">
+  <p:cSld>
+    <p:spTree>
+      <p:nvGrpSpPr>
+        <p:cNvPr id="1" name=""/>
+        <p:cNvGrpSpPr/>
+        <p:nvPr/>
+      </p:nvGrpSpPr>
+      <p:grpSpPr>
+        <a:xfrm>
+          <a:off x="0" y="0"/>
+          <a:ext cx="0" cy="0"/>
+          <a:chOff x="0" y="0"/>
+          <a:chExt cx="0" cy="0"/>
+        </a:xfrm>
+      </p:grpSpPr>
+      <p:sp>
+        <p:nvSpPr>
+          <p:cNvPr id="2" name="Title 1">
+            <a:extLst>
+              <a:ext uri="{FF2B5EF4-FFF2-40B4-BE49-F238E27FC236}">
+                <a16:creationId xmlns:a16="http://schemas.microsoft.com/office/drawing/2014/main" id="{6B89A051-5127-6921-98D4-328DCB1DB090}"/>
+              </a:ext>
+            </a:extLst>
+          </p:cNvPr>
+          <p:cNvSpPr>
+            <a:spLocks noGrp="1"/>
+          </p:cNvSpPr>
+          <p:nvPr>
+            <p:ph type="title"/>
+          </p:nvPr>
+        </p:nvSpPr>
+        <p:spPr/>
+        <p:txBody>
+          <a:bodyPr/>
+          <a:lstStyle/>
+          <a:p>
+            <a:r>
+              <a:rPr lang="en-US" dirty="0"/>
+              <a:t>DBSCAN Clustering Results</a:t>
+            </a:r>
+          </a:p>
+        </p:txBody>
+      </p:sp>
+      <p:sp>
+        <p:nvSpPr>
+          <p:cNvPr id="4" name="Slide Number Placeholder 3">
+            <a:extLst>
+              <a:ext uri="{FF2B5EF4-FFF2-40B4-BE49-F238E27FC236}">
+                <a16:creationId xmlns:a16="http://schemas.microsoft.com/office/drawing/2014/main" id="{FB6E28D4-33C1-DB0C-4CBC-73A807C219AC}"/>
+              </a:ext>
+            </a:extLst>
+          </p:cNvPr>
+          <p:cNvSpPr>
+            <a:spLocks noGrp="1"/>
+          </p:cNvSpPr>
+          <p:nvPr>
+            <p:ph type="sldNum" sz="quarter" idx="12"/>
+          </p:nvPr>
+        </p:nvSpPr>
+        <p:spPr/>
+        <p:txBody>
+          <a:bodyPr/>
+          <a:lstStyle/>
+          <a:p>
+            <a:fld id="{ABC65B0B-110A-D646-808D-174EFAE956EB}" type="slidenum">
+              <a:rPr lang="en-CH" smtClean="0"/>
+              <a:t>19</a:t>
+            </a:fld>
+            <a:endParaRPr lang="en-CH"/>
+          </a:p>
+        </p:txBody>
+      </p:sp>
+      <p:pic>
+        <p:nvPicPr>
+          <p:cNvPr id="13" name="Content Placeholder 12" descr="A screenshot of a black screen&#10;&#10;AI-generated content may be incorrect.">
+            <a:extLst>
+              <a:ext uri="{FF2B5EF4-FFF2-40B4-BE49-F238E27FC236}">
+                <a16:creationId xmlns:a16="http://schemas.microsoft.com/office/drawing/2014/main" id="{C8A7756B-09B1-FED5-C8D5-C157F260B877}"/>
+              </a:ext>
+            </a:extLst>
+          </p:cNvPr>
+          <p:cNvPicPr>
+            <a:picLocks noGrp="1" noChangeAspect="1"/>
+          </p:cNvPicPr>
+          <p:nvPr>
+            <p:ph idx="1"/>
+          </p:nvPr>
+        </p:nvPicPr>
+        <p:blipFill>
+          <a:blip r:embed="rId2"/>
+          <a:stretch>
+            <a:fillRect/>
+          </a:stretch>
+        </p:blipFill>
+        <p:spPr>
+          <a:xfrm>
+            <a:off x="290847" y="2848768"/>
+            <a:ext cx="11610305" cy="2288836"/>
+          </a:xfrm>
+        </p:spPr>
+      </p:pic>
+    </p:spTree>
+    <p:extLst>
+      <p:ext uri="{BB962C8B-B14F-4D97-AF65-F5344CB8AC3E}">
+        <p14:creationId xmlns:p14="http://schemas.microsoft.com/office/powerpoint/2010/main" val="3788560872"/>
+      </p:ext>
+    </p:extLst>
+  </p:cSld>
+  <p:clrMapOvr>
+    <a:masterClrMapping/>
+  </p:clrMapOvr>
+</p:sld>
+</file>
+
+<file path=ppt/slides/slide2.xml><?xml version="1.0" encoding="utf-8"?>
+<p:sld xmlns:a="http://schemas.openxmlformats.org/drawingml/2006/main" xmlns:r="http://schemas.openxmlformats.org/officeDocument/2006/relationships" xmlns:p="http://schemas.openxmlformats.org/presentationml/2006/main">
+  <p:cSld>
+    <p:spTree>
+      <p:nvGrpSpPr>
+        <p:cNvPr id="1" name=""/>
+        <p:cNvGrpSpPr/>
+        <p:nvPr/>
+      </p:nvGrpSpPr>
+      <p:grpSpPr>
+        <a:xfrm>
+          <a:off x="0" y="0"/>
+          <a:ext cx="0" cy="0"/>
+          <a:chOff x="0" y="0"/>
+          <a:chExt cx="0" cy="0"/>
+        </a:xfrm>
+      </p:grpSpPr>
+      <p:sp>
+        <p:nvSpPr>
+          <p:cNvPr id="2" name="Title 1">
+            <a:extLst>
+              <a:ext uri="{FF2B5EF4-FFF2-40B4-BE49-F238E27FC236}">
+                <a16:creationId xmlns:a16="http://schemas.microsoft.com/office/drawing/2014/main" id="{6B7CF60A-F9D9-624B-456F-8624123D69EA}"/>
+              </a:ext>
+            </a:extLst>
+          </p:cNvPr>
+          <p:cNvSpPr>
+            <a:spLocks noGrp="1"/>
+          </p:cNvSpPr>
+          <p:nvPr>
+            <p:ph type="title"/>
+          </p:nvPr>
+        </p:nvSpPr>
+        <p:spPr/>
+        <p:txBody>
+          <a:bodyPr/>
+          <a:lstStyle/>
+          <a:p>
+            <a:r>
+              <a:rPr lang="en-CH" dirty="0"/>
+              <a:t>Topics</a:t>
+            </a:r>
+          </a:p>
+        </p:txBody>
+      </p:sp>
+      <p:sp>
+        <p:nvSpPr>
+          <p:cNvPr id="3" name="Content Placeholder 2">
+            <a:extLst>
+              <a:ext uri="{FF2B5EF4-FFF2-40B4-BE49-F238E27FC236}">
+                <a16:creationId xmlns:a16="http://schemas.microsoft.com/office/drawing/2014/main" id="{0E2934B4-16AA-8F2D-D4C1-01E6A7070D03}"/>
+              </a:ext>
+            </a:extLst>
+          </p:cNvPr>
+          <p:cNvSpPr>
+            <a:spLocks noGrp="1"/>
+          </p:cNvSpPr>
+          <p:nvPr>
+            <p:ph idx="1"/>
+          </p:nvPr>
+        </p:nvSpPr>
+        <p:spPr/>
+        <p:txBody>
+          <a:bodyPr/>
+          <a:lstStyle/>
+          <a:p>
+            <a:r>
+              <a:rPr lang="en-CH" dirty="0"/>
+              <a:t>Research Questions</a:t>
+            </a:r>
+          </a:p>
+          <a:p>
+            <a:r>
+              <a:rPr lang="en-CH" dirty="0"/>
+              <a:t>Data Preprocessing</a:t>
+            </a:r>
+          </a:p>
+          <a:p>
+            <a:r>
+              <a:rPr lang="en-CH" dirty="0"/>
+              <a:t>Initial Data Exploration</a:t>
+            </a:r>
+          </a:p>
+          <a:p>
+            <a:r>
+              <a:rPr lang="en-CH" dirty="0"/>
+              <a:t>Social Circle Detection and Characterization</a:t>
+            </a:r>
+          </a:p>
+          <a:p>
+            <a:r>
+              <a:rPr lang="en-CH" dirty="0"/>
+              <a:t>Anomaly Detection and Characterization</a:t>
+            </a:r>
+          </a:p>
+          <a:p>
+            <a:endParaRPr lang="en-CH" dirty="0"/>
+          </a:p>
+        </p:txBody>
+      </p:sp>
+      <p:sp>
+        <p:nvSpPr>
+          <p:cNvPr id="4" name="Slide Number Placeholder 3">
+            <a:extLst>
+              <a:ext uri="{FF2B5EF4-FFF2-40B4-BE49-F238E27FC236}">
+                <a16:creationId xmlns:a16="http://schemas.microsoft.com/office/drawing/2014/main" id="{E62335AD-A455-6CD8-4025-B346B976952F}"/>
+              </a:ext>
+            </a:extLst>
+          </p:cNvPr>
+          <p:cNvSpPr>
+            <a:spLocks noGrp="1"/>
+          </p:cNvSpPr>
+          <p:nvPr>
+            <p:ph type="sldNum" sz="quarter" idx="12"/>
+          </p:nvPr>
+        </p:nvSpPr>
+        <p:spPr/>
+        <p:txBody>
+          <a:bodyPr/>
+          <a:lstStyle/>
+          <a:p>
+            <a:fld id="{ABC65B0B-110A-D646-808D-174EFAE956EB}" type="slidenum">
+              <a:rPr lang="en-CH" smtClean="0"/>
+              <a:t>2</a:t>
+            </a:fld>
+            <a:endParaRPr lang="en-CH"/>
+          </a:p>
+        </p:txBody>
+      </p:sp>
+    </p:spTree>
+    <p:extLst>
+      <p:ext uri="{BB962C8B-B14F-4D97-AF65-F5344CB8AC3E}">
+        <p14:creationId xmlns:p14="http://schemas.microsoft.com/office/powerpoint/2010/main" val="3134700"/>
+      </p:ext>
+    </p:extLst>
+  </p:cSld>
+  <p:clrMapOvr>
+    <a:masterClrMapping/>
+  </p:clrMapOvr>
+</p:sld>
+</file>
+
+<file path=ppt/slides/slide20.xml><?xml version="1.0" encoding="utf-8"?>
+<p:sld xmlns:a="http://schemas.openxmlformats.org/drawingml/2006/main" xmlns:r="http://schemas.openxmlformats.org/officeDocument/2006/relationships" xmlns:p="http://schemas.openxmlformats.org/presentationml/2006/main">
+  <p:cSld>
+    <p:spTree>
+      <p:nvGrpSpPr>
+        <p:cNvPr id="1" name="">
+          <a:extLst>
+            <a:ext uri="{FF2B5EF4-FFF2-40B4-BE49-F238E27FC236}">
+              <a16:creationId xmlns:a16="http://schemas.microsoft.com/office/drawing/2014/main" id="{AA554C4D-7DF9-BBED-41B6-2630B9A0FEF2}"/>
+            </a:ext>
+          </a:extLst>
+        </p:cNvPr>
+        <p:cNvGrpSpPr/>
+        <p:nvPr/>
+      </p:nvGrpSpPr>
+      <p:grpSpPr>
+        <a:xfrm>
+          <a:off x="0" y="0"/>
+          <a:ext cx="0" cy="0"/>
+          <a:chOff x="0" y="0"/>
+          <a:chExt cx="0" cy="0"/>
+        </a:xfrm>
+      </p:grpSpPr>
+      <p:sp>
+        <p:nvSpPr>
+          <p:cNvPr id="2" name="Title 1">
+            <a:extLst>
+              <a:ext uri="{FF2B5EF4-FFF2-40B4-BE49-F238E27FC236}">
+                <a16:creationId xmlns:a16="http://schemas.microsoft.com/office/drawing/2014/main" id="{0C248B7D-DF64-9F60-0EF6-B3B7E15E441B}"/>
+              </a:ext>
+            </a:extLst>
+          </p:cNvPr>
+          <p:cNvSpPr>
+            <a:spLocks noGrp="1"/>
+          </p:cNvSpPr>
+          <p:nvPr>
+            <p:ph type="title"/>
+          </p:nvPr>
+        </p:nvSpPr>
+        <p:spPr/>
+        <p:txBody>
+          <a:bodyPr/>
+          <a:lstStyle/>
+          <a:p>
+            <a:r>
+              <a:rPr lang="en-CH" dirty="0"/>
+              <a:t>Answer to Research Question 1</a:t>
+            </a:r>
+          </a:p>
+        </p:txBody>
+      </p:sp>
+      <p:sp>
+        <p:nvSpPr>
+          <p:cNvPr id="3" name="Content Placeholder 2">
+            <a:extLst>
+              <a:ext uri="{FF2B5EF4-FFF2-40B4-BE49-F238E27FC236}">
+                <a16:creationId xmlns:a16="http://schemas.microsoft.com/office/drawing/2014/main" id="{D72C9548-05C1-EC2B-BF55-47DBFC9080BD}"/>
+              </a:ext>
+            </a:extLst>
+          </p:cNvPr>
+          <p:cNvSpPr>
+            <a:spLocks noGrp="1"/>
+          </p:cNvSpPr>
+          <p:nvPr>
+            <p:ph idx="1"/>
+          </p:nvPr>
+        </p:nvSpPr>
+        <p:spPr/>
+        <p:txBody>
+          <a:bodyPr/>
+          <a:lstStyle/>
+          <a:p>
+            <a:r>
+              <a:rPr lang="en-CH" dirty="0"/>
+              <a:t>We were able to identify distinct social circles within the Friendfeed network using the Leiden algorithm</a:t>
+            </a:r>
+          </a:p>
+          <a:p>
+            <a:r>
+              <a:rPr lang="en-CH" dirty="0"/>
+              <a:t>We were able to classify the users into distinct groups based on their service usage using agglomerative clustering</a:t>
+            </a:r>
+          </a:p>
+          <a:p>
+            <a:r>
+              <a:rPr lang="en-CH" dirty="0"/>
+              <a:t>We were abel to classify the users into distinct groups based on their activity and interaction patterns using the DBSCAN algorithm</a:t>
+            </a:r>
+          </a:p>
+        </p:txBody>
+      </p:sp>
+      <p:sp>
+        <p:nvSpPr>
+          <p:cNvPr id="4" name="Slide Number Placeholder 3">
+            <a:extLst>
+              <a:ext uri="{FF2B5EF4-FFF2-40B4-BE49-F238E27FC236}">
+                <a16:creationId xmlns:a16="http://schemas.microsoft.com/office/drawing/2014/main" id="{788B2BE3-767D-A8B9-EC46-65D7D3D225FE}"/>
+              </a:ext>
+            </a:extLst>
+          </p:cNvPr>
+          <p:cNvSpPr>
+            <a:spLocks noGrp="1"/>
+          </p:cNvSpPr>
+          <p:nvPr>
+            <p:ph type="sldNum" sz="quarter" idx="12"/>
+          </p:nvPr>
+        </p:nvSpPr>
+        <p:spPr/>
+        <p:txBody>
+          <a:bodyPr/>
+          <a:lstStyle/>
+          <a:p>
+            <a:fld id="{ABC65B0B-110A-D646-808D-174EFAE956EB}" type="slidenum">
+              <a:rPr lang="en-CH" smtClean="0"/>
+              <a:t>20</a:t>
+            </a:fld>
+            <a:endParaRPr lang="en-CH"/>
+          </a:p>
+        </p:txBody>
+      </p:sp>
+    </p:spTree>
+    <p:extLst>
+      <p:ext uri="{BB962C8B-B14F-4D97-AF65-F5344CB8AC3E}">
+        <p14:creationId xmlns:p14="http://schemas.microsoft.com/office/powerpoint/2010/main" val="1291111926"/>
       </p:ext>
     </p:extLst>
   </p:cSld>
@@ -8855,799 +8500,6 @@
           <p:cNvPr id="2" name="Title 1">
             <a:extLst>
               <a:ext uri="{FF2B5EF4-FFF2-40B4-BE49-F238E27FC236}">
-                <a16:creationId xmlns:a16="http://schemas.microsoft.com/office/drawing/2014/main" id="{09FABF17-B47A-2168-B964-A0FC6C01DEE8}"/>
-              </a:ext>
-            </a:extLst>
-          </p:cNvPr>
-          <p:cNvSpPr>
-            <a:spLocks noGrp="1"/>
-          </p:cNvSpPr>
-          <p:nvPr>
-            <p:ph type="title"/>
-          </p:nvPr>
-        </p:nvSpPr>
-        <p:spPr/>
-        <p:txBody>
-          <a:bodyPr/>
-          <a:lstStyle/>
-          <a:p>
-            <a:r>
-              <a:rPr lang="en-US" dirty="0"/>
-              <a:t>DBSCAN Clustering Results</a:t>
-            </a:r>
-          </a:p>
-        </p:txBody>
-      </p:sp>
-      <p:sp>
-        <p:nvSpPr>
-          <p:cNvPr id="4" name="Slide Number Placeholder 3">
-            <a:extLst>
-              <a:ext uri="{FF2B5EF4-FFF2-40B4-BE49-F238E27FC236}">
-                <a16:creationId xmlns:a16="http://schemas.microsoft.com/office/drawing/2014/main" id="{A409BD9C-E516-01F8-2996-1C3A7C6991A1}"/>
-              </a:ext>
-            </a:extLst>
-          </p:cNvPr>
-          <p:cNvSpPr>
-            <a:spLocks noGrp="1"/>
-          </p:cNvSpPr>
-          <p:nvPr>
-            <p:ph type="sldNum" sz="quarter" idx="12"/>
-          </p:nvPr>
-        </p:nvSpPr>
-        <p:spPr/>
-        <p:txBody>
-          <a:bodyPr/>
-          <a:lstStyle/>
-          <a:p>
-            <a:fld id="{ABC65B0B-110A-D646-808D-174EFAE956EB}" type="slidenum">
-              <a:rPr lang="en-CH" smtClean="0"/>
-              <a:t>21</a:t>
-            </a:fld>
-            <a:endParaRPr lang="en-CH"/>
-          </a:p>
-        </p:txBody>
-      </p:sp>
-      <p:sp>
-        <p:nvSpPr>
-          <p:cNvPr id="8" name="Content Placeholder 2">
-            <a:extLst>
-              <a:ext uri="{FF2B5EF4-FFF2-40B4-BE49-F238E27FC236}">
-                <a16:creationId xmlns:a16="http://schemas.microsoft.com/office/drawing/2014/main" id="{580EE751-4B06-7EC8-8ECE-DAB7AD61D32A}"/>
-              </a:ext>
-            </a:extLst>
-          </p:cNvPr>
-          <p:cNvSpPr txBox="1">
-            <a:spLocks/>
-          </p:cNvSpPr>
-          <p:nvPr/>
-        </p:nvSpPr>
-        <p:spPr>
-          <a:xfrm>
-            <a:off x="739588" y="1690688"/>
-            <a:ext cx="6010836" cy="4127405"/>
-          </a:xfrm>
-          <a:prstGeom prst="rect">
-            <a:avLst/>
-          </a:prstGeom>
-        </p:spPr>
-        <p:txBody>
-          <a:bodyPr vert="horz" lIns="91440" tIns="45720" rIns="91440" bIns="45720" rtlCol="0">
-            <a:normAutofit/>
-          </a:bodyPr>
-          <a:lstStyle>
-            <a:lvl1pPr marL="228600" indent="-228600" algn="l" defTabSz="914400" rtl="0" eaLnBrk="1" latinLnBrk="0" hangingPunct="1">
-              <a:lnSpc>
-                <a:spcPct val="90000"/>
-              </a:lnSpc>
-              <a:spcBef>
-                <a:spcPts val="1000"/>
-              </a:spcBef>
-              <a:buFont typeface="Arial" panose="020B0604020202020204" pitchFamily="34" charset="0"/>
-              <a:buChar char="•"/>
-              <a:defRPr sz="2800" kern="1200">
-                <a:solidFill>
-                  <a:schemeClr val="tx1"/>
-                </a:solidFill>
-                <a:latin typeface="+mn-lt"/>
-                <a:ea typeface="+mn-ea"/>
-                <a:cs typeface="+mn-cs"/>
-              </a:defRPr>
-            </a:lvl1pPr>
-            <a:lvl2pPr marL="685800" indent="-228600" algn="l" defTabSz="914400" rtl="0" eaLnBrk="1" latinLnBrk="0" hangingPunct="1">
-              <a:lnSpc>
-                <a:spcPct val="90000"/>
-              </a:lnSpc>
-              <a:spcBef>
-                <a:spcPts val="500"/>
-              </a:spcBef>
-              <a:buFont typeface="Arial" panose="020B0604020202020204" pitchFamily="34" charset="0"/>
-              <a:buChar char="•"/>
-              <a:defRPr sz="2400" kern="1200">
-                <a:solidFill>
-                  <a:schemeClr val="tx1"/>
-                </a:solidFill>
-                <a:latin typeface="+mn-lt"/>
-                <a:ea typeface="+mn-ea"/>
-                <a:cs typeface="+mn-cs"/>
-              </a:defRPr>
-            </a:lvl2pPr>
-            <a:lvl3pPr marL="1143000" indent="-228600" algn="l" defTabSz="914400" rtl="0" eaLnBrk="1" latinLnBrk="0" hangingPunct="1">
-              <a:lnSpc>
-                <a:spcPct val="90000"/>
-              </a:lnSpc>
-              <a:spcBef>
-                <a:spcPts val="500"/>
-              </a:spcBef>
-              <a:buFont typeface="Arial" panose="020B0604020202020204" pitchFamily="34" charset="0"/>
-              <a:buChar char="•"/>
-              <a:defRPr sz="2000" kern="1200">
-                <a:solidFill>
-                  <a:schemeClr val="tx1"/>
-                </a:solidFill>
-                <a:latin typeface="+mn-lt"/>
-                <a:ea typeface="+mn-ea"/>
-                <a:cs typeface="+mn-cs"/>
-              </a:defRPr>
-            </a:lvl3pPr>
-            <a:lvl4pPr marL="1600200" indent="-228600" algn="l" defTabSz="914400" rtl="0" eaLnBrk="1" latinLnBrk="0" hangingPunct="1">
-              <a:lnSpc>
-                <a:spcPct val="90000"/>
-              </a:lnSpc>
-              <a:spcBef>
-                <a:spcPts val="500"/>
-              </a:spcBef>
-              <a:buFont typeface="Arial" panose="020B0604020202020204" pitchFamily="34" charset="0"/>
-              <a:buChar char="•"/>
-              <a:defRPr sz="1800" kern="1200">
-                <a:solidFill>
-                  <a:schemeClr val="tx1"/>
-                </a:solidFill>
-                <a:latin typeface="+mn-lt"/>
-                <a:ea typeface="+mn-ea"/>
-                <a:cs typeface="+mn-cs"/>
-              </a:defRPr>
-            </a:lvl4pPr>
-            <a:lvl5pPr marL="2057400" indent="-228600" algn="l" defTabSz="914400" rtl="0" eaLnBrk="1" latinLnBrk="0" hangingPunct="1">
-              <a:lnSpc>
-                <a:spcPct val="90000"/>
-              </a:lnSpc>
-              <a:spcBef>
-                <a:spcPts val="500"/>
-              </a:spcBef>
-              <a:buFont typeface="Arial" panose="020B0604020202020204" pitchFamily="34" charset="0"/>
-              <a:buChar char="•"/>
-              <a:defRPr sz="1800" kern="1200">
-                <a:solidFill>
-                  <a:schemeClr val="tx1"/>
-                </a:solidFill>
-                <a:latin typeface="+mn-lt"/>
-                <a:ea typeface="+mn-ea"/>
-                <a:cs typeface="+mn-cs"/>
-              </a:defRPr>
-            </a:lvl5pPr>
-            <a:lvl6pPr marL="2514600" indent="-228600" algn="l" defTabSz="914400" rtl="0" eaLnBrk="1" latinLnBrk="0" hangingPunct="1">
-              <a:lnSpc>
-                <a:spcPct val="90000"/>
-              </a:lnSpc>
-              <a:spcBef>
-                <a:spcPts val="500"/>
-              </a:spcBef>
-              <a:buFont typeface="Arial" panose="020B0604020202020204" pitchFamily="34" charset="0"/>
-              <a:buChar char="•"/>
-              <a:defRPr sz="1800" kern="1200">
-                <a:solidFill>
-                  <a:schemeClr val="tx1"/>
-                </a:solidFill>
-                <a:latin typeface="+mn-lt"/>
-                <a:ea typeface="+mn-ea"/>
-                <a:cs typeface="+mn-cs"/>
-              </a:defRPr>
-            </a:lvl6pPr>
-            <a:lvl7pPr marL="2971800" indent="-228600" algn="l" defTabSz="914400" rtl="0" eaLnBrk="1" latinLnBrk="0" hangingPunct="1">
-              <a:lnSpc>
-                <a:spcPct val="90000"/>
-              </a:lnSpc>
-              <a:spcBef>
-                <a:spcPts val="500"/>
-              </a:spcBef>
-              <a:buFont typeface="Arial" panose="020B0604020202020204" pitchFamily="34" charset="0"/>
-              <a:buChar char="•"/>
-              <a:defRPr sz="1800" kern="1200">
-                <a:solidFill>
-                  <a:schemeClr val="tx1"/>
-                </a:solidFill>
-                <a:latin typeface="+mn-lt"/>
-                <a:ea typeface="+mn-ea"/>
-                <a:cs typeface="+mn-cs"/>
-              </a:defRPr>
-            </a:lvl7pPr>
-            <a:lvl8pPr marL="3429000" indent="-228600" algn="l" defTabSz="914400" rtl="0" eaLnBrk="1" latinLnBrk="0" hangingPunct="1">
-              <a:lnSpc>
-                <a:spcPct val="90000"/>
-              </a:lnSpc>
-              <a:spcBef>
-                <a:spcPts val="500"/>
-              </a:spcBef>
-              <a:buFont typeface="Arial" panose="020B0604020202020204" pitchFamily="34" charset="0"/>
-              <a:buChar char="•"/>
-              <a:defRPr sz="1800" kern="1200">
-                <a:solidFill>
-                  <a:schemeClr val="tx1"/>
-                </a:solidFill>
-                <a:latin typeface="+mn-lt"/>
-                <a:ea typeface="+mn-ea"/>
-                <a:cs typeface="+mn-cs"/>
-              </a:defRPr>
-            </a:lvl8pPr>
-            <a:lvl9pPr marL="3886200" indent="-228600" algn="l" defTabSz="914400" rtl="0" eaLnBrk="1" latinLnBrk="0" hangingPunct="1">
-              <a:lnSpc>
-                <a:spcPct val="90000"/>
-              </a:lnSpc>
-              <a:spcBef>
-                <a:spcPts val="500"/>
-              </a:spcBef>
-              <a:buFont typeface="Arial" panose="020B0604020202020204" pitchFamily="34" charset="0"/>
-              <a:buChar char="•"/>
-              <a:defRPr sz="1800" kern="1200">
-                <a:solidFill>
-                  <a:schemeClr val="tx1"/>
-                </a:solidFill>
-                <a:latin typeface="+mn-lt"/>
-                <a:ea typeface="+mn-ea"/>
-                <a:cs typeface="+mn-cs"/>
-              </a:defRPr>
-            </a:lvl9pPr>
-          </a:lstStyle>
-          <a:p>
-            <a:pPr marL="0" indent="0">
-              <a:buNone/>
-            </a:pPr>
-            <a:r>
-              <a:rPr lang="en-US" sz="2400" b="1" dirty="0"/>
-              <a:t>Observation:</a:t>
-            </a:r>
-          </a:p>
-          <a:p>
-            <a:r>
-              <a:rPr lang="en-US" sz="2000" dirty="0"/>
-              <a:t>Total clusters detected: 4</a:t>
-            </a:r>
-          </a:p>
-          <a:p>
-            <a:r>
-              <a:rPr lang="en-US" sz="2000" dirty="0"/>
-              <a:t>Noise: 2 communities were identified as noise (assigned to cluster -1)</a:t>
-            </a:r>
-          </a:p>
-          <a:p>
-            <a:r>
-              <a:rPr lang="en-US" sz="2000" dirty="0"/>
-              <a:t>Major cluster: 1,731 communities grouped together, indicating a large, highly similar group</a:t>
-            </a:r>
-          </a:p>
-          <a:p>
-            <a:r>
-              <a:rPr lang="en-US" sz="2000" dirty="0"/>
-              <a:t>Smaller clusters: 4 communities distributed across the remaining 2 clusters, representing small, distinct activity patterns</a:t>
-            </a:r>
-          </a:p>
-        </p:txBody>
-      </p:sp>
-      <p:pic>
-        <p:nvPicPr>
-          <p:cNvPr id="18" name="Picture 17">
-            <a:extLst>
-              <a:ext uri="{FF2B5EF4-FFF2-40B4-BE49-F238E27FC236}">
-                <a16:creationId xmlns:a16="http://schemas.microsoft.com/office/drawing/2014/main" id="{E412AF62-7E1C-2EC8-25CD-E75846847ECB}"/>
-              </a:ext>
-            </a:extLst>
-          </p:cNvPr>
-          <p:cNvPicPr>
-            <a:picLocks noChangeAspect="1"/>
-          </p:cNvPicPr>
-          <p:nvPr/>
-        </p:nvPicPr>
-        <p:blipFill>
-          <a:blip r:embed="rId2"/>
-          <a:stretch>
-            <a:fillRect/>
-          </a:stretch>
-        </p:blipFill>
-        <p:spPr>
-          <a:xfrm>
-            <a:off x="6916270" y="1541929"/>
-            <a:ext cx="4800847" cy="4605804"/>
-          </a:xfrm>
-          <a:prstGeom prst="rect">
-            <a:avLst/>
-          </a:prstGeom>
-        </p:spPr>
-      </p:pic>
-    </p:spTree>
-    <p:extLst>
-      <p:ext uri="{BB962C8B-B14F-4D97-AF65-F5344CB8AC3E}">
-        <p14:creationId xmlns:p14="http://schemas.microsoft.com/office/powerpoint/2010/main" val="2199118116"/>
-      </p:ext>
-    </p:extLst>
-  </p:cSld>
-  <p:clrMapOvr>
-    <a:masterClrMapping/>
-  </p:clrMapOvr>
-</p:sld>
-</file>
-
-<file path=ppt/slides/slide22.xml><?xml version="1.0" encoding="utf-8"?>
-<p:sld xmlns:a="http://schemas.openxmlformats.org/drawingml/2006/main" xmlns:r="http://schemas.openxmlformats.org/officeDocument/2006/relationships" xmlns:p="http://schemas.openxmlformats.org/presentationml/2006/main">
-  <p:cSld>
-    <p:spTree>
-      <p:nvGrpSpPr>
-        <p:cNvPr id="1" name=""/>
-        <p:cNvGrpSpPr/>
-        <p:nvPr/>
-      </p:nvGrpSpPr>
-      <p:grpSpPr>
-        <a:xfrm>
-          <a:off x="0" y="0"/>
-          <a:ext cx="0" cy="0"/>
-          <a:chOff x="0" y="0"/>
-          <a:chExt cx="0" cy="0"/>
-        </a:xfrm>
-      </p:grpSpPr>
-      <p:sp>
-        <p:nvSpPr>
-          <p:cNvPr id="2" name="Title 1">
-            <a:extLst>
-              <a:ext uri="{FF2B5EF4-FFF2-40B4-BE49-F238E27FC236}">
-                <a16:creationId xmlns:a16="http://schemas.microsoft.com/office/drawing/2014/main" id="{6B89A051-5127-6921-98D4-328DCB1DB090}"/>
-              </a:ext>
-            </a:extLst>
-          </p:cNvPr>
-          <p:cNvSpPr>
-            <a:spLocks noGrp="1"/>
-          </p:cNvSpPr>
-          <p:nvPr>
-            <p:ph type="title"/>
-          </p:nvPr>
-        </p:nvSpPr>
-        <p:spPr/>
-        <p:txBody>
-          <a:bodyPr/>
-          <a:lstStyle/>
-          <a:p>
-            <a:r>
-              <a:rPr lang="en-US" dirty="0"/>
-              <a:t>DBSCAN Clustering Results</a:t>
-            </a:r>
-          </a:p>
-        </p:txBody>
-      </p:sp>
-      <p:sp>
-        <p:nvSpPr>
-          <p:cNvPr id="4" name="Slide Number Placeholder 3">
-            <a:extLst>
-              <a:ext uri="{FF2B5EF4-FFF2-40B4-BE49-F238E27FC236}">
-                <a16:creationId xmlns:a16="http://schemas.microsoft.com/office/drawing/2014/main" id="{FB6E28D4-33C1-DB0C-4CBC-73A807C219AC}"/>
-              </a:ext>
-            </a:extLst>
-          </p:cNvPr>
-          <p:cNvSpPr>
-            <a:spLocks noGrp="1"/>
-          </p:cNvSpPr>
-          <p:nvPr>
-            <p:ph type="sldNum" sz="quarter" idx="12"/>
-          </p:nvPr>
-        </p:nvSpPr>
-        <p:spPr/>
-        <p:txBody>
-          <a:bodyPr/>
-          <a:lstStyle/>
-          <a:p>
-            <a:fld id="{ABC65B0B-110A-D646-808D-174EFAE956EB}" type="slidenum">
-              <a:rPr lang="en-CH" smtClean="0"/>
-              <a:t>22</a:t>
-            </a:fld>
-            <a:endParaRPr lang="en-CH"/>
-          </a:p>
-        </p:txBody>
-      </p:sp>
-      <p:pic>
-        <p:nvPicPr>
-          <p:cNvPr id="10" name="Content Placeholder 9">
-            <a:extLst>
-              <a:ext uri="{FF2B5EF4-FFF2-40B4-BE49-F238E27FC236}">
-                <a16:creationId xmlns:a16="http://schemas.microsoft.com/office/drawing/2014/main" id="{740BBCC2-A7D4-D4AC-03AC-D5606882D63D}"/>
-              </a:ext>
-            </a:extLst>
-          </p:cNvPr>
-          <p:cNvPicPr>
-            <a:picLocks noGrp="1" noChangeAspect="1"/>
-          </p:cNvPicPr>
-          <p:nvPr>
-            <p:ph idx="1"/>
-          </p:nvPr>
-        </p:nvPicPr>
-        <p:blipFill>
-          <a:blip r:embed="rId2"/>
-          <a:stretch>
-            <a:fillRect/>
-          </a:stretch>
-        </p:blipFill>
-        <p:spPr>
-          <a:xfrm>
-            <a:off x="838199" y="2689412"/>
-            <a:ext cx="10771093" cy="3106082"/>
-          </a:xfrm>
-          <a:prstGeom prst="rect">
-            <a:avLst/>
-          </a:prstGeom>
-        </p:spPr>
-      </p:pic>
-      <p:sp>
-        <p:nvSpPr>
-          <p:cNvPr id="11" name="Content Placeholder 2">
-            <a:extLst>
-              <a:ext uri="{FF2B5EF4-FFF2-40B4-BE49-F238E27FC236}">
-                <a16:creationId xmlns:a16="http://schemas.microsoft.com/office/drawing/2014/main" id="{48E14235-B81C-5D6F-9ED6-59C1746C5DA3}"/>
-              </a:ext>
-            </a:extLst>
-          </p:cNvPr>
-          <p:cNvSpPr txBox="1">
-            <a:spLocks/>
-          </p:cNvSpPr>
-          <p:nvPr/>
-        </p:nvSpPr>
-        <p:spPr>
-          <a:xfrm>
-            <a:off x="838200" y="1690688"/>
-            <a:ext cx="10771094" cy="711853"/>
-          </a:xfrm>
-          <a:prstGeom prst="rect">
-            <a:avLst/>
-          </a:prstGeom>
-        </p:spPr>
-        <p:txBody>
-          <a:bodyPr vert="horz" lIns="91440" tIns="45720" rIns="91440" bIns="45720" rtlCol="0">
-            <a:normAutofit/>
-          </a:bodyPr>
-          <a:lstStyle>
-            <a:lvl1pPr marL="228600" indent="-228600" algn="l" defTabSz="914400" rtl="0" eaLnBrk="1" latinLnBrk="0" hangingPunct="1">
-              <a:lnSpc>
-                <a:spcPct val="90000"/>
-              </a:lnSpc>
-              <a:spcBef>
-                <a:spcPts val="1000"/>
-              </a:spcBef>
-              <a:buFont typeface="Arial" panose="020B0604020202020204" pitchFamily="34" charset="0"/>
-              <a:buChar char="•"/>
-              <a:defRPr sz="2800" kern="1200">
-                <a:solidFill>
-                  <a:schemeClr val="tx1"/>
-                </a:solidFill>
-                <a:latin typeface="+mn-lt"/>
-                <a:ea typeface="+mn-ea"/>
-                <a:cs typeface="+mn-cs"/>
-              </a:defRPr>
-            </a:lvl1pPr>
-            <a:lvl2pPr marL="685800" indent="-228600" algn="l" defTabSz="914400" rtl="0" eaLnBrk="1" latinLnBrk="0" hangingPunct="1">
-              <a:lnSpc>
-                <a:spcPct val="90000"/>
-              </a:lnSpc>
-              <a:spcBef>
-                <a:spcPts val="500"/>
-              </a:spcBef>
-              <a:buFont typeface="Arial" panose="020B0604020202020204" pitchFamily="34" charset="0"/>
-              <a:buChar char="•"/>
-              <a:defRPr sz="2400" kern="1200">
-                <a:solidFill>
-                  <a:schemeClr val="tx1"/>
-                </a:solidFill>
-                <a:latin typeface="+mn-lt"/>
-                <a:ea typeface="+mn-ea"/>
-                <a:cs typeface="+mn-cs"/>
-              </a:defRPr>
-            </a:lvl2pPr>
-            <a:lvl3pPr marL="1143000" indent="-228600" algn="l" defTabSz="914400" rtl="0" eaLnBrk="1" latinLnBrk="0" hangingPunct="1">
-              <a:lnSpc>
-                <a:spcPct val="90000"/>
-              </a:lnSpc>
-              <a:spcBef>
-                <a:spcPts val="500"/>
-              </a:spcBef>
-              <a:buFont typeface="Arial" panose="020B0604020202020204" pitchFamily="34" charset="0"/>
-              <a:buChar char="•"/>
-              <a:defRPr sz="2000" kern="1200">
-                <a:solidFill>
-                  <a:schemeClr val="tx1"/>
-                </a:solidFill>
-                <a:latin typeface="+mn-lt"/>
-                <a:ea typeface="+mn-ea"/>
-                <a:cs typeface="+mn-cs"/>
-              </a:defRPr>
-            </a:lvl3pPr>
-            <a:lvl4pPr marL="1600200" indent="-228600" algn="l" defTabSz="914400" rtl="0" eaLnBrk="1" latinLnBrk="0" hangingPunct="1">
-              <a:lnSpc>
-                <a:spcPct val="90000"/>
-              </a:lnSpc>
-              <a:spcBef>
-                <a:spcPts val="500"/>
-              </a:spcBef>
-              <a:buFont typeface="Arial" panose="020B0604020202020204" pitchFamily="34" charset="0"/>
-              <a:buChar char="•"/>
-              <a:defRPr sz="1800" kern="1200">
-                <a:solidFill>
-                  <a:schemeClr val="tx1"/>
-                </a:solidFill>
-                <a:latin typeface="+mn-lt"/>
-                <a:ea typeface="+mn-ea"/>
-                <a:cs typeface="+mn-cs"/>
-              </a:defRPr>
-            </a:lvl4pPr>
-            <a:lvl5pPr marL="2057400" indent="-228600" algn="l" defTabSz="914400" rtl="0" eaLnBrk="1" latinLnBrk="0" hangingPunct="1">
-              <a:lnSpc>
-                <a:spcPct val="90000"/>
-              </a:lnSpc>
-              <a:spcBef>
-                <a:spcPts val="500"/>
-              </a:spcBef>
-              <a:buFont typeface="Arial" panose="020B0604020202020204" pitchFamily="34" charset="0"/>
-              <a:buChar char="•"/>
-              <a:defRPr sz="1800" kern="1200">
-                <a:solidFill>
-                  <a:schemeClr val="tx1"/>
-                </a:solidFill>
-                <a:latin typeface="+mn-lt"/>
-                <a:ea typeface="+mn-ea"/>
-                <a:cs typeface="+mn-cs"/>
-              </a:defRPr>
-            </a:lvl5pPr>
-            <a:lvl6pPr marL="2514600" indent="-228600" algn="l" defTabSz="914400" rtl="0" eaLnBrk="1" latinLnBrk="0" hangingPunct="1">
-              <a:lnSpc>
-                <a:spcPct val="90000"/>
-              </a:lnSpc>
-              <a:spcBef>
-                <a:spcPts val="500"/>
-              </a:spcBef>
-              <a:buFont typeface="Arial" panose="020B0604020202020204" pitchFamily="34" charset="0"/>
-              <a:buChar char="•"/>
-              <a:defRPr sz="1800" kern="1200">
-                <a:solidFill>
-                  <a:schemeClr val="tx1"/>
-                </a:solidFill>
-                <a:latin typeface="+mn-lt"/>
-                <a:ea typeface="+mn-ea"/>
-                <a:cs typeface="+mn-cs"/>
-              </a:defRPr>
-            </a:lvl6pPr>
-            <a:lvl7pPr marL="2971800" indent="-228600" algn="l" defTabSz="914400" rtl="0" eaLnBrk="1" latinLnBrk="0" hangingPunct="1">
-              <a:lnSpc>
-                <a:spcPct val="90000"/>
-              </a:lnSpc>
-              <a:spcBef>
-                <a:spcPts val="500"/>
-              </a:spcBef>
-              <a:buFont typeface="Arial" panose="020B0604020202020204" pitchFamily="34" charset="0"/>
-              <a:buChar char="•"/>
-              <a:defRPr sz="1800" kern="1200">
-                <a:solidFill>
-                  <a:schemeClr val="tx1"/>
-                </a:solidFill>
-                <a:latin typeface="+mn-lt"/>
-                <a:ea typeface="+mn-ea"/>
-                <a:cs typeface="+mn-cs"/>
-              </a:defRPr>
-            </a:lvl7pPr>
-            <a:lvl8pPr marL="3429000" indent="-228600" algn="l" defTabSz="914400" rtl="0" eaLnBrk="1" latinLnBrk="0" hangingPunct="1">
-              <a:lnSpc>
-                <a:spcPct val="90000"/>
-              </a:lnSpc>
-              <a:spcBef>
-                <a:spcPts val="500"/>
-              </a:spcBef>
-              <a:buFont typeface="Arial" panose="020B0604020202020204" pitchFamily="34" charset="0"/>
-              <a:buChar char="•"/>
-              <a:defRPr sz="1800" kern="1200">
-                <a:solidFill>
-                  <a:schemeClr val="tx1"/>
-                </a:solidFill>
-                <a:latin typeface="+mn-lt"/>
-                <a:ea typeface="+mn-ea"/>
-                <a:cs typeface="+mn-cs"/>
-              </a:defRPr>
-            </a:lvl8pPr>
-            <a:lvl9pPr marL="3886200" indent="-228600" algn="l" defTabSz="914400" rtl="0" eaLnBrk="1" latinLnBrk="0" hangingPunct="1">
-              <a:lnSpc>
-                <a:spcPct val="90000"/>
-              </a:lnSpc>
-              <a:spcBef>
-                <a:spcPts val="500"/>
-              </a:spcBef>
-              <a:buFont typeface="Arial" panose="020B0604020202020204" pitchFamily="34" charset="0"/>
-              <a:buChar char="•"/>
-              <a:defRPr sz="1800" kern="1200">
-                <a:solidFill>
-                  <a:schemeClr val="tx1"/>
-                </a:solidFill>
-                <a:latin typeface="+mn-lt"/>
-                <a:ea typeface="+mn-ea"/>
-                <a:cs typeface="+mn-cs"/>
-              </a:defRPr>
-            </a:lvl9pPr>
-          </a:lstStyle>
-          <a:p>
-            <a:pPr marL="0" indent="0">
-              <a:buFont typeface="Arial" panose="020B0604020202020204" pitchFamily="34" charset="0"/>
-              <a:buNone/>
-            </a:pPr>
-            <a:r>
-              <a:rPr lang="en-US" sz="2000" dirty="0"/>
-              <a:t>DBSCAN clustering summary</a:t>
-            </a:r>
-            <a:endParaRPr lang="en-US" sz="2000" b="1" dirty="0"/>
-          </a:p>
-        </p:txBody>
-      </p:sp>
-    </p:spTree>
-    <p:extLst>
-      <p:ext uri="{BB962C8B-B14F-4D97-AF65-F5344CB8AC3E}">
-        <p14:creationId xmlns:p14="http://schemas.microsoft.com/office/powerpoint/2010/main" val="3788560872"/>
-      </p:ext>
-    </p:extLst>
-  </p:cSld>
-  <p:clrMapOvr>
-    <a:masterClrMapping/>
-  </p:clrMapOvr>
-</p:sld>
-</file>
-
-<file path=ppt/slides/slide23.xml><?xml version="1.0" encoding="utf-8"?>
-<p:sld xmlns:a="http://schemas.openxmlformats.org/drawingml/2006/main" xmlns:r="http://schemas.openxmlformats.org/officeDocument/2006/relationships" xmlns:p="http://schemas.openxmlformats.org/presentationml/2006/main">
-  <p:cSld>
-    <p:spTree>
-      <p:nvGrpSpPr>
-        <p:cNvPr id="1" name="">
-          <a:extLst>
-            <a:ext uri="{FF2B5EF4-FFF2-40B4-BE49-F238E27FC236}">
-              <a16:creationId xmlns:a16="http://schemas.microsoft.com/office/drawing/2014/main" id="{AA554C4D-7DF9-BBED-41B6-2630B9A0FEF2}"/>
-            </a:ext>
-          </a:extLst>
-        </p:cNvPr>
-        <p:cNvGrpSpPr/>
-        <p:nvPr/>
-      </p:nvGrpSpPr>
-      <p:grpSpPr>
-        <a:xfrm>
-          <a:off x="0" y="0"/>
-          <a:ext cx="0" cy="0"/>
-          <a:chOff x="0" y="0"/>
-          <a:chExt cx="0" cy="0"/>
-        </a:xfrm>
-      </p:grpSpPr>
-      <p:sp>
-        <p:nvSpPr>
-          <p:cNvPr id="2" name="Title 1">
-            <a:extLst>
-              <a:ext uri="{FF2B5EF4-FFF2-40B4-BE49-F238E27FC236}">
-                <a16:creationId xmlns:a16="http://schemas.microsoft.com/office/drawing/2014/main" id="{0C248B7D-DF64-9F60-0EF6-B3B7E15E441B}"/>
-              </a:ext>
-            </a:extLst>
-          </p:cNvPr>
-          <p:cNvSpPr>
-            <a:spLocks noGrp="1"/>
-          </p:cNvSpPr>
-          <p:nvPr>
-            <p:ph type="title"/>
-          </p:nvPr>
-        </p:nvSpPr>
-        <p:spPr/>
-        <p:txBody>
-          <a:bodyPr/>
-          <a:lstStyle/>
-          <a:p>
-            <a:r>
-              <a:rPr lang="en-CH" dirty="0"/>
-              <a:t>Answer to Research Question 2</a:t>
-            </a:r>
-          </a:p>
-        </p:txBody>
-      </p:sp>
-      <p:sp>
-        <p:nvSpPr>
-          <p:cNvPr id="3" name="Content Placeholder 2">
-            <a:extLst>
-              <a:ext uri="{FF2B5EF4-FFF2-40B4-BE49-F238E27FC236}">
-                <a16:creationId xmlns:a16="http://schemas.microsoft.com/office/drawing/2014/main" id="{D72C9548-05C1-EC2B-BF55-47DBFC9080BD}"/>
-              </a:ext>
-            </a:extLst>
-          </p:cNvPr>
-          <p:cNvSpPr>
-            <a:spLocks noGrp="1"/>
-          </p:cNvSpPr>
-          <p:nvPr>
-            <p:ph idx="1"/>
-          </p:nvPr>
-        </p:nvSpPr>
-        <p:spPr/>
-        <p:txBody>
-          <a:bodyPr/>
-          <a:lstStyle/>
-          <a:p>
-            <a:r>
-              <a:rPr lang="en-CH" dirty="0"/>
-              <a:t>We were able to identify distinct social circles within the Friendfeed network using three different algorithms (Louvian, Leiden and DBSCAN)</a:t>
-            </a:r>
-          </a:p>
-          <a:p>
-            <a:r>
-              <a:rPr lang="en-CH" dirty="0"/>
-              <a:t>We were able to characterize the social circles based on the activity, serivce usage and interaction patterns </a:t>
-            </a:r>
-          </a:p>
-        </p:txBody>
-      </p:sp>
-      <p:sp>
-        <p:nvSpPr>
-          <p:cNvPr id="4" name="Slide Number Placeholder 3">
-            <a:extLst>
-              <a:ext uri="{FF2B5EF4-FFF2-40B4-BE49-F238E27FC236}">
-                <a16:creationId xmlns:a16="http://schemas.microsoft.com/office/drawing/2014/main" id="{788B2BE3-767D-A8B9-EC46-65D7D3D225FE}"/>
-              </a:ext>
-            </a:extLst>
-          </p:cNvPr>
-          <p:cNvSpPr>
-            <a:spLocks noGrp="1"/>
-          </p:cNvSpPr>
-          <p:nvPr>
-            <p:ph type="sldNum" sz="quarter" idx="12"/>
-          </p:nvPr>
-        </p:nvSpPr>
-        <p:spPr/>
-        <p:txBody>
-          <a:bodyPr/>
-          <a:lstStyle/>
-          <a:p>
-            <a:fld id="{ABC65B0B-110A-D646-808D-174EFAE956EB}" type="slidenum">
-              <a:rPr lang="en-CH" smtClean="0"/>
-              <a:t>23</a:t>
-            </a:fld>
-            <a:endParaRPr lang="en-CH"/>
-          </a:p>
-        </p:txBody>
-      </p:sp>
-    </p:spTree>
-    <p:extLst>
-      <p:ext uri="{BB962C8B-B14F-4D97-AF65-F5344CB8AC3E}">
-        <p14:creationId xmlns:p14="http://schemas.microsoft.com/office/powerpoint/2010/main" val="1291111926"/>
-      </p:ext>
-    </p:extLst>
-  </p:cSld>
-  <p:clrMapOvr>
-    <a:masterClrMapping/>
-  </p:clrMapOvr>
-</p:sld>
-</file>
-
-<file path=ppt/slides/slide24.xml><?xml version="1.0" encoding="utf-8"?>
-<p:sld xmlns:a="http://schemas.openxmlformats.org/drawingml/2006/main" xmlns:r="http://schemas.openxmlformats.org/officeDocument/2006/relationships" xmlns:p="http://schemas.openxmlformats.org/presentationml/2006/main">
-  <p:cSld>
-    <p:spTree>
-      <p:nvGrpSpPr>
-        <p:cNvPr id="1" name=""/>
-        <p:cNvGrpSpPr/>
-        <p:nvPr/>
-      </p:nvGrpSpPr>
-      <p:grpSpPr>
-        <a:xfrm>
-          <a:off x="0" y="0"/>
-          <a:ext cx="0" cy="0"/>
-          <a:chOff x="0" y="0"/>
-          <a:chExt cx="0" cy="0"/>
-        </a:xfrm>
-      </p:grpSpPr>
-      <p:sp>
-        <p:nvSpPr>
-          <p:cNvPr id="2" name="Title 1">
-            <a:extLst>
-              <a:ext uri="{FF2B5EF4-FFF2-40B4-BE49-F238E27FC236}">
                 <a16:creationId xmlns:a16="http://schemas.microsoft.com/office/drawing/2014/main" id="{5F1FAA27-79D6-3629-5A1D-12FB7E6CE987}"/>
               </a:ext>
             </a:extLst>
@@ -9795,7 +8647,7 @@
           <a:p>
             <a:fld id="{ABC65B0B-110A-D646-808D-174EFAE956EB}" type="slidenum">
               <a:rPr lang="en-CH" smtClean="0"/>
-              <a:t>24</a:t>
+              <a:t>21</a:t>
             </a:fld>
             <a:endParaRPr lang="en-CH"/>
           </a:p>
@@ -9814,7 +8666,7 @@
 </p:sld>
 </file>
 
-<file path=ppt/slides/slide25.xml><?xml version="1.0" encoding="utf-8"?>
+<file path=ppt/slides/slide22.xml><?xml version="1.0" encoding="utf-8"?>
 <p:sld xmlns:a="http://schemas.openxmlformats.org/drawingml/2006/main" xmlns:r="http://schemas.openxmlformats.org/officeDocument/2006/relationships" xmlns:p="http://schemas.openxmlformats.org/presentationml/2006/main">
   <p:cSld>
     <p:spTree>
@@ -9968,7 +8820,7 @@
           <a:p>
             <a:fld id="{ABC65B0B-110A-D646-808D-174EFAE956EB}" type="slidenum">
               <a:rPr lang="en-CH" smtClean="0"/>
-              <a:t>25</a:t>
+              <a:t>22</a:t>
             </a:fld>
             <a:endParaRPr lang="en-CH"/>
           </a:p>
@@ -9987,7 +8839,7 @@
 </p:sld>
 </file>
 
-<file path=ppt/slides/slide26.xml><?xml version="1.0" encoding="utf-8"?>
+<file path=ppt/slides/slide23.xml><?xml version="1.0" encoding="utf-8"?>
 <p:sld xmlns:a="http://schemas.openxmlformats.org/drawingml/2006/main" xmlns:r="http://schemas.openxmlformats.org/officeDocument/2006/relationships" xmlns:p="http://schemas.openxmlformats.org/presentationml/2006/main">
   <p:cSld>
     <p:spTree>
@@ -10152,7 +9004,7 @@
           <a:p>
             <a:fld id="{ABC65B0B-110A-D646-808D-174EFAE956EB}" type="slidenum">
               <a:rPr lang="en-CH" smtClean="0"/>
-              <a:t>26</a:t>
+              <a:t>23</a:t>
             </a:fld>
             <a:endParaRPr lang="en-CH"/>
           </a:p>
@@ -10171,7 +9023,7 @@
 </p:sld>
 </file>
 
-<file path=ppt/slides/slide27.xml><?xml version="1.0" encoding="utf-8"?>
+<file path=ppt/slides/slide24.xml><?xml version="1.0" encoding="utf-8"?>
 <p:sld xmlns:a="http://schemas.openxmlformats.org/drawingml/2006/main" xmlns:r="http://schemas.openxmlformats.org/officeDocument/2006/relationships" xmlns:p="http://schemas.openxmlformats.org/presentationml/2006/main">
   <p:cSld>
     <p:spTree>
@@ -11081,7 +9933,7 @@
           <a:p>
             <a:fld id="{ABC65B0B-110A-D646-808D-174EFAE956EB}" type="slidenum">
               <a:rPr lang="en-CH" smtClean="0"/>
-              <a:t>27</a:t>
+              <a:t>24</a:t>
             </a:fld>
             <a:endParaRPr lang="en-CH"/>
           </a:p>
@@ -11156,7 +10008,7 @@
 </p:sld>
 </file>
 
-<file path=ppt/slides/slide28.xml><?xml version="1.0" encoding="utf-8"?>
+<file path=ppt/slides/slide25.xml><?xml version="1.0" encoding="utf-8"?>
 <p:sld xmlns:a="http://schemas.openxmlformats.org/drawingml/2006/main" xmlns:r="http://schemas.openxmlformats.org/officeDocument/2006/relationships" xmlns:p="http://schemas.openxmlformats.org/presentationml/2006/main">
   <p:cSld>
     <p:spTree>
@@ -12066,7 +10918,7 @@
           <a:p>
             <a:fld id="{ABC65B0B-110A-D646-808D-174EFAE956EB}" type="slidenum">
               <a:rPr lang="en-CH" smtClean="0"/>
-              <a:t>28</a:t>
+              <a:t>25</a:t>
             </a:fld>
             <a:endParaRPr lang="en-CH"/>
           </a:p>
@@ -12133,7 +10985,7 @@
 </p:sld>
 </file>
 
-<file path=ppt/slides/slide29.xml><?xml version="1.0" encoding="utf-8"?>
+<file path=ppt/slides/slide26.xml><?xml version="1.0" encoding="utf-8"?>
 <p:sld xmlns:a="http://schemas.openxmlformats.org/drawingml/2006/main" xmlns:r="http://schemas.openxmlformats.org/officeDocument/2006/relationships" xmlns:p="http://schemas.openxmlformats.org/presentationml/2006/main">
   <p:cSld>
     <p:spTree>
@@ -13043,7 +11895,7 @@
           <a:p>
             <a:fld id="{ABC65B0B-110A-D646-808D-174EFAE956EB}" type="slidenum">
               <a:rPr lang="en-CH" smtClean="0"/>
-              <a:t>29</a:t>
+              <a:t>26</a:t>
             </a:fld>
             <a:endParaRPr lang="en-CH"/>
           </a:p>
@@ -13101,6 +11953,257 @@
     <p:extLst>
       <p:ext uri="{BB962C8B-B14F-4D97-AF65-F5344CB8AC3E}">
         <p14:creationId xmlns:p14="http://schemas.microsoft.com/office/powerpoint/2010/main" val="3444311571"/>
+      </p:ext>
+    </p:extLst>
+  </p:cSld>
+  <p:clrMapOvr>
+    <a:masterClrMapping/>
+  </p:clrMapOvr>
+</p:sld>
+</file>
+
+<file path=ppt/slides/slide27.xml><?xml version="1.0" encoding="utf-8"?>
+<p:sld xmlns:a="http://schemas.openxmlformats.org/drawingml/2006/main" xmlns:r="http://schemas.openxmlformats.org/officeDocument/2006/relationships" xmlns:p="http://schemas.openxmlformats.org/presentationml/2006/main">
+  <p:cSld>
+    <p:spTree>
+      <p:nvGrpSpPr>
+        <p:cNvPr id="1" name=""/>
+        <p:cNvGrpSpPr/>
+        <p:nvPr/>
+      </p:nvGrpSpPr>
+      <p:grpSpPr>
+        <a:xfrm>
+          <a:off x="0" y="0"/>
+          <a:ext cx="0" cy="0"/>
+          <a:chOff x="0" y="0"/>
+          <a:chExt cx="0" cy="0"/>
+        </a:xfrm>
+      </p:grpSpPr>
+      <p:sp>
+        <p:nvSpPr>
+          <p:cNvPr id="2" name="Title 1">
+            <a:extLst>
+              <a:ext uri="{FF2B5EF4-FFF2-40B4-BE49-F238E27FC236}">
+                <a16:creationId xmlns:a16="http://schemas.microsoft.com/office/drawing/2014/main" id="{87DA24AC-43D1-9702-DB0C-11543C043B27}"/>
+              </a:ext>
+            </a:extLst>
+          </p:cNvPr>
+          <p:cNvSpPr>
+            <a:spLocks noGrp="1"/>
+          </p:cNvSpPr>
+          <p:nvPr>
+            <p:ph type="title"/>
+          </p:nvPr>
+        </p:nvSpPr>
+        <p:spPr/>
+        <p:txBody>
+          <a:bodyPr/>
+          <a:lstStyle/>
+          <a:p>
+            <a:r>
+              <a:rPr lang="en-CH" dirty="0"/>
+              <a:t>Answer to Research Question 2</a:t>
+            </a:r>
+          </a:p>
+        </p:txBody>
+      </p:sp>
+      <p:sp>
+        <p:nvSpPr>
+          <p:cNvPr id="3" name="Content Placeholder 2">
+            <a:extLst>
+              <a:ext uri="{FF2B5EF4-FFF2-40B4-BE49-F238E27FC236}">
+                <a16:creationId xmlns:a16="http://schemas.microsoft.com/office/drawing/2014/main" id="{5A1D1A90-1CE4-B923-B2F4-93DEDEFF6491}"/>
+              </a:ext>
+            </a:extLst>
+          </p:cNvPr>
+          <p:cNvSpPr>
+            <a:spLocks noGrp="1"/>
+          </p:cNvSpPr>
+          <p:nvPr>
+            <p:ph idx="1"/>
+          </p:nvPr>
+        </p:nvSpPr>
+        <p:spPr/>
+        <p:txBody>
+          <a:bodyPr/>
+          <a:lstStyle/>
+          <a:p>
+            <a:r>
+              <a:rPr lang="en-CH" dirty="0"/>
+              <a:t>We were able to detect anomalous users using seven different anomaly detection algorithms</a:t>
+            </a:r>
+          </a:p>
+          <a:p>
+            <a:r>
+              <a:rPr lang="en-CH" dirty="0"/>
+              <a:t>We were able to characterize three interesting anomalous users based on their activity and interaction pattern</a:t>
+            </a:r>
+          </a:p>
+          <a:p>
+            <a:endParaRPr lang="en-CH" dirty="0"/>
+          </a:p>
+        </p:txBody>
+      </p:sp>
+      <p:sp>
+        <p:nvSpPr>
+          <p:cNvPr id="4" name="Slide Number Placeholder 3">
+            <a:extLst>
+              <a:ext uri="{FF2B5EF4-FFF2-40B4-BE49-F238E27FC236}">
+                <a16:creationId xmlns:a16="http://schemas.microsoft.com/office/drawing/2014/main" id="{03AABBF2-C8E9-7F0F-6C67-601AEAF5CEAE}"/>
+              </a:ext>
+            </a:extLst>
+          </p:cNvPr>
+          <p:cNvSpPr>
+            <a:spLocks noGrp="1"/>
+          </p:cNvSpPr>
+          <p:nvPr>
+            <p:ph type="sldNum" sz="quarter" idx="12"/>
+          </p:nvPr>
+        </p:nvSpPr>
+        <p:spPr/>
+        <p:txBody>
+          <a:bodyPr/>
+          <a:lstStyle/>
+          <a:p>
+            <a:fld id="{ABC65B0B-110A-D646-808D-174EFAE956EB}" type="slidenum">
+              <a:rPr lang="en-CH" smtClean="0"/>
+              <a:t>27</a:t>
+            </a:fld>
+            <a:endParaRPr lang="en-CH"/>
+          </a:p>
+        </p:txBody>
+      </p:sp>
+    </p:spTree>
+    <p:extLst>
+      <p:ext uri="{BB962C8B-B14F-4D97-AF65-F5344CB8AC3E}">
+        <p14:creationId xmlns:p14="http://schemas.microsoft.com/office/powerpoint/2010/main" val="320684105"/>
+      </p:ext>
+    </p:extLst>
+  </p:cSld>
+  <p:clrMapOvr>
+    <a:masterClrMapping/>
+  </p:clrMapOvr>
+</p:sld>
+</file>
+
+<file path=ppt/slides/slide28.xml><?xml version="1.0" encoding="utf-8"?>
+<p:sld xmlns:a="http://schemas.openxmlformats.org/drawingml/2006/main" xmlns:r="http://schemas.openxmlformats.org/officeDocument/2006/relationships" xmlns:p="http://schemas.openxmlformats.org/presentationml/2006/main">
+  <p:cSld>
+    <p:spTree>
+      <p:nvGrpSpPr>
+        <p:cNvPr id="1" name=""/>
+        <p:cNvGrpSpPr/>
+        <p:nvPr/>
+      </p:nvGrpSpPr>
+      <p:grpSpPr>
+        <a:xfrm>
+          <a:off x="0" y="0"/>
+          <a:ext cx="0" cy="0"/>
+          <a:chOff x="0" y="0"/>
+          <a:chExt cx="0" cy="0"/>
+        </a:xfrm>
+      </p:grpSpPr>
+      <p:sp>
+        <p:nvSpPr>
+          <p:cNvPr id="2" name="Title 1">
+            <a:extLst>
+              <a:ext uri="{FF2B5EF4-FFF2-40B4-BE49-F238E27FC236}">
+                <a16:creationId xmlns:a16="http://schemas.microsoft.com/office/drawing/2014/main" id="{E8987AD9-8E08-DF73-24F1-DE19E1F1B90A}"/>
+              </a:ext>
+            </a:extLst>
+          </p:cNvPr>
+          <p:cNvSpPr>
+            <a:spLocks noGrp="1"/>
+          </p:cNvSpPr>
+          <p:nvPr>
+            <p:ph type="title"/>
+          </p:nvPr>
+        </p:nvSpPr>
+        <p:spPr/>
+        <p:txBody>
+          <a:bodyPr/>
+          <a:lstStyle/>
+          <a:p>
+            <a:r>
+              <a:rPr lang="en-CH" dirty="0"/>
+              <a:t>Future Work</a:t>
+            </a:r>
+          </a:p>
+        </p:txBody>
+      </p:sp>
+      <p:sp>
+        <p:nvSpPr>
+          <p:cNvPr id="3" name="Content Placeholder 2">
+            <a:extLst>
+              <a:ext uri="{FF2B5EF4-FFF2-40B4-BE49-F238E27FC236}">
+                <a16:creationId xmlns:a16="http://schemas.microsoft.com/office/drawing/2014/main" id="{CED37E42-2D0C-C47A-1831-40E1C0F07CB1}"/>
+              </a:ext>
+            </a:extLst>
+          </p:cNvPr>
+          <p:cNvSpPr>
+            <a:spLocks noGrp="1"/>
+          </p:cNvSpPr>
+          <p:nvPr>
+            <p:ph idx="1"/>
+          </p:nvPr>
+        </p:nvSpPr>
+        <p:spPr/>
+        <p:txBody>
+          <a:bodyPr/>
+          <a:lstStyle/>
+          <a:p>
+            <a:r>
+              <a:rPr lang="en-CH" dirty="0"/>
+              <a:t>Characterize more social circles and anomalous users based on their activity and interaction patterns</a:t>
+            </a:r>
+          </a:p>
+          <a:p>
+            <a:r>
+              <a:rPr lang="en-CH" dirty="0"/>
+              <a:t>Create more attributes of the users (e.g.: gender, political view and academic level based on profile and post descriptions)</a:t>
+            </a:r>
+          </a:p>
+          <a:p>
+            <a:r>
+              <a:rPr lang="en-CH" dirty="0"/>
+              <a:t>Create association rules within the friendfeed network and social circles (e.g. if the users are using facebook, they are likely to also use twitter)</a:t>
+            </a:r>
+          </a:p>
+        </p:txBody>
+      </p:sp>
+      <p:sp>
+        <p:nvSpPr>
+          <p:cNvPr id="4" name="Slide Number Placeholder 3">
+            <a:extLst>
+              <a:ext uri="{FF2B5EF4-FFF2-40B4-BE49-F238E27FC236}">
+                <a16:creationId xmlns:a16="http://schemas.microsoft.com/office/drawing/2014/main" id="{96661AD8-DEEA-DB2D-23B8-49E78C55D866}"/>
+              </a:ext>
+            </a:extLst>
+          </p:cNvPr>
+          <p:cNvSpPr>
+            <a:spLocks noGrp="1"/>
+          </p:cNvSpPr>
+          <p:nvPr>
+            <p:ph type="sldNum" sz="quarter" idx="12"/>
+          </p:nvPr>
+        </p:nvSpPr>
+        <p:spPr/>
+        <p:txBody>
+          <a:bodyPr/>
+          <a:lstStyle/>
+          <a:p>
+            <a:fld id="{ABC65B0B-110A-D646-808D-174EFAE956EB}" type="slidenum">
+              <a:rPr lang="en-CH" smtClean="0"/>
+              <a:t>28</a:t>
+            </a:fld>
+            <a:endParaRPr lang="en-CH"/>
+          </a:p>
+        </p:txBody>
+      </p:sp>
+    </p:spTree>
+    <p:extLst>
+      <p:ext uri="{BB962C8B-B14F-4D97-AF65-F5344CB8AC3E}">
+        <p14:creationId xmlns:p14="http://schemas.microsoft.com/office/powerpoint/2010/main" val="1956764625"/>
       </p:ext>
     </p:extLst>
   </p:cSld>
@@ -13181,8 +12284,16 @@
               <a:t>RQ 1: </a:t>
             </a:r>
             <a:r>
-              <a:rPr lang="en-CH" sz="2400" dirty="0"/>
-              <a:t>Is it possible to identify distinct social circles within the Friendfeed network based on user connections, and characterize them in terms of activity, service usage and interaction patterns? </a:t>
+              <a:rPr lang="en-GB" sz="2400" dirty="0"/>
+              <a:t>Can we identify social circles in the </a:t>
+            </a:r>
+            <a:r>
+              <a:rPr lang="en-GB" sz="2400" dirty="0" err="1"/>
+              <a:t>Friendfeed</a:t>
+            </a:r>
+            <a:r>
+              <a:rPr lang="en-GB" sz="2400" dirty="0"/>
+              <a:t> network and then classify them into distinct groups based on both their service usage and their activity and interaction patterns?</a:t>
             </a:r>
             <a:br>
               <a:rPr lang="en-CH" sz="2400" dirty="0"/>
@@ -13196,7 +12307,7 @@
             </a:r>
             <a:r>
               <a:rPr lang="en-CH" sz="2400" dirty="0"/>
-              <a:t>Is it possible to detect anomalous users in the Friendfeed network (e.g., bots, spammers) based on posting, following, and interaction patterns (commenting/liking) and characerize them in terms of activity and interactions patterns?</a:t>
+              <a:t>Is it possible to detect anomalous users in the Friendfeed network (e.g., bots, spammers) based on posting, following, and interaction patterns (commenting/liking) and characerize them in terms of their activity?</a:t>
             </a:r>
             <a:endParaRPr lang="en-GB" sz="2400" dirty="0"/>
           </a:p>
@@ -13241,257 +12352,6 @@
     <p:extLst>
       <p:ext uri="{BB962C8B-B14F-4D97-AF65-F5344CB8AC3E}">
         <p14:creationId xmlns:p14="http://schemas.microsoft.com/office/powerpoint/2010/main" val="2031703386"/>
-      </p:ext>
-    </p:extLst>
-  </p:cSld>
-  <p:clrMapOvr>
-    <a:masterClrMapping/>
-  </p:clrMapOvr>
-</p:sld>
-</file>
-
-<file path=ppt/slides/slide30.xml><?xml version="1.0" encoding="utf-8"?>
-<p:sld xmlns:a="http://schemas.openxmlformats.org/drawingml/2006/main" xmlns:r="http://schemas.openxmlformats.org/officeDocument/2006/relationships" xmlns:p="http://schemas.openxmlformats.org/presentationml/2006/main">
-  <p:cSld>
-    <p:spTree>
-      <p:nvGrpSpPr>
-        <p:cNvPr id="1" name=""/>
-        <p:cNvGrpSpPr/>
-        <p:nvPr/>
-      </p:nvGrpSpPr>
-      <p:grpSpPr>
-        <a:xfrm>
-          <a:off x="0" y="0"/>
-          <a:ext cx="0" cy="0"/>
-          <a:chOff x="0" y="0"/>
-          <a:chExt cx="0" cy="0"/>
-        </a:xfrm>
-      </p:grpSpPr>
-      <p:sp>
-        <p:nvSpPr>
-          <p:cNvPr id="2" name="Title 1">
-            <a:extLst>
-              <a:ext uri="{FF2B5EF4-FFF2-40B4-BE49-F238E27FC236}">
-                <a16:creationId xmlns:a16="http://schemas.microsoft.com/office/drawing/2014/main" id="{87DA24AC-43D1-9702-DB0C-11543C043B27}"/>
-              </a:ext>
-            </a:extLst>
-          </p:cNvPr>
-          <p:cNvSpPr>
-            <a:spLocks noGrp="1"/>
-          </p:cNvSpPr>
-          <p:nvPr>
-            <p:ph type="title"/>
-          </p:nvPr>
-        </p:nvSpPr>
-        <p:spPr/>
-        <p:txBody>
-          <a:bodyPr/>
-          <a:lstStyle/>
-          <a:p>
-            <a:r>
-              <a:rPr lang="en-CH" dirty="0"/>
-              <a:t>Answer to Research Question 2</a:t>
-            </a:r>
-          </a:p>
-        </p:txBody>
-      </p:sp>
-      <p:sp>
-        <p:nvSpPr>
-          <p:cNvPr id="3" name="Content Placeholder 2">
-            <a:extLst>
-              <a:ext uri="{FF2B5EF4-FFF2-40B4-BE49-F238E27FC236}">
-                <a16:creationId xmlns:a16="http://schemas.microsoft.com/office/drawing/2014/main" id="{5A1D1A90-1CE4-B923-B2F4-93DEDEFF6491}"/>
-              </a:ext>
-            </a:extLst>
-          </p:cNvPr>
-          <p:cNvSpPr>
-            <a:spLocks noGrp="1"/>
-          </p:cNvSpPr>
-          <p:nvPr>
-            <p:ph idx="1"/>
-          </p:nvPr>
-        </p:nvSpPr>
-        <p:spPr/>
-        <p:txBody>
-          <a:bodyPr/>
-          <a:lstStyle/>
-          <a:p>
-            <a:r>
-              <a:rPr lang="en-CH" dirty="0"/>
-              <a:t>We were able to detect anomalous users using seven different anomaly detection algorithms</a:t>
-            </a:r>
-          </a:p>
-          <a:p>
-            <a:r>
-              <a:rPr lang="en-CH" dirty="0"/>
-              <a:t>We were able to characterize three interesting anomalous users based on their activity and interaction pattern</a:t>
-            </a:r>
-          </a:p>
-          <a:p>
-            <a:endParaRPr lang="en-CH" dirty="0"/>
-          </a:p>
-        </p:txBody>
-      </p:sp>
-      <p:sp>
-        <p:nvSpPr>
-          <p:cNvPr id="4" name="Slide Number Placeholder 3">
-            <a:extLst>
-              <a:ext uri="{FF2B5EF4-FFF2-40B4-BE49-F238E27FC236}">
-                <a16:creationId xmlns:a16="http://schemas.microsoft.com/office/drawing/2014/main" id="{03AABBF2-C8E9-7F0F-6C67-601AEAF5CEAE}"/>
-              </a:ext>
-            </a:extLst>
-          </p:cNvPr>
-          <p:cNvSpPr>
-            <a:spLocks noGrp="1"/>
-          </p:cNvSpPr>
-          <p:nvPr>
-            <p:ph type="sldNum" sz="quarter" idx="12"/>
-          </p:nvPr>
-        </p:nvSpPr>
-        <p:spPr/>
-        <p:txBody>
-          <a:bodyPr/>
-          <a:lstStyle/>
-          <a:p>
-            <a:fld id="{ABC65B0B-110A-D646-808D-174EFAE956EB}" type="slidenum">
-              <a:rPr lang="en-CH" smtClean="0"/>
-              <a:t>30</a:t>
-            </a:fld>
-            <a:endParaRPr lang="en-CH"/>
-          </a:p>
-        </p:txBody>
-      </p:sp>
-    </p:spTree>
-    <p:extLst>
-      <p:ext uri="{BB962C8B-B14F-4D97-AF65-F5344CB8AC3E}">
-        <p14:creationId xmlns:p14="http://schemas.microsoft.com/office/powerpoint/2010/main" val="320684105"/>
-      </p:ext>
-    </p:extLst>
-  </p:cSld>
-  <p:clrMapOvr>
-    <a:masterClrMapping/>
-  </p:clrMapOvr>
-</p:sld>
-</file>
-
-<file path=ppt/slides/slide31.xml><?xml version="1.0" encoding="utf-8"?>
-<p:sld xmlns:a="http://schemas.openxmlformats.org/drawingml/2006/main" xmlns:r="http://schemas.openxmlformats.org/officeDocument/2006/relationships" xmlns:p="http://schemas.openxmlformats.org/presentationml/2006/main">
-  <p:cSld>
-    <p:spTree>
-      <p:nvGrpSpPr>
-        <p:cNvPr id="1" name=""/>
-        <p:cNvGrpSpPr/>
-        <p:nvPr/>
-      </p:nvGrpSpPr>
-      <p:grpSpPr>
-        <a:xfrm>
-          <a:off x="0" y="0"/>
-          <a:ext cx="0" cy="0"/>
-          <a:chOff x="0" y="0"/>
-          <a:chExt cx="0" cy="0"/>
-        </a:xfrm>
-      </p:grpSpPr>
-      <p:sp>
-        <p:nvSpPr>
-          <p:cNvPr id="2" name="Title 1">
-            <a:extLst>
-              <a:ext uri="{FF2B5EF4-FFF2-40B4-BE49-F238E27FC236}">
-                <a16:creationId xmlns:a16="http://schemas.microsoft.com/office/drawing/2014/main" id="{E8987AD9-8E08-DF73-24F1-DE19E1F1B90A}"/>
-              </a:ext>
-            </a:extLst>
-          </p:cNvPr>
-          <p:cNvSpPr>
-            <a:spLocks noGrp="1"/>
-          </p:cNvSpPr>
-          <p:nvPr>
-            <p:ph type="title"/>
-          </p:nvPr>
-        </p:nvSpPr>
-        <p:spPr/>
-        <p:txBody>
-          <a:bodyPr/>
-          <a:lstStyle/>
-          <a:p>
-            <a:r>
-              <a:rPr lang="en-CH" dirty="0"/>
-              <a:t>Future Work</a:t>
-            </a:r>
-          </a:p>
-        </p:txBody>
-      </p:sp>
-      <p:sp>
-        <p:nvSpPr>
-          <p:cNvPr id="3" name="Content Placeholder 2">
-            <a:extLst>
-              <a:ext uri="{FF2B5EF4-FFF2-40B4-BE49-F238E27FC236}">
-                <a16:creationId xmlns:a16="http://schemas.microsoft.com/office/drawing/2014/main" id="{CED37E42-2D0C-C47A-1831-40E1C0F07CB1}"/>
-              </a:ext>
-            </a:extLst>
-          </p:cNvPr>
-          <p:cNvSpPr>
-            <a:spLocks noGrp="1"/>
-          </p:cNvSpPr>
-          <p:nvPr>
-            <p:ph idx="1"/>
-          </p:nvPr>
-        </p:nvSpPr>
-        <p:spPr/>
-        <p:txBody>
-          <a:bodyPr/>
-          <a:lstStyle/>
-          <a:p>
-            <a:r>
-              <a:rPr lang="en-CH" dirty="0"/>
-              <a:t>Characterize more social circles and anomalous users based on their activity and interaction patterns</a:t>
-            </a:r>
-          </a:p>
-          <a:p>
-            <a:r>
-              <a:rPr lang="en-CH" dirty="0"/>
-              <a:t>Create more attributes of the users (e.g.: gender, political view and academic level based on profile and post descriptions)</a:t>
-            </a:r>
-          </a:p>
-          <a:p>
-            <a:r>
-              <a:rPr lang="en-CH" dirty="0"/>
-              <a:t>Create association rules within the friendfeed network and social circles (e.g. if the users are using facebook, they are likely to also use twitter)</a:t>
-            </a:r>
-          </a:p>
-        </p:txBody>
-      </p:sp>
-      <p:sp>
-        <p:nvSpPr>
-          <p:cNvPr id="4" name="Slide Number Placeholder 3">
-            <a:extLst>
-              <a:ext uri="{FF2B5EF4-FFF2-40B4-BE49-F238E27FC236}">
-                <a16:creationId xmlns:a16="http://schemas.microsoft.com/office/drawing/2014/main" id="{96661AD8-DEEA-DB2D-23B8-49E78C55D866}"/>
-              </a:ext>
-            </a:extLst>
-          </p:cNvPr>
-          <p:cNvSpPr>
-            <a:spLocks noGrp="1"/>
-          </p:cNvSpPr>
-          <p:nvPr>
-            <p:ph type="sldNum" sz="quarter" idx="12"/>
-          </p:nvPr>
-        </p:nvSpPr>
-        <p:spPr/>
-        <p:txBody>
-          <a:bodyPr/>
-          <a:lstStyle/>
-          <a:p>
-            <a:fld id="{ABC65B0B-110A-D646-808D-174EFAE956EB}" type="slidenum">
-              <a:rPr lang="en-CH" smtClean="0"/>
-              <a:t>31</a:t>
-            </a:fld>
-            <a:endParaRPr lang="en-CH"/>
-          </a:p>
-        </p:txBody>
-      </p:sp>
-    </p:spTree>
-    <p:extLst>
-      <p:ext uri="{BB962C8B-B14F-4D97-AF65-F5344CB8AC3E}">
-        <p14:creationId xmlns:p14="http://schemas.microsoft.com/office/powerpoint/2010/main" val="1956764625"/>
       </p:ext>
     </p:extLst>
   </p:cSld>
@@ -13541,7 +12401,15 @@
           <a:p>
             <a:r>
               <a:rPr lang="en-CH" dirty="0"/>
-              <a:t>Data – Friendfeed Social Network</a:t>
+              <a:t>Data </a:t>
+            </a:r>
+            <a:r>
+              <a:rPr lang="en-US" dirty="0"/>
+              <a:t>-</a:t>
+            </a:r>
+            <a:r>
+              <a:rPr lang="en-CH" dirty="0"/>
+              <a:t> Friendfeed Social Network</a:t>
             </a:r>
           </a:p>
         </p:txBody>
@@ -13705,7 +12573,15 @@
           <a:p>
             <a:r>
               <a:rPr lang="en-CH" dirty="0"/>
-              <a:t>Data – </a:t>
+              <a:t>Data </a:t>
+            </a:r>
+            <a:r>
+              <a:rPr lang="en-US" dirty="0"/>
+              <a:t>-</a:t>
+            </a:r>
+            <a:r>
+              <a:rPr lang="en-CH" dirty="0"/>
+              <a:t> </a:t>
             </a:r>
             <a:r>
               <a:rPr lang="en-US" dirty="0"/>
@@ -13914,7 +12790,15 @@
           <a:p>
             <a:r>
               <a:rPr lang="en-CH" dirty="0"/>
-              <a:t>Data – </a:t>
+              <a:t>Data </a:t>
+            </a:r>
+            <a:r>
+              <a:rPr lang="en-US" dirty="0"/>
+              <a:t>-</a:t>
+            </a:r>
+            <a:r>
+              <a:rPr lang="en-CH" dirty="0"/>
+              <a:t> </a:t>
             </a:r>
             <a:r>
               <a:rPr lang="en-US" dirty="0"/>
@@ -13942,13 +12826,13 @@
         </p:nvSpPr>
         <p:spPr>
           <a:xfrm>
-            <a:off x="838200" y="1434354"/>
-            <a:ext cx="10515600" cy="5058520"/>
+            <a:off x="838200" y="1434353"/>
+            <a:ext cx="10515600" cy="5287121"/>
           </a:xfrm>
         </p:spPr>
         <p:txBody>
           <a:bodyPr>
-            <a:normAutofit/>
+            <a:normAutofit lnSpcReduction="10000"/>
           </a:bodyPr>
           <a:lstStyle/>
           <a:p>
@@ -14077,6 +12961,14 @@
               <a:rPr lang="en-US" sz="2000" dirty="0"/>
               <a:t> values to lowercase to ensure consistency and accurate matching.</a:t>
             </a:r>
+          </a:p>
+          <a:p>
+            <a:r>
+              <a:rPr lang="en-US" sz="2000" dirty="0"/>
+              <a:t>Retained only posts from users present in the followings table, as these users are relevant for community detection.</a:t>
+            </a:r>
+          </a:p>
+          <a:p>
             <a:endParaRPr lang="en-CH" sz="2000" dirty="0"/>
           </a:p>
         </p:txBody>
@@ -14174,11 +13066,11 @@
           <a:p>
             <a:r>
               <a:rPr lang="en-CH" dirty="0"/>
-              <a:t>Data – </a:t>
+              <a:t>Data </a:t>
             </a:r>
             <a:r>
               <a:rPr lang="en-US" dirty="0"/>
-              <a:t>Preprocessing</a:t>
+              <a:t>- Preprocessing</a:t>
             </a:r>
             <a:endParaRPr lang="en-CH" dirty="0"/>
           </a:p>
@@ -14212,15 +13104,6 @@
           </a:bodyPr>
           <a:lstStyle/>
           <a:p>
-            <a:r>
-              <a:rPr lang="en-US" sz="2000" dirty="0"/>
-              <a:t>Retained only posts from users present in the followings table, as these users are relevant for community detection.</a:t>
-            </a:r>
-          </a:p>
-          <a:p>
-            <a:endParaRPr lang="en-US" dirty="0"/>
-          </a:p>
-          <a:p>
             <a:pPr marL="0" indent="0">
               <a:buNone/>
             </a:pPr>
@@ -14264,7 +13147,7 @@
             </a:r>
           </a:p>
           <a:p>
-            <a:endParaRPr lang="en-US" sz="2000" dirty="0"/>
+            <a:endParaRPr lang="en-US" sz="2000" b="1" dirty="0"/>
           </a:p>
           <a:p>
             <a:pPr marL="0" indent="0">
@@ -14272,7 +13155,7 @@
             </a:pPr>
             <a:r>
               <a:rPr lang="en-US" sz="2400" b="1" dirty="0"/>
-              <a:t>5. Comments Table</a:t>
+              <a:t>6. Comments Table</a:t>
             </a:r>
           </a:p>
           <a:p>
@@ -14296,9 +13179,26 @@
             </a:r>
           </a:p>
           <a:p>
-            <a:pPr marL="0" indent="0">
-              <a:buNone/>
-            </a:pPr>
+            <a:r>
+              <a:rPr lang="en-US" sz="2000" dirty="0"/>
+              <a:t>Converted all </a:t>
+            </a:r>
+            <a:r>
+              <a:rPr lang="en-US" sz="2000" dirty="0" err="1"/>
+              <a:t>posted_by</a:t>
+            </a:r>
+            <a:r>
+              <a:rPr lang="en-US" sz="2000" dirty="0"/>
+              <a:t> values to lowercase for consistency and accurate matching.</a:t>
+            </a:r>
+          </a:p>
+          <a:p>
+            <a:r>
+              <a:rPr lang="en-US" sz="2000" dirty="0"/>
+              <a:t>Retained only comments made by users present in the followings table, as these users are relevant for community detection.</a:t>
+            </a:r>
+          </a:p>
+          <a:p>
             <a:endParaRPr lang="en-US" sz="2400" b="1" dirty="0"/>
           </a:p>
           <a:p>
@@ -14359,13 +13259,7 @@
   <p:cSld>
     <p:spTree>
       <p:nvGrpSpPr>
-        <p:cNvPr id="1" name="">
-          <a:extLst>
-            <a:ext uri="{FF2B5EF4-FFF2-40B4-BE49-F238E27FC236}">
-              <a16:creationId xmlns:a16="http://schemas.microsoft.com/office/drawing/2014/main" id="{8603CEBD-4942-FD8B-3ABA-4C9C6CC44316}"/>
-            </a:ext>
-          </a:extLst>
-        </p:cNvPr>
+        <p:cNvPr id="1" name=""/>
         <p:cNvGrpSpPr/>
         <p:nvPr/>
       </p:nvGrpSpPr>
@@ -14382,7 +13276,7 @@
           <p:cNvPr id="2" name="Title 1">
             <a:extLst>
               <a:ext uri="{FF2B5EF4-FFF2-40B4-BE49-F238E27FC236}">
-                <a16:creationId xmlns:a16="http://schemas.microsoft.com/office/drawing/2014/main" id="{3FC66F75-A680-01D9-D5E6-F1C1B5CA21FB}"/>
+                <a16:creationId xmlns:a16="http://schemas.microsoft.com/office/drawing/2014/main" id="{E914D6B6-34B6-C3F5-A45D-C9ABF16DD735}"/>
               </a:ext>
             </a:extLst>
           </p:cNvPr>
@@ -14391,50 +13285,40 @@
           </p:cNvSpPr>
           <p:nvPr>
             <p:ph type="title"/>
+          </p:nvPr>
+        </p:nvSpPr>
+        <p:spPr/>
+        <p:txBody>
+          <a:bodyPr/>
+          <a:lstStyle/>
+          <a:p>
+            <a:r>
+              <a:rPr lang="en-US" dirty="0"/>
+              <a:t>Data - After Preprocessing</a:t>
+            </a:r>
+          </a:p>
+        </p:txBody>
+      </p:sp>
+      <p:sp>
+        <p:nvSpPr>
+          <p:cNvPr id="3" name="Content Placeholder 2">
+            <a:extLst>
+              <a:ext uri="{FF2B5EF4-FFF2-40B4-BE49-F238E27FC236}">
+                <a16:creationId xmlns:a16="http://schemas.microsoft.com/office/drawing/2014/main" id="{9BF60156-5663-DF29-35DD-F4A9F6805B13}"/>
+              </a:ext>
+            </a:extLst>
+          </p:cNvPr>
+          <p:cNvSpPr>
+            <a:spLocks noGrp="1"/>
+          </p:cNvSpPr>
+          <p:nvPr>
+            <p:ph idx="1"/>
           </p:nvPr>
         </p:nvSpPr>
         <p:spPr>
           <a:xfrm>
-            <a:off x="838200" y="365126"/>
-            <a:ext cx="10515600" cy="1069228"/>
-          </a:xfrm>
-        </p:spPr>
-        <p:txBody>
-          <a:bodyPr/>
-          <a:lstStyle/>
-          <a:p>
-            <a:r>
-              <a:rPr lang="en-CH" dirty="0"/>
-              <a:t>Data – </a:t>
-            </a:r>
-            <a:r>
-              <a:rPr lang="en-US" dirty="0"/>
-              <a:t>Preprocessing</a:t>
-            </a:r>
-            <a:endParaRPr lang="en-CH" dirty="0"/>
-          </a:p>
-        </p:txBody>
-      </p:sp>
-      <p:sp>
-        <p:nvSpPr>
-          <p:cNvPr id="3" name="Content Placeholder 2">
-            <a:extLst>
-              <a:ext uri="{FF2B5EF4-FFF2-40B4-BE49-F238E27FC236}">
-                <a16:creationId xmlns:a16="http://schemas.microsoft.com/office/drawing/2014/main" id="{DB5AEB42-9D82-9A2B-41A1-1B107C12CCCD}"/>
-              </a:ext>
-            </a:extLst>
-          </p:cNvPr>
-          <p:cNvSpPr>
-            <a:spLocks noGrp="1"/>
-          </p:cNvSpPr>
-          <p:nvPr>
-            <p:ph idx="1"/>
-          </p:nvPr>
-        </p:nvSpPr>
-        <p:spPr>
-          <a:xfrm>
-            <a:off x="838200" y="1434354"/>
-            <a:ext cx="10515600" cy="5058520"/>
+            <a:off x="838200" y="1559859"/>
+            <a:ext cx="10861110" cy="4617104"/>
           </a:xfrm>
         </p:spPr>
         <p:txBody>
@@ -14444,35 +13328,40 @@
           <a:lstStyle/>
           <a:p>
             <a:r>
-              <a:rPr lang="en-US" sz="2000" dirty="0"/>
-              <a:t>Converted all </a:t>
-            </a:r>
-            <a:r>
-              <a:rPr lang="en-US" sz="2000" dirty="0" err="1"/>
-              <a:t>posted_by</a:t>
-            </a:r>
-            <a:r>
-              <a:rPr lang="en-US" sz="2000" dirty="0"/>
-              <a:t> values to lowercase for consistency and accurate matching.</a:t>
-            </a:r>
-          </a:p>
-          <a:p>
-            <a:r>
-              <a:rPr lang="en-US" sz="2000" dirty="0"/>
-              <a:t>Retained only comments made by users present in the followings table, as these users are relevant for community detection.</a:t>
-            </a:r>
-          </a:p>
-          <a:p>
-            <a:pPr marL="0" indent="0">
-              <a:buNone/>
-            </a:pPr>
-            <a:endParaRPr lang="en-US" sz="2000" b="1" dirty="0"/>
-          </a:p>
-          <a:p>
-            <a:pPr marL="0" indent="0">
-              <a:buNone/>
-            </a:pPr>
-            <a:endParaRPr lang="en-CH" sz="2000" dirty="0"/>
+              <a:rPr lang="en-US" sz="2400" dirty="0"/>
+              <a:t>Number of users: 645’416 </a:t>
+            </a:r>
+          </a:p>
+          <a:p>
+            <a:r>
+              <a:rPr lang="en-US" sz="2400" dirty="0"/>
+              <a:t>Number of people following: 18’477’147 </a:t>
+            </a:r>
+          </a:p>
+          <a:p>
+            <a:r>
+              <a:rPr lang="en-US" sz="2400" dirty="0"/>
+              <a:t>Number of services: 136’6407 </a:t>
+            </a:r>
+          </a:p>
+          <a:p>
+            <a:r>
+              <a:rPr lang="en-US" sz="2400" dirty="0"/>
+              <a:t>Number of posts: 10’864’613 </a:t>
+            </a:r>
+          </a:p>
+          <a:p>
+            <a:r>
+              <a:rPr lang="en-US" sz="2400" dirty="0"/>
+              <a:t>Number of comments: 3’749’891 </a:t>
+            </a:r>
+          </a:p>
+          <a:p>
+            <a:r>
+              <a:rPr lang="en-US" sz="2400" dirty="0"/>
+              <a:t>Number of likes: 797’290</a:t>
+            </a:r>
+            <a:endParaRPr lang="en-CH" sz="2400" dirty="0"/>
           </a:p>
         </p:txBody>
       </p:sp>
@@ -14481,7 +13370,7 @@
           <p:cNvPr id="4" name="Slide Number Placeholder 3">
             <a:extLst>
               <a:ext uri="{FF2B5EF4-FFF2-40B4-BE49-F238E27FC236}">
-                <a16:creationId xmlns:a16="http://schemas.microsoft.com/office/drawing/2014/main" id="{C579DB99-8196-436F-D9DE-79604BE81786}"/>
+                <a16:creationId xmlns:a16="http://schemas.microsoft.com/office/drawing/2014/main" id="{E76D3977-5B62-A68B-08EE-7AE27CB617D2}"/>
               </a:ext>
             </a:extLst>
           </p:cNvPr>
@@ -14508,7 +13397,7 @@
     </p:spTree>
     <p:extLst>
       <p:ext uri="{BB962C8B-B14F-4D97-AF65-F5344CB8AC3E}">
-        <p14:creationId xmlns:p14="http://schemas.microsoft.com/office/powerpoint/2010/main" val="2385151721"/>
+        <p14:creationId xmlns:p14="http://schemas.microsoft.com/office/powerpoint/2010/main" val="2331160125"/>
       </p:ext>
     </p:extLst>
   </p:cSld>
@@ -14540,7 +13429,7 @@
           <p:cNvPr id="2" name="Title 1">
             <a:extLst>
               <a:ext uri="{FF2B5EF4-FFF2-40B4-BE49-F238E27FC236}">
-                <a16:creationId xmlns:a16="http://schemas.microsoft.com/office/drawing/2014/main" id="{E914D6B6-34B6-C3F5-A45D-C9ABF16DD735}"/>
+                <a16:creationId xmlns:a16="http://schemas.microsoft.com/office/drawing/2014/main" id="{3108730E-CB4B-A1CE-88EE-1506162CE5DB}"/>
               </a:ext>
             </a:extLst>
           </p:cNvPr>
@@ -14557,84 +13446,104 @@
           <a:lstStyle/>
           <a:p>
             <a:r>
-              <a:rPr lang="en-US" dirty="0"/>
-              <a:t>Data - After Preprocessing -</a:t>
-            </a:r>
-          </a:p>
-        </p:txBody>
-      </p:sp>
-      <p:sp>
-        <p:nvSpPr>
-          <p:cNvPr id="3" name="Content Placeholder 2">
-            <a:extLst>
-              <a:ext uri="{FF2B5EF4-FFF2-40B4-BE49-F238E27FC236}">
-                <a16:creationId xmlns:a16="http://schemas.microsoft.com/office/drawing/2014/main" id="{9BF60156-5663-DF29-35DD-F4A9F6805B13}"/>
-              </a:ext>
-            </a:extLst>
-          </p:cNvPr>
-          <p:cNvSpPr>
-            <a:spLocks noGrp="1"/>
-          </p:cNvSpPr>
+              <a:rPr lang="en-CH" dirty="0"/>
+              <a:t>Initial Data Exploration</a:t>
+            </a:r>
+          </a:p>
+        </p:txBody>
+      </p:sp>
+      <p:pic>
+        <p:nvPicPr>
+          <p:cNvPr id="5" name="Content Placeholder 4">
+            <a:extLst>
+              <a:ext uri="{FF2B5EF4-FFF2-40B4-BE49-F238E27FC236}">
+                <a16:creationId xmlns:a16="http://schemas.microsoft.com/office/drawing/2014/main" id="{512F95F2-1D99-48F4-60CC-712C6381F388}"/>
+              </a:ext>
+            </a:extLst>
+          </p:cNvPr>
+          <p:cNvPicPr>
+            <a:picLocks noGrp="1" noChangeAspect="1"/>
+          </p:cNvPicPr>
           <p:nvPr>
             <p:ph idx="1"/>
           </p:nvPr>
-        </p:nvSpPr>
+        </p:nvPicPr>
+        <p:blipFill>
+          <a:blip r:embed="rId2"/>
+          <a:srcRect/>
+          <a:stretch/>
+        </p:blipFill>
         <p:spPr>
           <a:xfrm>
-            <a:off x="838200" y="1559859"/>
-            <a:ext cx="10861110" cy="4617104"/>
+            <a:off x="229954" y="1901115"/>
+            <a:ext cx="5194300" cy="4140200"/>
           </a:xfrm>
         </p:spPr>
-        <p:txBody>
-          <a:bodyPr>
-            <a:normAutofit/>
-          </a:bodyPr>
-          <a:lstStyle/>
-          <a:p>
-            <a:r>
-              <a:rPr lang="en-US" sz="2400" dirty="0"/>
-              <a:t>Number of users: 645’416 </a:t>
-            </a:r>
-          </a:p>
-          <a:p>
-            <a:r>
-              <a:rPr lang="en-US" sz="2400" dirty="0"/>
-              <a:t>Number of people following: 18’477’147 </a:t>
-            </a:r>
-          </a:p>
-          <a:p>
-            <a:r>
-              <a:rPr lang="en-US" sz="2400" dirty="0"/>
-              <a:t>Number of services: 136’6407 </a:t>
-            </a:r>
-          </a:p>
-          <a:p>
-            <a:r>
-              <a:rPr lang="en-US" sz="2400" dirty="0"/>
-              <a:t>Number of posts: 10’864’613 </a:t>
-            </a:r>
-          </a:p>
-          <a:p>
-            <a:r>
-              <a:rPr lang="en-US" sz="2400" dirty="0"/>
-              <a:t>Number of comments: 3’749’891 </a:t>
-            </a:r>
-          </a:p>
-          <a:p>
-            <a:r>
-              <a:rPr lang="en-US" sz="2400" dirty="0"/>
-              <a:t>Number of likes: 797’290</a:t>
-            </a:r>
-            <a:endParaRPr lang="en-CH" sz="2400" dirty="0"/>
-          </a:p>
-        </p:txBody>
-      </p:sp>
-      <p:sp>
-        <p:nvSpPr>
-          <p:cNvPr id="4" name="Slide Number Placeholder 3">
-            <a:extLst>
-              <a:ext uri="{FF2B5EF4-FFF2-40B4-BE49-F238E27FC236}">
-                <a16:creationId xmlns:a16="http://schemas.microsoft.com/office/drawing/2014/main" id="{E76D3977-5B62-A68B-08EE-7AE27CB617D2}"/>
+      </p:pic>
+      <p:pic>
+        <p:nvPicPr>
+          <p:cNvPr id="7" name="Picture 6">
+            <a:extLst>
+              <a:ext uri="{FF2B5EF4-FFF2-40B4-BE49-F238E27FC236}">
+                <a16:creationId xmlns:a16="http://schemas.microsoft.com/office/drawing/2014/main" id="{737E4160-FDEF-68C8-7603-A14445440AE9}"/>
+              </a:ext>
+            </a:extLst>
+          </p:cNvPr>
+          <p:cNvPicPr>
+            <a:picLocks noChangeAspect="1"/>
+          </p:cNvPicPr>
+          <p:nvPr/>
+        </p:nvPicPr>
+        <p:blipFill>
+          <a:blip r:embed="rId3"/>
+          <a:srcRect/>
+          <a:stretch/>
+        </p:blipFill>
+        <p:spPr>
+          <a:xfrm>
+            <a:off x="7590971" y="154698"/>
+            <a:ext cx="4060618" cy="3236581"/>
+          </a:xfrm>
+          <a:prstGeom prst="rect">
+            <a:avLst/>
+          </a:prstGeom>
+        </p:spPr>
+      </p:pic>
+      <p:pic>
+        <p:nvPicPr>
+          <p:cNvPr id="9" name="Picture 8">
+            <a:extLst>
+              <a:ext uri="{FF2B5EF4-FFF2-40B4-BE49-F238E27FC236}">
+                <a16:creationId xmlns:a16="http://schemas.microsoft.com/office/drawing/2014/main" id="{47C9538D-C514-E33E-D134-F1F0E62A59B5}"/>
+              </a:ext>
+            </a:extLst>
+          </p:cNvPr>
+          <p:cNvPicPr>
+            <a:picLocks noChangeAspect="1"/>
+          </p:cNvPicPr>
+          <p:nvPr/>
+        </p:nvPicPr>
+        <p:blipFill>
+          <a:blip r:embed="rId4"/>
+          <a:srcRect/>
+          <a:stretch/>
+        </p:blipFill>
+        <p:spPr>
+          <a:xfrm>
+            <a:off x="7474856" y="3528867"/>
+            <a:ext cx="4176733" cy="3329131"/>
+          </a:xfrm>
+          <a:prstGeom prst="rect">
+            <a:avLst/>
+          </a:prstGeom>
+        </p:spPr>
+      </p:pic>
+      <p:sp>
+        <p:nvSpPr>
+          <p:cNvPr id="3" name="Slide Number Placeholder 2">
+            <a:extLst>
+              <a:ext uri="{FF2B5EF4-FFF2-40B4-BE49-F238E27FC236}">
+                <a16:creationId xmlns:a16="http://schemas.microsoft.com/office/drawing/2014/main" id="{B9021DA9-D207-1D0E-5FBA-289203F0BF85}"/>
               </a:ext>
             </a:extLst>
           </p:cNvPr>
@@ -14661,7 +13570,7 @@
     </p:spTree>
     <p:extLst>
       <p:ext uri="{BB962C8B-B14F-4D97-AF65-F5344CB8AC3E}">
-        <p14:creationId xmlns:p14="http://schemas.microsoft.com/office/powerpoint/2010/main" val="2331160125"/>
+        <p14:creationId xmlns:p14="http://schemas.microsoft.com/office/powerpoint/2010/main" val="4092990420"/>
       </p:ext>
     </p:extLst>
   </p:cSld>

</xml_diff>